<commit_message>
Added some data to the project poster
</commit_message>
<xml_diff>
--- a/Frontiers of Robotics Research/Project/StephenRerriBekibeleDissertationPosterPresentations-36x60-Template-Newfield.pptx
+++ b/Frontiers of Robotics Research/Project/StephenRerriBekibeleDissertationPosterPresentations-36x60-Template-Newfield.pptx
@@ -16190,15 +16190,18 @@
           <a:bodyPr/>
           <a:lstStyle/>
           <a:p>
-            <a:endParaRPr lang="en-US" sz="1300">
-              <a:solidFill>
-                <a:schemeClr val="accent5">
-                  <a:lumMod val="50000"/>
-                </a:schemeClr>
-              </a:solidFill>
-              <a:latin typeface="Times New Roman" panose="02020603050405020304" pitchFamily="18" charset="0"/>
-              <a:cs typeface="Times New Roman" panose="02020603050405020304" pitchFamily="18" charset="0"/>
-            </a:endParaRPr>
+            <a:r>
+              <a:rPr lang="en-US" sz="1300" dirty="0">
+                <a:solidFill>
+                  <a:schemeClr val="accent5">
+                    <a:lumMod val="50000"/>
+                  </a:schemeClr>
+                </a:solidFill>
+                <a:latin typeface="Times New Roman" panose="02020603050405020304" pitchFamily="18" charset="0"/>
+                <a:cs typeface="Times New Roman" panose="02020603050405020304" pitchFamily="18" charset="0"/>
+              </a:rPr>
+              <a:t>Implement infrastructure for sending data to drone for facial recognition over internet.</a:t>
+            </a:r>
           </a:p>
         </p:txBody>
       </p:sp>
@@ -16504,7 +16507,7 @@
           <a:bodyPr/>
           <a:lstStyle/>
           <a:p>
-            <a:endParaRPr lang="en-US" sz="1300">
+            <a:endParaRPr lang="en-US" sz="1300" dirty="0">
               <a:solidFill>
                 <a:schemeClr val="accent5">
                   <a:lumMod val="50000"/>
@@ -16555,15 +16558,18 @@
           <a:bodyPr/>
           <a:lstStyle/>
           <a:p>
-            <a:endParaRPr lang="en-US" sz="1300">
-              <a:solidFill>
-                <a:schemeClr val="accent5">
-                  <a:lumMod val="50000"/>
-                </a:schemeClr>
-              </a:solidFill>
-              <a:latin typeface="Times New Roman" panose="02020603050405020304" pitchFamily="18" charset="0"/>
-              <a:cs typeface="Times New Roman" panose="02020603050405020304" pitchFamily="18" charset="0"/>
-            </a:endParaRPr>
+            <a:r>
+              <a:rPr lang="en-US" sz="1300" dirty="0">
+                <a:solidFill>
+                  <a:schemeClr val="accent5">
+                    <a:lumMod val="50000"/>
+                  </a:schemeClr>
+                </a:solidFill>
+                <a:latin typeface="Times New Roman" panose="02020603050405020304" pitchFamily="18" charset="0"/>
+                <a:cs typeface="Times New Roman" panose="02020603050405020304" pitchFamily="18" charset="0"/>
+              </a:rPr>
+              <a:t>Dr Miao Yu</a:t>
+            </a:r>
           </a:p>
         </p:txBody>
       </p:sp>
@@ -16665,42 +16671,6 @@
           </a:p>
         </p:txBody>
       </p:sp>
-      <p:pic>
-        <p:nvPicPr>
-          <p:cNvPr id="5" name="Picture 4" descr="Shape&#10;&#10;Description automatically generated with medium confidence">
-            <a:extLst>
-              <a:ext uri="{FF2B5EF4-FFF2-40B4-BE49-F238E27FC236}">
-                <a16:creationId xmlns:a16="http://schemas.microsoft.com/office/drawing/2014/main" id="{CCFA6539-8380-438A-837C-3D004BB68FA2}"/>
-              </a:ext>
-            </a:extLst>
-          </p:cNvPr>
-          <p:cNvPicPr>
-            <a:picLocks noChangeAspect="1"/>
-          </p:cNvPicPr>
-          <p:nvPr/>
-        </p:nvPicPr>
-        <p:blipFill>
-          <a:blip r:embed="rId3">
-            <a:extLst>
-              <a:ext uri="{28A0092B-C50C-407E-A947-70E740481C1C}">
-                <a14:useLocalDpi xmlns:a14="http://schemas.microsoft.com/office/drawing/2010/main" val="0"/>
-              </a:ext>
-            </a:extLst>
-          </a:blip>
-          <a:stretch>
-            <a:fillRect/>
-          </a:stretch>
-        </p:blipFill>
-        <p:spPr>
-          <a:xfrm>
-            <a:off x="12292012" y="4245585"/>
-            <a:ext cx="2847975" cy="752475"/>
-          </a:xfrm>
-          <a:prstGeom prst="rect">
-            <a:avLst/>
-          </a:prstGeom>
-        </p:spPr>
-      </p:pic>
       <p:sp>
         <p:nvSpPr>
           <p:cNvPr id="6" name="TextBox 5">
@@ -16715,7 +16685,7 @@
         </p:nvSpPr>
         <p:spPr>
           <a:xfrm>
-            <a:off x="12160577" y="4998060"/>
+            <a:off x="11321592" y="4998060"/>
             <a:ext cx="1131217" cy="307777"/>
           </a:xfrm>
           <a:prstGeom prst="rect">
@@ -16734,7 +16704,7 @@
                 <a:latin typeface="Times New Roman" panose="02020603050405020304" pitchFamily="18" charset="0"/>
                 <a:cs typeface="Times New Roman" panose="02020603050405020304" pitchFamily="18" charset="0"/>
               </a:rPr>
-              <a:t>Local device</a:t>
+              <a:t>client device</a:t>
             </a:r>
           </a:p>
         </p:txBody>
@@ -16753,7 +16723,7 @@
         </p:nvSpPr>
         <p:spPr>
           <a:xfrm>
-            <a:off x="13980490" y="4960735"/>
+            <a:off x="15139987" y="4998060"/>
             <a:ext cx="2318994" cy="307777"/>
           </a:xfrm>
           <a:prstGeom prst="rect">
@@ -16794,7 +16764,7 @@
         <p:spPr>
           <a:xfrm>
             <a:off x="7241978" y="5412636"/>
-            <a:ext cx="12950030" cy="1144036"/>
+            <a:ext cx="12950030" cy="1824222"/>
           </a:xfrm>
           <a:prstGeom prst="rect">
             <a:avLst/>
@@ -16954,6 +16924,94 @@
           </a:p>
           <a:p>
             <a:endParaRPr lang="en-US" sz="1300" dirty="0"/>
+          </a:p>
+          <a:p>
+            <a:r>
+              <a:rPr lang="en-US" sz="1300" dirty="0"/>
+              <a:t>To test the application 2 virtual machines were setup, one to simulate a drone with a raspberry pi and another to simulate a device sending target information to the drone. This was done via two python scripts one to act as a sender and the other, </a:t>
+            </a:r>
+            <a:r>
+              <a:rPr lang="en-US" sz="1300"/>
+              <a:t>a receiver.</a:t>
+            </a:r>
+            <a:endParaRPr lang="en-US" sz="1300" dirty="0"/>
+          </a:p>
+          <a:p>
+            <a:endParaRPr lang="en-US" sz="1300" dirty="0"/>
+          </a:p>
+        </p:txBody>
+      </p:sp>
+      <p:pic>
+        <p:nvPicPr>
+          <p:cNvPr id="3" name="Picture 2" descr="A picture containing text, projector&#10;&#10;Description automatically generated">
+            <a:extLst>
+              <a:ext uri="{FF2B5EF4-FFF2-40B4-BE49-F238E27FC236}">
+                <a16:creationId xmlns:a16="http://schemas.microsoft.com/office/drawing/2014/main" id="{CEC28516-ED79-4B4F-A602-375B280C9933}"/>
+              </a:ext>
+            </a:extLst>
+          </p:cNvPr>
+          <p:cNvPicPr>
+            <a:picLocks noChangeAspect="1"/>
+          </p:cNvPicPr>
+          <p:nvPr/>
+        </p:nvPicPr>
+        <p:blipFill>
+          <a:blip r:embed="rId3">
+            <a:extLst>
+              <a:ext uri="{28A0092B-C50C-407E-A947-70E740481C1C}">
+                <a14:useLocalDpi xmlns:a14="http://schemas.microsoft.com/office/drawing/2010/main" val="0"/>
+              </a:ext>
+            </a:extLst>
+          </a:blip>
+          <a:stretch>
+            <a:fillRect/>
+          </a:stretch>
+        </p:blipFill>
+        <p:spPr>
+          <a:xfrm>
+            <a:off x="11556377" y="4054131"/>
+            <a:ext cx="4848225" cy="771525"/>
+          </a:xfrm>
+          <a:prstGeom prst="rect">
+            <a:avLst/>
+          </a:prstGeom>
+        </p:spPr>
+      </p:pic>
+      <p:sp>
+        <p:nvSpPr>
+          <p:cNvPr id="26" name="TextBox 25">
+            <a:extLst>
+              <a:ext uri="{FF2B5EF4-FFF2-40B4-BE49-F238E27FC236}">
+                <a16:creationId xmlns:a16="http://schemas.microsoft.com/office/drawing/2014/main" id="{7C946137-7014-4A35-821E-D8626C944BF4}"/>
+              </a:ext>
+            </a:extLst>
+          </p:cNvPr>
+          <p:cNvSpPr txBox="1"/>
+          <p:nvPr/>
+        </p:nvSpPr>
+        <p:spPr>
+          <a:xfrm>
+            <a:off x="13238375" y="4998060"/>
+            <a:ext cx="1223914" cy="307777"/>
+          </a:xfrm>
+          <a:prstGeom prst="rect">
+            <a:avLst/>
+          </a:prstGeom>
+          <a:noFill/>
+        </p:spPr>
+        <p:txBody>
+          <a:bodyPr wrap="square" rtlCol="0">
+            <a:spAutoFit/>
+          </a:bodyPr>
+          <a:lstStyle/>
+          <a:p>
+            <a:r>
+              <a:rPr lang="en-GB" sz="1400" dirty="0">
+                <a:latin typeface="Times New Roman" panose="02020603050405020304" pitchFamily="18" charset="0"/>
+                <a:cs typeface="Times New Roman" panose="02020603050405020304" pitchFamily="18" charset="0"/>
+              </a:rPr>
+              <a:t>Server device</a:t>
+            </a:r>
           </a:p>
         </p:txBody>
       </p:sp>

</xml_diff>

<commit_message>
Improved the work on the poster and almost have something presentable
</commit_message>
<xml_diff>
--- a/Frontiers of Robotics Research/Project/StephenRerriBekibeleDissertationPosterPresentations-36x60-Template-Newfield.pptx
+++ b/Frontiers of Robotics Research/Project/StephenRerriBekibeleDissertationPosterPresentations-36x60-Template-Newfield.pptx
@@ -377,7 +377,7 @@
             <a:fld id="{E6CC2317-6751-4CD4-9995-8782DD78E936}" type="datetimeFigureOut">
               <a:rPr lang="en-US" smtClean="0"/>
               <a:pPr/>
-              <a:t>4/26/2022</a:t>
+              <a:t>5/10/2022</a:t>
             </a:fld>
             <a:endParaRPr lang="en-US" dirty="0"/>
           </a:p>
@@ -5620,6 +5620,16 @@
                         </a:rPr>
                         <a:t>60 inches wide</a:t>
                       </a:r>
+                      <a:r>
+                        <a:rPr lang="en-US" sz="1100" dirty="0">
+                          <a:solidFill>
+                            <a:schemeClr val="bg1"/>
+                          </a:solidFill>
+                          <a:latin typeface="Arial" panose="020B0604020202020204" pitchFamily="34" charset="0"/>
+                          <a:cs typeface="Arial" panose="020B0604020202020204" pitchFamily="34" charset="0"/>
+                        </a:rPr>
+                        <a:t/>
+                      </a:r>
                       <a:br>
                         <a:rPr lang="en-US" sz="1100" dirty="0">
                           <a:solidFill>
@@ -5674,6 +5684,16 @@
                         </a:rPr>
                         <a:t>Important: Check the template size</a:t>
                       </a:r>
+                      <a:r>
+                        <a:rPr lang="en-US" sz="1100" b="0" baseline="0" dirty="0">
+                          <a:solidFill>
+                            <a:srgbClr val="FFC000"/>
+                          </a:solidFill>
+                          <a:latin typeface="Arial" panose="020B0604020202020204" pitchFamily="34" charset="0"/>
+                          <a:cs typeface="Arial" panose="020B0604020202020204" pitchFamily="34" charset="0"/>
+                        </a:rPr>
+                        <a:t/>
+                      </a:r>
                       <a:br>
                         <a:rPr lang="en-US" sz="1100" b="0" baseline="0" dirty="0">
                           <a:solidFill>
@@ -5711,6 +5731,16 @@
                           <a:cs typeface="Arial" panose="020B0604020202020204" pitchFamily="34" charset="0"/>
                         </a:rPr>
                         <a:t>This template can also be printed at the following sizes without distortion and without any additional formatting:</a:t>
+                      </a:r>
+                      <a:r>
+                        <a:rPr lang="en-US" sz="1100" b="0" baseline="0" dirty="0">
+                          <a:solidFill>
+                            <a:srgbClr val="FFC000"/>
+                          </a:solidFill>
+                          <a:latin typeface="Arial" panose="020B0604020202020204" pitchFamily="34" charset="0"/>
+                          <a:cs typeface="Arial" panose="020B0604020202020204" pitchFamily="34" charset="0"/>
+                        </a:rPr>
+                        <a:t/>
                       </a:r>
                       <a:br>
                         <a:rPr lang="en-US" sz="1100" b="0" baseline="0" dirty="0">
@@ -5956,6 +5986,16 @@
                           <a:cs typeface="Arial" panose="020B0604020202020204" pitchFamily="34" charset="0"/>
                         </a:rPr>
                         <a:t>Ruler and Guides</a:t>
+                      </a:r>
+                      <a:r>
+                        <a:rPr lang="en-US" sz="1100" b="0" baseline="0" dirty="0">
+                          <a:solidFill>
+                            <a:srgbClr val="FFC000"/>
+                          </a:solidFill>
+                          <a:latin typeface="Arial" panose="020B0604020202020204" pitchFamily="34" charset="0"/>
+                          <a:cs typeface="Arial" panose="020B0604020202020204" pitchFamily="34" charset="0"/>
+                        </a:rPr>
+                        <a:t/>
                       </a:r>
                       <a:br>
                         <a:rPr lang="en-US" sz="1100" b="0" baseline="0" dirty="0">
@@ -6051,6 +6091,16 @@
                         </a:rPr>
                         <a:t>Headers and text containers</a:t>
                       </a:r>
+                      <a:r>
+                        <a:rPr lang="en-US" sz="1100" b="0" baseline="0" dirty="0">
+                          <a:solidFill>
+                            <a:schemeClr val="bg1"/>
+                          </a:solidFill>
+                          <a:latin typeface="Arial" panose="020B0604020202020204" pitchFamily="34" charset="0"/>
+                          <a:cs typeface="Arial" panose="020B0604020202020204" pitchFamily="34" charset="0"/>
+                        </a:rPr>
+                        <a:t/>
+                      </a:r>
                       <a:br>
                         <a:rPr lang="en-US" sz="1100" b="0" baseline="0" dirty="0">
                           <a:solidFill>
@@ -6070,6 +6120,16 @@
                         </a:rPr>
                         <a:t>Included in this template are commonly used section headers such as Abstract, Objectives, Methods, Results, etc. </a:t>
                       </a:r>
+                      <a:r>
+                        <a:rPr lang="en-US" sz="1100" b="0" baseline="0" dirty="0">
+                          <a:solidFill>
+                            <a:schemeClr val="bg1"/>
+                          </a:solidFill>
+                          <a:latin typeface="Arial" panose="020B0604020202020204" pitchFamily="34" charset="0"/>
+                          <a:cs typeface="Arial" panose="020B0604020202020204" pitchFamily="34" charset="0"/>
+                        </a:rPr>
+                        <a:t/>
+                      </a:r>
                       <a:br>
                         <a:rPr lang="en-US" sz="1100" b="0" baseline="0" dirty="0">
                           <a:solidFill>
@@ -6109,6 +6169,16 @@
                         </a:rPr>
                         <a:t>Click inside a section header to add its text. </a:t>
                       </a:r>
+                      <a:r>
+                        <a:rPr lang="en-US" sz="1100" b="0" baseline="0" dirty="0">
+                          <a:solidFill>
+                            <a:schemeClr val="bg1"/>
+                          </a:solidFill>
+                          <a:latin typeface="Arial" panose="020B0604020202020204" pitchFamily="34" charset="0"/>
+                          <a:cs typeface="Arial" panose="020B0604020202020204" pitchFamily="34" charset="0"/>
+                        </a:rPr>
+                        <a:t/>
+                      </a:r>
                       <a:br>
                         <a:rPr lang="en-US" sz="1100" b="0" baseline="0" dirty="0">
                           <a:solidFill>
@@ -6147,6 +6217,16 @@
                           <a:cs typeface="Arial" panose="020B0604020202020204" pitchFamily="34" charset="0"/>
                         </a:rPr>
                         <a:t>To add another header, click on edge of the section box so that it is outlined. Copy and paste it. </a:t>
+                      </a:r>
+                      <a:r>
+                        <a:rPr lang="en-US" sz="1100" b="0" baseline="0" dirty="0">
+                          <a:solidFill>
+                            <a:schemeClr val="bg1"/>
+                          </a:solidFill>
+                          <a:latin typeface="Arial" panose="020B0604020202020204" pitchFamily="34" charset="0"/>
+                          <a:cs typeface="Arial" panose="020B0604020202020204" pitchFamily="34" charset="0"/>
+                        </a:rPr>
+                        <a:t/>
                       </a:r>
                       <a:br>
                         <a:rPr lang="en-US" sz="1100" b="0" baseline="0" dirty="0">
@@ -6764,7 +6844,7 @@
                           <a:hlinkClick r:id="rId7">
                             <a:extLst>
                               <a:ext uri="{A12FA001-AC4F-418D-AE19-62706E023703}">
-                                <ahyp:hlinkClr xmlns:ahyp="http://schemas.microsoft.com/office/drawing/2018/hyperlinkcolor" val="tx"/>
+                                <ahyp:hlinkClr xmlns:ahyp="http://schemas.microsoft.com/office/drawing/2018/hyperlinkcolor" xmlns="" val="tx"/>
                               </a:ext>
                             </a:extLst>
                           </a:hlinkClick>
@@ -7703,6 +7783,16 @@
                         <a:tabLst/>
                         <a:defRPr/>
                       </a:pPr>
+                      <a:r>
+                        <a:rPr lang="en-US" sz="1200" noProof="0" dirty="0">
+                          <a:solidFill>
+                            <a:srgbClr val="D9D9D9"/>
+                          </a:solidFill>
+                          <a:latin typeface="Arial"/>
+                          <a:cs typeface="Arial"/>
+                        </a:rPr>
+                        <a:t/>
+                      </a:r>
                       <a:br>
                         <a:rPr lang="en-US" sz="1200" noProof="0" dirty="0">
                           <a:solidFill>
@@ -7857,6 +7947,18 @@
                           <a:cs typeface="Arial"/>
                         </a:rPr>
                         <a:t>PosterPresentations.com</a:t>
+                      </a:r>
+                      <a:r>
+                        <a:rPr lang="en-US" sz="1100" dirty="0">
+                          <a:solidFill>
+                            <a:schemeClr val="bg1">
+                              <a:lumMod val="85000"/>
+                            </a:schemeClr>
+                          </a:solidFill>
+                          <a:latin typeface="Arial"/>
+                          <a:cs typeface="Arial"/>
+                        </a:rPr>
+                        <a:t/>
                       </a:r>
                       <a:br>
                         <a:rPr lang="en-US" sz="1100" dirty="0">
@@ -9853,6 +9955,16 @@
                         </a:rPr>
                         <a:t>60 inches wide</a:t>
                       </a:r>
+                      <a:r>
+                        <a:rPr lang="en-US" sz="1100" dirty="0">
+                          <a:solidFill>
+                            <a:schemeClr val="bg1"/>
+                          </a:solidFill>
+                          <a:latin typeface="Arial" panose="020B0604020202020204" pitchFamily="34" charset="0"/>
+                          <a:cs typeface="Arial" panose="020B0604020202020204" pitchFamily="34" charset="0"/>
+                        </a:rPr>
+                        <a:t/>
+                      </a:r>
                       <a:br>
                         <a:rPr lang="en-US" sz="1100" dirty="0">
                           <a:solidFill>
@@ -9907,6 +10019,16 @@
                         </a:rPr>
                         <a:t>Important: Check the template size</a:t>
                       </a:r>
+                      <a:r>
+                        <a:rPr lang="en-US" sz="1100" b="0" baseline="0" dirty="0">
+                          <a:solidFill>
+                            <a:srgbClr val="FFC000"/>
+                          </a:solidFill>
+                          <a:latin typeface="Arial" panose="020B0604020202020204" pitchFamily="34" charset="0"/>
+                          <a:cs typeface="Arial" panose="020B0604020202020204" pitchFamily="34" charset="0"/>
+                        </a:rPr>
+                        <a:t/>
+                      </a:r>
                       <a:br>
                         <a:rPr lang="en-US" sz="1100" b="0" baseline="0" dirty="0">
                           <a:solidFill>
@@ -9944,6 +10066,16 @@
                           <a:cs typeface="Arial" panose="020B0604020202020204" pitchFamily="34" charset="0"/>
                         </a:rPr>
                         <a:t>This template can also be printed at the following sizes without distortion and without any additional formatting:</a:t>
+                      </a:r>
+                      <a:r>
+                        <a:rPr lang="en-US" sz="1100" b="0" baseline="0" dirty="0">
+                          <a:solidFill>
+                            <a:srgbClr val="FFC000"/>
+                          </a:solidFill>
+                          <a:latin typeface="Arial" panose="020B0604020202020204" pitchFamily="34" charset="0"/>
+                          <a:cs typeface="Arial" panose="020B0604020202020204" pitchFamily="34" charset="0"/>
+                        </a:rPr>
+                        <a:t/>
                       </a:r>
                       <a:br>
                         <a:rPr lang="en-US" sz="1100" b="0" baseline="0" dirty="0">
@@ -10189,6 +10321,16 @@
                           <a:cs typeface="Arial" panose="020B0604020202020204" pitchFamily="34" charset="0"/>
                         </a:rPr>
                         <a:t>Ruler and Guides</a:t>
+                      </a:r>
+                      <a:r>
+                        <a:rPr lang="en-US" sz="1100" b="0" baseline="0" dirty="0">
+                          <a:solidFill>
+                            <a:srgbClr val="FFC000"/>
+                          </a:solidFill>
+                          <a:latin typeface="Arial" panose="020B0604020202020204" pitchFamily="34" charset="0"/>
+                          <a:cs typeface="Arial" panose="020B0604020202020204" pitchFamily="34" charset="0"/>
+                        </a:rPr>
+                        <a:t/>
                       </a:r>
                       <a:br>
                         <a:rPr lang="en-US" sz="1100" b="0" baseline="0" dirty="0">
@@ -10284,6 +10426,16 @@
                         </a:rPr>
                         <a:t>Headers and text containers</a:t>
                       </a:r>
+                      <a:r>
+                        <a:rPr lang="en-US" sz="1100" b="0" baseline="0" dirty="0">
+                          <a:solidFill>
+                            <a:schemeClr val="bg1"/>
+                          </a:solidFill>
+                          <a:latin typeface="Arial" panose="020B0604020202020204" pitchFamily="34" charset="0"/>
+                          <a:cs typeface="Arial" panose="020B0604020202020204" pitchFamily="34" charset="0"/>
+                        </a:rPr>
+                        <a:t/>
+                      </a:r>
                       <a:br>
                         <a:rPr lang="en-US" sz="1100" b="0" baseline="0" dirty="0">
                           <a:solidFill>
@@ -10303,6 +10455,16 @@
                         </a:rPr>
                         <a:t>Included in this template are commonly used section headers such as Abstract, Objectives, Methods, Results, etc. </a:t>
                       </a:r>
+                      <a:r>
+                        <a:rPr lang="en-US" sz="1100" b="0" baseline="0" dirty="0">
+                          <a:solidFill>
+                            <a:schemeClr val="bg1"/>
+                          </a:solidFill>
+                          <a:latin typeface="Arial" panose="020B0604020202020204" pitchFamily="34" charset="0"/>
+                          <a:cs typeface="Arial" panose="020B0604020202020204" pitchFamily="34" charset="0"/>
+                        </a:rPr>
+                        <a:t/>
+                      </a:r>
                       <a:br>
                         <a:rPr lang="en-US" sz="1100" b="0" baseline="0" dirty="0">
                           <a:solidFill>
@@ -10342,6 +10504,16 @@
                         </a:rPr>
                         <a:t>Click inside a section header to add its text. </a:t>
                       </a:r>
+                      <a:r>
+                        <a:rPr lang="en-US" sz="1100" b="0" baseline="0" dirty="0">
+                          <a:solidFill>
+                            <a:schemeClr val="bg1"/>
+                          </a:solidFill>
+                          <a:latin typeface="Arial" panose="020B0604020202020204" pitchFamily="34" charset="0"/>
+                          <a:cs typeface="Arial" panose="020B0604020202020204" pitchFamily="34" charset="0"/>
+                        </a:rPr>
+                        <a:t/>
+                      </a:r>
                       <a:br>
                         <a:rPr lang="en-US" sz="1100" b="0" baseline="0" dirty="0">
                           <a:solidFill>
@@ -10380,6 +10552,16 @@
                           <a:cs typeface="Arial" panose="020B0604020202020204" pitchFamily="34" charset="0"/>
                         </a:rPr>
                         <a:t>To add another header, click on edge of the section box so that it is outlined. Copy and paste it. </a:t>
+                      </a:r>
+                      <a:r>
+                        <a:rPr lang="en-US" sz="1100" b="0" baseline="0" dirty="0">
+                          <a:solidFill>
+                            <a:schemeClr val="bg1"/>
+                          </a:solidFill>
+                          <a:latin typeface="Arial" panose="020B0604020202020204" pitchFamily="34" charset="0"/>
+                          <a:cs typeface="Arial" panose="020B0604020202020204" pitchFamily="34" charset="0"/>
+                        </a:rPr>
+                        <a:t/>
                       </a:r>
                       <a:br>
                         <a:rPr lang="en-US" sz="1100" b="0" baseline="0" dirty="0">
@@ -10997,7 +11179,7 @@
                           <a:hlinkClick r:id="rId7">
                             <a:extLst>
                               <a:ext uri="{A12FA001-AC4F-418D-AE19-62706E023703}">
-                                <ahyp:hlinkClr xmlns:ahyp="http://schemas.microsoft.com/office/drawing/2018/hyperlinkcolor" val="tx"/>
+                                <ahyp:hlinkClr xmlns:ahyp="http://schemas.microsoft.com/office/drawing/2018/hyperlinkcolor" xmlns="" val="tx"/>
                               </a:ext>
                             </a:extLst>
                           </a:hlinkClick>
@@ -11936,6 +12118,16 @@
                         <a:tabLst/>
                         <a:defRPr/>
                       </a:pPr>
+                      <a:r>
+                        <a:rPr lang="en-US" sz="1200" noProof="0" dirty="0">
+                          <a:solidFill>
+                            <a:srgbClr val="D9D9D9"/>
+                          </a:solidFill>
+                          <a:latin typeface="Arial"/>
+                          <a:cs typeface="Arial"/>
+                        </a:rPr>
+                        <a:t/>
+                      </a:r>
                       <a:br>
                         <a:rPr lang="en-US" sz="1200" noProof="0" dirty="0">
                           <a:solidFill>
@@ -12090,6 +12282,18 @@
                           <a:cs typeface="Arial"/>
                         </a:rPr>
                         <a:t>PosterPresentations.com</a:t>
+                      </a:r>
+                      <a:r>
+                        <a:rPr lang="en-US" sz="1100" dirty="0">
+                          <a:solidFill>
+                            <a:schemeClr val="bg1">
+                              <a:lumMod val="85000"/>
+                            </a:schemeClr>
+                          </a:solidFill>
+                          <a:latin typeface="Arial"/>
+                          <a:cs typeface="Arial"/>
+                        </a:rPr>
+                        <a:t/>
                       </a:r>
                       <a:br>
                         <a:rPr lang="en-US" sz="1100" dirty="0">
@@ -13375,6 +13579,16 @@
                         </a:rPr>
                         <a:t>60 inches wide</a:t>
                       </a:r>
+                      <a:r>
+                        <a:rPr lang="en-US" sz="1100" dirty="0">
+                          <a:solidFill>
+                            <a:schemeClr val="bg1"/>
+                          </a:solidFill>
+                          <a:latin typeface="Arial" panose="020B0604020202020204" pitchFamily="34" charset="0"/>
+                          <a:cs typeface="Arial" panose="020B0604020202020204" pitchFamily="34" charset="0"/>
+                        </a:rPr>
+                        <a:t/>
+                      </a:r>
                       <a:br>
                         <a:rPr lang="en-US" sz="1100" dirty="0">
                           <a:solidFill>
@@ -13429,6 +13643,16 @@
                         </a:rPr>
                         <a:t>Important: Check the template size</a:t>
                       </a:r>
+                      <a:r>
+                        <a:rPr lang="en-US" sz="1100" b="0" baseline="0" dirty="0">
+                          <a:solidFill>
+                            <a:srgbClr val="FFC000"/>
+                          </a:solidFill>
+                          <a:latin typeface="Arial" panose="020B0604020202020204" pitchFamily="34" charset="0"/>
+                          <a:cs typeface="Arial" panose="020B0604020202020204" pitchFamily="34" charset="0"/>
+                        </a:rPr>
+                        <a:t/>
+                      </a:r>
                       <a:br>
                         <a:rPr lang="en-US" sz="1100" b="0" baseline="0" dirty="0">
                           <a:solidFill>
@@ -13466,6 +13690,16 @@
                           <a:cs typeface="Arial" panose="020B0604020202020204" pitchFamily="34" charset="0"/>
                         </a:rPr>
                         <a:t>This template can also be printed at the following sizes without distortion and without any additional formatting:</a:t>
+                      </a:r>
+                      <a:r>
+                        <a:rPr lang="en-US" sz="1100" b="0" baseline="0" dirty="0">
+                          <a:solidFill>
+                            <a:srgbClr val="FFC000"/>
+                          </a:solidFill>
+                          <a:latin typeface="Arial" panose="020B0604020202020204" pitchFamily="34" charset="0"/>
+                          <a:cs typeface="Arial" panose="020B0604020202020204" pitchFamily="34" charset="0"/>
+                        </a:rPr>
+                        <a:t/>
                       </a:r>
                       <a:br>
                         <a:rPr lang="en-US" sz="1100" b="0" baseline="0" dirty="0">
@@ -13711,6 +13945,16 @@
                           <a:cs typeface="Arial" panose="020B0604020202020204" pitchFamily="34" charset="0"/>
                         </a:rPr>
                         <a:t>Ruler and Guides</a:t>
+                      </a:r>
+                      <a:r>
+                        <a:rPr lang="en-US" sz="1100" b="0" baseline="0" dirty="0">
+                          <a:solidFill>
+                            <a:srgbClr val="FFC000"/>
+                          </a:solidFill>
+                          <a:latin typeface="Arial" panose="020B0604020202020204" pitchFamily="34" charset="0"/>
+                          <a:cs typeface="Arial" panose="020B0604020202020204" pitchFamily="34" charset="0"/>
+                        </a:rPr>
+                        <a:t/>
                       </a:r>
                       <a:br>
                         <a:rPr lang="en-US" sz="1100" b="0" baseline="0" dirty="0">
@@ -13806,6 +14050,16 @@
                         </a:rPr>
                         <a:t>Headers and text containers</a:t>
                       </a:r>
+                      <a:r>
+                        <a:rPr lang="en-US" sz="1100" b="0" baseline="0" dirty="0">
+                          <a:solidFill>
+                            <a:schemeClr val="bg1"/>
+                          </a:solidFill>
+                          <a:latin typeface="Arial" panose="020B0604020202020204" pitchFamily="34" charset="0"/>
+                          <a:cs typeface="Arial" panose="020B0604020202020204" pitchFamily="34" charset="0"/>
+                        </a:rPr>
+                        <a:t/>
+                      </a:r>
                       <a:br>
                         <a:rPr lang="en-US" sz="1100" b="0" baseline="0" dirty="0">
                           <a:solidFill>
@@ -13825,6 +14079,16 @@
                         </a:rPr>
                         <a:t>Included in this template are commonly used section headers such as Abstract, Objectives, Methods, Results, etc. </a:t>
                       </a:r>
+                      <a:r>
+                        <a:rPr lang="en-US" sz="1100" b="0" baseline="0" dirty="0">
+                          <a:solidFill>
+                            <a:schemeClr val="bg1"/>
+                          </a:solidFill>
+                          <a:latin typeface="Arial" panose="020B0604020202020204" pitchFamily="34" charset="0"/>
+                          <a:cs typeface="Arial" panose="020B0604020202020204" pitchFamily="34" charset="0"/>
+                        </a:rPr>
+                        <a:t/>
+                      </a:r>
                       <a:br>
                         <a:rPr lang="en-US" sz="1100" b="0" baseline="0" dirty="0">
                           <a:solidFill>
@@ -13864,6 +14128,16 @@
                         </a:rPr>
                         <a:t>Click inside a section header to add its text. </a:t>
                       </a:r>
+                      <a:r>
+                        <a:rPr lang="en-US" sz="1100" b="0" baseline="0" dirty="0">
+                          <a:solidFill>
+                            <a:schemeClr val="bg1"/>
+                          </a:solidFill>
+                          <a:latin typeface="Arial" panose="020B0604020202020204" pitchFamily="34" charset="0"/>
+                          <a:cs typeface="Arial" panose="020B0604020202020204" pitchFamily="34" charset="0"/>
+                        </a:rPr>
+                        <a:t/>
+                      </a:r>
                       <a:br>
                         <a:rPr lang="en-US" sz="1100" b="0" baseline="0" dirty="0">
                           <a:solidFill>
@@ -13902,6 +14176,16 @@
                           <a:cs typeface="Arial" panose="020B0604020202020204" pitchFamily="34" charset="0"/>
                         </a:rPr>
                         <a:t>To add another header, click on edge of the section box so that it is outlined. Copy and paste it. </a:t>
+                      </a:r>
+                      <a:r>
+                        <a:rPr lang="en-US" sz="1100" b="0" baseline="0" dirty="0">
+                          <a:solidFill>
+                            <a:schemeClr val="bg1"/>
+                          </a:solidFill>
+                          <a:latin typeface="Arial" panose="020B0604020202020204" pitchFamily="34" charset="0"/>
+                          <a:cs typeface="Arial" panose="020B0604020202020204" pitchFamily="34" charset="0"/>
+                        </a:rPr>
+                        <a:t/>
                       </a:r>
                       <a:br>
                         <a:rPr lang="en-US" sz="1100" b="0" baseline="0" dirty="0">
@@ -14519,7 +14803,7 @@
                           <a:hlinkClick r:id="rId7">
                             <a:extLst>
                               <a:ext uri="{A12FA001-AC4F-418D-AE19-62706E023703}">
-                                <ahyp:hlinkClr xmlns:ahyp="http://schemas.microsoft.com/office/drawing/2018/hyperlinkcolor" val="tx"/>
+                                <ahyp:hlinkClr xmlns:ahyp="http://schemas.microsoft.com/office/drawing/2018/hyperlinkcolor" xmlns="" val="tx"/>
                               </a:ext>
                             </a:extLst>
                           </a:hlinkClick>
@@ -15458,6 +15742,16 @@
                         <a:tabLst/>
                         <a:defRPr/>
                       </a:pPr>
+                      <a:r>
+                        <a:rPr lang="en-US" sz="1200" noProof="0" dirty="0">
+                          <a:solidFill>
+                            <a:srgbClr val="D9D9D9"/>
+                          </a:solidFill>
+                          <a:latin typeface="Arial"/>
+                          <a:cs typeface="Arial"/>
+                        </a:rPr>
+                        <a:t/>
+                      </a:r>
                       <a:br>
                         <a:rPr lang="en-US" sz="1200" noProof="0" dirty="0">
                           <a:solidFill>
@@ -15612,6 +15906,18 @@
                           <a:cs typeface="Arial"/>
                         </a:rPr>
                         <a:t>PosterPresentations.com</a:t>
+                      </a:r>
+                      <a:r>
+                        <a:rPr lang="en-US" sz="1100" dirty="0">
+                          <a:solidFill>
+                            <a:schemeClr val="bg1">
+                              <a:lumMod val="85000"/>
+                            </a:schemeClr>
+                          </a:solidFill>
+                          <a:latin typeface="Arial"/>
+                          <a:cs typeface="Arial"/>
+                        </a:rPr>
+                        <a:t/>
                       </a:r>
                       <a:br>
                         <a:rPr lang="en-US" sz="1100" dirty="0">
@@ -16182,8 +16488,8 @@
         </p:nvSpPr>
         <p:spPr>
           <a:xfrm>
-            <a:off x="567812" y="7540814"/>
-            <a:ext cx="6286500" cy="463850"/>
+            <a:off x="570789" y="6457886"/>
+            <a:ext cx="6286500" cy="3184595"/>
           </a:xfrm>
         </p:spPr>
         <p:txBody>
@@ -16197,11 +16503,72 @@
                     <a:lumMod val="50000"/>
                   </a:schemeClr>
                 </a:solidFill>
-                <a:latin typeface="Times New Roman" panose="02020603050405020304" pitchFamily="18" charset="0"/>
-                <a:cs typeface="Times New Roman" panose="02020603050405020304" pitchFamily="18" charset="0"/>
               </a:rPr>
-              <a:t>Implement infrastructure for sending data to drone for facial recognition over internet.</a:t>
+              <a:t>Implement infrastructure for sending data to drone for facial recognition over internet</a:t>
             </a:r>
+            <a:r>
+              <a:rPr lang="en-US" sz="1300" dirty="0" smtClean="0">
+                <a:solidFill>
+                  <a:schemeClr val="accent5">
+                    <a:lumMod val="50000"/>
+                  </a:schemeClr>
+                </a:solidFill>
+              </a:rPr>
+              <a:t>.</a:t>
+            </a:r>
+          </a:p>
+          <a:p>
+            <a:r>
+              <a:rPr lang="en-GB" sz="1300" dirty="0"/>
+              <a:t>The objectives of my project is to:</a:t>
+            </a:r>
+          </a:p>
+          <a:p>
+            <a:r>
+              <a:rPr lang="en-GB" sz="1300" dirty="0"/>
+              <a:t>Create a solid and secure infrastructure for the communication of personal data to a remote server.</a:t>
+            </a:r>
+          </a:p>
+          <a:p>
+            <a:r>
+              <a:rPr lang="en-GB" sz="1300" dirty="0"/>
+              <a:t>To build a system that can receive images and act based on the received images during a live video feed</a:t>
+            </a:r>
+          </a:p>
+          <a:p>
+            <a:r>
+              <a:rPr lang="en-GB" sz="1300" dirty="0"/>
+              <a:t>To safely navigate to an individual in a crowded place</a:t>
+            </a:r>
+          </a:p>
+          <a:p>
+            <a:r>
+              <a:rPr lang="en-GB" sz="1300" dirty="0"/>
+              <a:t>To accurately navigate to the correct individual in a crowded place</a:t>
+            </a:r>
+          </a:p>
+          <a:p>
+            <a:r>
+              <a:rPr lang="en-GB" sz="1300" dirty="0"/>
+              <a:t>For the drone to be able to learn the best heights to be at for and accurate monitoring of a target.</a:t>
+            </a:r>
+          </a:p>
+          <a:p>
+            <a:r>
+              <a:rPr lang="en-GB" sz="1300" dirty="0"/>
+              <a:t>To introduce a novel and appropriate use of drone and facial recognition technology for the aid of government and corporation operations.</a:t>
+            </a:r>
+          </a:p>
+          <a:p>
+            <a:endParaRPr lang="en-US" sz="1300" dirty="0">
+              <a:solidFill>
+                <a:schemeClr val="accent5">
+                  <a:lumMod val="50000"/>
+                </a:schemeClr>
+              </a:solidFill>
+              <a:latin typeface="Times New Roman" panose="02020603050405020304" pitchFamily="18" charset="0"/>
+              <a:cs typeface="Times New Roman" panose="02020603050405020304" pitchFamily="18" charset="0"/>
+            </a:endParaRPr>
           </a:p>
         </p:txBody>
       </p:sp>
@@ -16215,12 +16582,29 @@
             <p:ph type="body" sz="quarter" idx="20"/>
           </p:nvPr>
         </p:nvSpPr>
-        <p:spPr/>
+        <p:spPr>
+          <a:xfrm>
+            <a:off x="570293" y="6116831"/>
+            <a:ext cx="6281539" cy="428684"/>
+          </a:xfrm>
+        </p:spPr>
         <p:txBody>
           <a:bodyPr/>
           <a:lstStyle/>
           <a:p>
-            <a:endParaRPr lang="en-US"/>
+            <a:r>
+              <a:rPr lang="en-US" dirty="0" smtClean="0"/>
+              <a:t>Aims </a:t>
+            </a:r>
+            <a:r>
+              <a:rPr lang="en-US" dirty="0" smtClean="0"/>
+              <a:t>&amp; </a:t>
+            </a:r>
+            <a:r>
+              <a:rPr lang="en-US" dirty="0" smtClean="0"/>
+              <a:t>Objectives</a:t>
+            </a:r>
+            <a:endParaRPr lang="en-US" dirty="0"/>
           </a:p>
         </p:txBody>
       </p:sp>
@@ -16362,7 +16746,11 @@
           <a:bodyPr/>
           <a:lstStyle/>
           <a:p>
-            <a:endParaRPr lang="en-US"/>
+            <a:r>
+              <a:rPr lang="en-US" dirty="0" smtClean="0"/>
+              <a:t>Research Plan</a:t>
+            </a:r>
+            <a:endParaRPr lang="en-US" dirty="0"/>
           </a:p>
         </p:txBody>
       </p:sp>
@@ -16378,15 +16766,15 @@
         </p:nvSpPr>
         <p:spPr>
           <a:xfrm>
-            <a:off x="7241977" y="10987984"/>
-            <a:ext cx="12950031" cy="463850"/>
+            <a:off x="7241977" y="10786628"/>
+            <a:ext cx="12950031" cy="5672571"/>
           </a:xfrm>
         </p:spPr>
         <p:txBody>
           <a:bodyPr/>
           <a:lstStyle/>
           <a:p>
-            <a:endParaRPr lang="en-US" sz="1300">
+            <a:endParaRPr lang="en-US" sz="1300" dirty="0">
               <a:solidFill>
                 <a:schemeClr val="accent5">
                   <a:lumMod val="50000"/>
@@ -16408,12 +16796,21 @@
             <p:ph type="body" sz="quarter" idx="24"/>
           </p:nvPr>
         </p:nvSpPr>
-        <p:spPr/>
+        <p:spPr>
+          <a:xfrm>
+            <a:off x="7240984" y="10406462"/>
+            <a:ext cx="12950031" cy="428684"/>
+          </a:xfrm>
+        </p:spPr>
         <p:txBody>
           <a:bodyPr/>
           <a:lstStyle/>
           <a:p>
-            <a:endParaRPr lang="en-US"/>
+            <a:r>
+              <a:rPr lang="en-US" dirty="0" smtClean="0"/>
+              <a:t>Research Results</a:t>
+            </a:r>
+            <a:endParaRPr lang="en-US" dirty="0"/>
           </a:p>
         </p:txBody>
       </p:sp>
@@ -16427,12 +16824,21 @@
             <p:ph type="body" sz="quarter" idx="25"/>
           </p:nvPr>
         </p:nvSpPr>
-        <p:spPr/>
+        <p:spPr>
+          <a:xfrm>
+            <a:off x="20629945" y="8805781"/>
+            <a:ext cx="6279386" cy="428684"/>
+          </a:xfrm>
+        </p:spPr>
         <p:txBody>
           <a:bodyPr/>
           <a:lstStyle/>
           <a:p>
-            <a:endParaRPr lang="en-US"/>
+            <a:r>
+              <a:rPr lang="en-US" dirty="0" smtClean="0"/>
+              <a:t>Conclusions</a:t>
+            </a:r>
+            <a:endParaRPr lang="en-US" dirty="0"/>
           </a:p>
         </p:txBody>
       </p:sp>
@@ -16448,13 +16854,38 @@
         </p:nvSpPr>
         <p:spPr>
           <a:xfrm>
-            <a:off x="20600583" y="3083481"/>
-            <a:ext cx="6279386" cy="463850"/>
+            <a:off x="20578102" y="9199341"/>
+            <a:ext cx="6279386" cy="3649337"/>
           </a:xfrm>
         </p:spPr>
         <p:txBody>
           <a:bodyPr/>
           <a:lstStyle/>
+          <a:p>
+            <a:r>
+              <a:rPr lang="en-GB" dirty="0"/>
+              <a:t>In conclusion the project has demonstrated that facial recognition for use on drones is very reliable and accurate but when used on drones various constraints have to be considered for the drone’s camera to operate as well as a camera in an isolated environment such as the optimal height of the drone and angle of the camera for accurately detecting the faces of people</a:t>
+            </a:r>
+            <a:r>
+              <a:rPr lang="en-GB" dirty="0" smtClean="0"/>
+              <a:t>.</a:t>
+            </a:r>
+          </a:p>
+          <a:p>
+            <a:endParaRPr lang="en-GB" dirty="0"/>
+          </a:p>
+          <a:p>
+            <a:r>
+              <a:rPr lang="en-GB" dirty="0"/>
+              <a:t>In addition, the project also highlighted the dangers of drone usage for surveillance and the vulnerability of drones for surveillance operating at street level making them conspicuous and thus unable to be applied as a means of covert surveillance unlike UAVs to some degree due to the abilities to operate at higher altitudes and safe from target retaliation such as people trying to shoot them down.</a:t>
+            </a:r>
+          </a:p>
+          <a:p>
+            <a:r>
+              <a:rPr lang="en-GB" dirty="0"/>
+              <a:t>Furthermore, the drones can be limited by how long they can operate for and the conditions they can be applied in due to their small sizes making them susceptible to the wind and small battery capacity.</a:t>
+            </a:r>
+          </a:p>
           <a:p>
             <a:endParaRPr lang="en-US" sz="1300" dirty="0">
               <a:solidFill>
@@ -16478,12 +16909,17 @@
             <p:ph type="body" sz="quarter" idx="27"/>
           </p:nvPr>
         </p:nvSpPr>
-        <p:spPr/>
+        <p:spPr>
+          <a:xfrm>
+            <a:off x="20629945" y="12768866"/>
+            <a:ext cx="6279386" cy="428684"/>
+          </a:xfrm>
+        </p:spPr>
         <p:txBody>
           <a:bodyPr/>
           <a:lstStyle/>
           <a:p>
-            <a:endParaRPr lang="en-US"/>
+            <a:endParaRPr lang="en-US" dirty="0"/>
           </a:p>
         </p:txBody>
       </p:sp>
@@ -16499,14 +16935,56 @@
         </p:nvSpPr>
         <p:spPr>
           <a:xfrm>
-            <a:off x="20599011" y="7586980"/>
-            <a:ext cx="6282531" cy="463850"/>
+            <a:off x="20626800" y="13392313"/>
+            <a:ext cx="6282531" cy="1888855"/>
           </a:xfrm>
         </p:spPr>
         <p:txBody>
           <a:bodyPr/>
           <a:lstStyle/>
           <a:p>
+            <a:r>
+              <a:rPr lang="en-GB" dirty="0" smtClean="0"/>
+              <a:t>A webpage comparing an explaining the best face recognition models and their performance:</a:t>
+            </a:r>
+          </a:p>
+          <a:p>
+            <a:r>
+              <a:rPr lang="en-GB" u="sng" dirty="0">
+                <a:hlinkClick r:id="rId3"/>
+              </a:rPr>
+              <a:t>https://</a:t>
+            </a:r>
+            <a:r>
+              <a:rPr lang="en-GB" u="sng" dirty="0" smtClean="0">
+                <a:hlinkClick r:id="rId3"/>
+              </a:rPr>
+              <a:t>rupeshthetech.medium.com/face-detection-models-and-their-performance-comparison-eb8da55f328c</a:t>
+            </a:r>
+            <a:endParaRPr lang="en-GB" u="sng" dirty="0" smtClean="0"/>
+          </a:p>
+          <a:p>
+            <a:endParaRPr lang="en-GB" sz="1300" u="sng" dirty="0">
+              <a:solidFill>
+                <a:schemeClr val="accent5">
+                  <a:lumMod val="50000"/>
+                </a:schemeClr>
+              </a:solidFill>
+              <a:latin typeface="Times New Roman" panose="02020603050405020304" pitchFamily="18" charset="0"/>
+              <a:cs typeface="Times New Roman" panose="02020603050405020304" pitchFamily="18" charset="0"/>
+            </a:endParaRPr>
+          </a:p>
+          <a:p>
+            <a:r>
+              <a:rPr lang="en-GB" sz="1300" u="sng" dirty="0" smtClean="0"/>
+              <a:t>Labelled Faces in the wild:</a:t>
+            </a:r>
+          </a:p>
+          <a:p>
+            <a:r>
+              <a:rPr lang="en-US" sz="1300" dirty="0"/>
+              <a:t>http://vis-www.cs.umass.edu/lfw/results.html</a:t>
+            </a:r>
             <a:endParaRPr lang="en-US" sz="1300" dirty="0">
               <a:solidFill>
                 <a:schemeClr val="accent5">
@@ -16529,12 +17007,21 @@
             <p:ph type="body" sz="quarter" idx="29"/>
           </p:nvPr>
         </p:nvSpPr>
-        <p:spPr/>
+        <p:spPr>
+          <a:xfrm>
+            <a:off x="20579674" y="15210368"/>
+            <a:ext cx="6279386" cy="428684"/>
+          </a:xfrm>
+        </p:spPr>
         <p:txBody>
           <a:bodyPr/>
           <a:lstStyle/>
           <a:p>
-            <a:endParaRPr lang="en-US"/>
+            <a:r>
+              <a:rPr lang="en-US" dirty="0" smtClean="0"/>
+              <a:t>Acknowledgements</a:t>
+            </a:r>
+            <a:endParaRPr lang="en-US" dirty="0"/>
           </a:p>
         </p:txBody>
       </p:sp>
@@ -16550,7 +17037,7 @@
         </p:nvSpPr>
         <p:spPr>
           <a:xfrm>
-            <a:off x="20599011" y="13290312"/>
+            <a:off x="20629945" y="15639052"/>
             <a:ext cx="6282531" cy="463850"/>
           </a:xfrm>
         </p:spPr>
@@ -16673,82 +17160,6 @@
       </p:sp>
       <p:sp>
         <p:nvSpPr>
-          <p:cNvPr id="6" name="TextBox 5">
-            <a:extLst>
-              <a:ext uri="{FF2B5EF4-FFF2-40B4-BE49-F238E27FC236}">
-                <a16:creationId xmlns:a16="http://schemas.microsoft.com/office/drawing/2014/main" id="{DA3C6EF3-84DD-4CE4-B27B-DE0877A596AB}"/>
-              </a:ext>
-            </a:extLst>
-          </p:cNvPr>
-          <p:cNvSpPr txBox="1"/>
-          <p:nvPr/>
-        </p:nvSpPr>
-        <p:spPr>
-          <a:xfrm>
-            <a:off x="11321592" y="4998060"/>
-            <a:ext cx="1131217" cy="307777"/>
-          </a:xfrm>
-          <a:prstGeom prst="rect">
-            <a:avLst/>
-          </a:prstGeom>
-          <a:noFill/>
-        </p:spPr>
-        <p:txBody>
-          <a:bodyPr wrap="square" rtlCol="0">
-            <a:spAutoFit/>
-          </a:bodyPr>
-          <a:lstStyle/>
-          <a:p>
-            <a:r>
-              <a:rPr lang="en-GB" sz="1400" dirty="0">
-                <a:latin typeface="Times New Roman" panose="02020603050405020304" pitchFamily="18" charset="0"/>
-                <a:cs typeface="Times New Roman" panose="02020603050405020304" pitchFamily="18" charset="0"/>
-              </a:rPr>
-              <a:t>client device</a:t>
-            </a:r>
-          </a:p>
-        </p:txBody>
-      </p:sp>
-      <p:sp>
-        <p:nvSpPr>
-          <p:cNvPr id="24" name="TextBox 23">
-            <a:extLst>
-              <a:ext uri="{FF2B5EF4-FFF2-40B4-BE49-F238E27FC236}">
-                <a16:creationId xmlns:a16="http://schemas.microsoft.com/office/drawing/2014/main" id="{5A2E20D0-8CA6-4414-9510-79245AE59CED}"/>
-              </a:ext>
-            </a:extLst>
-          </p:cNvPr>
-          <p:cNvSpPr txBox="1"/>
-          <p:nvPr/>
-        </p:nvSpPr>
-        <p:spPr>
-          <a:xfrm>
-            <a:off x="15139987" y="4998060"/>
-            <a:ext cx="2318994" cy="307777"/>
-          </a:xfrm>
-          <a:prstGeom prst="rect">
-            <a:avLst/>
-          </a:prstGeom>
-          <a:noFill/>
-        </p:spPr>
-        <p:txBody>
-          <a:bodyPr wrap="square" rtlCol="0">
-            <a:spAutoFit/>
-          </a:bodyPr>
-          <a:lstStyle/>
-          <a:p>
-            <a:r>
-              <a:rPr lang="en-GB" sz="1400" dirty="0">
-                <a:latin typeface="Times New Roman" panose="02020603050405020304" pitchFamily="18" charset="0"/>
-                <a:cs typeface="Times New Roman" panose="02020603050405020304" pitchFamily="18" charset="0"/>
-              </a:rPr>
-              <a:t>Drone with face recognition</a:t>
-            </a:r>
-          </a:p>
-        </p:txBody>
-      </p:sp>
-      <p:sp>
-        <p:nvSpPr>
           <p:cNvPr id="25" name="Text Placeholder 303">
             <a:extLst>
               <a:ext uri="{FF2B5EF4-FFF2-40B4-BE49-F238E27FC236}">
@@ -16763,8 +17174,8 @@
         </p:nvSpPr>
         <p:spPr>
           <a:xfrm>
-            <a:off x="7241978" y="5412636"/>
-            <a:ext cx="12950030" cy="1824222"/>
+            <a:off x="7241978" y="9315145"/>
+            <a:ext cx="12950030" cy="1584157"/>
           </a:xfrm>
           <a:prstGeom prst="rect">
             <a:avLst/>
@@ -16923,18 +17334,10 @@
             <a:endParaRPr lang="en-US" sz="1300" dirty="0"/>
           </a:p>
           <a:p>
-            <a:endParaRPr lang="en-US" sz="1300" dirty="0"/>
-          </a:p>
-          <a:p>
             <a:r>
               <a:rPr lang="en-US" sz="1300" dirty="0"/>
-              <a:t>To test the application 2 virtual machines were setup, one to simulate a drone with a raspberry pi and another to simulate a device sending target information to the drone. This was done via two python scripts one to act as a sender and the other, </a:t>
+              <a:t>To test the application 2 virtual machines were setup, one to simulate a drone with a raspberry pi and another to simulate a device sending target information to the drone. This was done via two python scripts one to act as a sender and the other, a receiver.</a:t>
             </a:r>
-            <a:r>
-              <a:rPr lang="en-US" sz="1300"/>
-              <a:t>a receiver.</a:t>
-            </a:r>
-            <a:endParaRPr lang="en-US" sz="1300" dirty="0"/>
           </a:p>
           <a:p>
             <a:endParaRPr lang="en-US" sz="1300" dirty="0"/>
@@ -16943,20 +17346,14 @@
       </p:sp>
       <p:pic>
         <p:nvPicPr>
-          <p:cNvPr id="3" name="Picture 2" descr="A picture containing text, projector&#10;&#10;Description automatically generated">
-            <a:extLst>
-              <a:ext uri="{FF2B5EF4-FFF2-40B4-BE49-F238E27FC236}">
-                <a16:creationId xmlns:a16="http://schemas.microsoft.com/office/drawing/2014/main" id="{CEC28516-ED79-4B4F-A602-375B280C9933}"/>
-              </a:ext>
-            </a:extLst>
-          </p:cNvPr>
+          <p:cNvPr id="4" name="Picture 3"/>
           <p:cNvPicPr>
             <a:picLocks noChangeAspect="1"/>
           </p:cNvPicPr>
           <p:nvPr/>
         </p:nvPicPr>
         <p:blipFill>
-          <a:blip r:embed="rId3">
+          <a:blip r:embed="rId4">
             <a:extLst>
               <a:ext uri="{28A0092B-C50C-407E-A947-70E740481C1C}">
                 <a14:useLocalDpi xmlns:a14="http://schemas.microsoft.com/office/drawing/2010/main" val="0"/>
@@ -16969,8 +17366,30 @@
         </p:blipFill>
         <p:spPr>
           <a:xfrm>
-            <a:off x="11556377" y="4054131"/>
-            <a:ext cx="4848225" cy="771525"/>
+            <a:off x="10406890" y="3340323"/>
+            <a:ext cx="7677150" cy="5981700"/>
+          </a:xfrm>
+          <a:prstGeom prst="rect">
+            <a:avLst/>
+          </a:prstGeom>
+        </p:spPr>
+      </p:pic>
+      <p:pic>
+        <p:nvPicPr>
+          <p:cNvPr id="27" name="Picture 26"/>
+          <p:cNvPicPr/>
+          <p:nvPr/>
+        </p:nvPicPr>
+        <p:blipFill>
+          <a:blip r:embed="rId5"/>
+          <a:stretch>
+            <a:fillRect/>
+          </a:stretch>
+        </p:blipFill>
+        <p:spPr>
+          <a:xfrm>
+            <a:off x="13208629" y="10873315"/>
+            <a:ext cx="5684240" cy="4405020"/>
           </a:xfrm>
           <a:prstGeom prst="rect">
             <a:avLst/>
@@ -16979,20 +17398,164 @@
       </p:pic>
       <p:sp>
         <p:nvSpPr>
-          <p:cNvPr id="26" name="TextBox 25">
-            <a:extLst>
-              <a:ext uri="{FF2B5EF4-FFF2-40B4-BE49-F238E27FC236}">
-                <a16:creationId xmlns:a16="http://schemas.microsoft.com/office/drawing/2014/main" id="{7C946137-7014-4A35-821E-D8626C944BF4}"/>
-              </a:ext>
-            </a:extLst>
-          </p:cNvPr>
+          <p:cNvPr id="5" name="TextBox 4"/>
           <p:cNvSpPr txBox="1"/>
           <p:nvPr/>
         </p:nvSpPr>
         <p:spPr>
           <a:xfrm>
-            <a:off x="13238375" y="4998060"/>
-            <a:ext cx="1223914" cy="307777"/>
+            <a:off x="7781694" y="15345533"/>
+            <a:ext cx="4789987" cy="892552"/>
+          </a:xfrm>
+          <a:prstGeom prst="rect">
+            <a:avLst/>
+          </a:prstGeom>
+          <a:noFill/>
+        </p:spPr>
+        <p:txBody>
+          <a:bodyPr wrap="square" rtlCol="0">
+            <a:spAutoFit/>
+          </a:bodyPr>
+          <a:lstStyle/>
+          <a:p>
+            <a:r>
+              <a:rPr lang="en-GB" sz="1300" dirty="0" smtClean="0">
+                <a:latin typeface="Times New Roman" panose="02020603050405020304" pitchFamily="18" charset="0"/>
+                <a:cs typeface="Times New Roman" panose="02020603050405020304" pitchFamily="18" charset="0"/>
+              </a:rPr>
+              <a:t>Figure 1 is a graph  showing the performance of different algorithms based on the Labelled Faces in the wild benchmark. These are all different implementations of </a:t>
+            </a:r>
+            <a:r>
+              <a:rPr lang="en-GB" sz="1300" dirty="0" err="1" smtClean="0">
+                <a:latin typeface="Times New Roman" panose="02020603050405020304" pitchFamily="18" charset="0"/>
+                <a:cs typeface="Times New Roman" panose="02020603050405020304" pitchFamily="18" charset="0"/>
+              </a:rPr>
+              <a:t>dlib’s</a:t>
+            </a:r>
+            <a:r>
+              <a:rPr lang="en-GB" sz="1300" dirty="0" smtClean="0">
+                <a:latin typeface="Times New Roman" panose="02020603050405020304" pitchFamily="18" charset="0"/>
+                <a:cs typeface="Times New Roman" panose="02020603050405020304" pitchFamily="18" charset="0"/>
+              </a:rPr>
+              <a:t> state of the art face recognition built using deep learning.</a:t>
+            </a:r>
+          </a:p>
+        </p:txBody>
+      </p:sp>
+      <p:pic>
+        <p:nvPicPr>
+          <p:cNvPr id="8" name="Picture 7"/>
+          <p:cNvPicPr>
+            <a:picLocks noChangeAspect="1"/>
+          </p:cNvPicPr>
+          <p:nvPr/>
+        </p:nvPicPr>
+        <p:blipFill>
+          <a:blip r:embed="rId6">
+            <a:extLst>
+              <a:ext uri="{28A0092B-C50C-407E-A947-70E740481C1C}">
+                <a14:useLocalDpi xmlns:a14="http://schemas.microsoft.com/office/drawing/2010/main" val="0"/>
+              </a:ext>
+            </a:extLst>
+          </a:blip>
+          <a:stretch>
+            <a:fillRect/>
+          </a:stretch>
+        </p:blipFill>
+        <p:spPr>
+          <a:xfrm>
+            <a:off x="7290214" y="10814646"/>
+            <a:ext cx="4620270" cy="4357755"/>
+          </a:xfrm>
+          <a:prstGeom prst="rect">
+            <a:avLst/>
+          </a:prstGeom>
+        </p:spPr>
+      </p:pic>
+      <p:sp>
+        <p:nvSpPr>
+          <p:cNvPr id="9" name="TextBox 8"/>
+          <p:cNvSpPr txBox="1"/>
+          <p:nvPr/>
+        </p:nvSpPr>
+        <p:spPr>
+          <a:xfrm>
+            <a:off x="7781694" y="15037756"/>
+            <a:ext cx="3974908" cy="307777"/>
+          </a:xfrm>
+          <a:prstGeom prst="rect">
+            <a:avLst/>
+          </a:prstGeom>
+          <a:noFill/>
+        </p:spPr>
+        <p:txBody>
+          <a:bodyPr wrap="square" rtlCol="0">
+            <a:spAutoFit/>
+          </a:bodyPr>
+          <a:lstStyle/>
+          <a:p>
+            <a:pPr marL="342900" indent="-342900">
+              <a:buFont typeface="+mj-lt"/>
+              <a:buAutoNum type="arabicPeriod"/>
+            </a:pPr>
+            <a:r>
+              <a:rPr lang="en-GB" sz="1400" dirty="0"/>
+              <a:t>ROC curves averaged over 10 folds of View 2.</a:t>
+            </a:r>
+            <a:endParaRPr lang="en-GB" sz="1400" dirty="0">
+              <a:latin typeface="Times New Roman" panose="02020603050405020304" pitchFamily="18" charset="0"/>
+              <a:cs typeface="Times New Roman" panose="02020603050405020304" pitchFamily="18" charset="0"/>
+            </a:endParaRPr>
+          </a:p>
+        </p:txBody>
+      </p:sp>
+      <p:sp>
+        <p:nvSpPr>
+          <p:cNvPr id="32" name="TextBox 31"/>
+          <p:cNvSpPr txBox="1"/>
+          <p:nvPr/>
+        </p:nvSpPr>
+        <p:spPr>
+          <a:xfrm>
+            <a:off x="13986851" y="15038060"/>
+            <a:ext cx="3974908" cy="307777"/>
+          </a:xfrm>
+          <a:prstGeom prst="rect">
+            <a:avLst/>
+          </a:prstGeom>
+          <a:noFill/>
+        </p:spPr>
+        <p:txBody>
+          <a:bodyPr wrap="square" rtlCol="0">
+            <a:spAutoFit/>
+          </a:bodyPr>
+          <a:lstStyle/>
+          <a:p>
+            <a:pPr marL="342900" indent="-342900">
+              <a:buFont typeface="+mj-lt"/>
+              <a:buAutoNum type="arabicPeriod" startAt="2"/>
+            </a:pPr>
+            <a:r>
+              <a:rPr lang="en-GB" sz="1400" dirty="0"/>
+              <a:t>ROC curves averaged over 10 folds of View 2.</a:t>
+            </a:r>
+            <a:endParaRPr lang="en-GB" sz="1400" dirty="0">
+              <a:latin typeface="Times New Roman" panose="02020603050405020304" pitchFamily="18" charset="0"/>
+              <a:cs typeface="Times New Roman" panose="02020603050405020304" pitchFamily="18" charset="0"/>
+            </a:endParaRPr>
+          </a:p>
+        </p:txBody>
+      </p:sp>
+      <p:sp>
+        <p:nvSpPr>
+          <p:cNvPr id="10" name="TextBox 9"/>
+          <p:cNvSpPr txBox="1"/>
+          <p:nvPr/>
+        </p:nvSpPr>
+        <p:spPr>
+          <a:xfrm>
+            <a:off x="13986851" y="15328269"/>
+            <a:ext cx="6153917" cy="738664"/>
           </a:xfrm>
           <a:prstGeom prst="rect">
             <a:avLst/>
@@ -17010,8 +17573,1115 @@
                 <a:latin typeface="Times New Roman" panose="02020603050405020304" pitchFamily="18" charset="0"/>
                 <a:cs typeface="Times New Roman" panose="02020603050405020304" pitchFamily="18" charset="0"/>
               </a:rPr>
-              <a:t>Server device</a:t>
+              <a:t>Figure 2 is a comparison between </a:t>
             </a:r>
+            <a:r>
+              <a:rPr lang="en-GB" sz="1400" dirty="0" err="1">
+                <a:latin typeface="Times New Roman" panose="02020603050405020304" pitchFamily="18" charset="0"/>
+                <a:cs typeface="Times New Roman" panose="02020603050405020304" pitchFamily="18" charset="0"/>
+              </a:rPr>
+              <a:t>Dlib’s</a:t>
+            </a:r>
+            <a:r>
+              <a:rPr lang="en-GB" sz="1400" dirty="0">
+                <a:latin typeface="Times New Roman" panose="02020603050405020304" pitchFamily="18" charset="0"/>
+                <a:cs typeface="Times New Roman" panose="02020603050405020304" pitchFamily="18" charset="0"/>
+              </a:rPr>
+              <a:t> library and other known face recognition libraries. Tiny Face model is best compared to </a:t>
+            </a:r>
+            <a:r>
+              <a:rPr lang="en-GB" sz="1400" dirty="0" err="1" smtClean="0">
+                <a:latin typeface="Times New Roman" panose="02020603050405020304" pitchFamily="18" charset="0"/>
+                <a:cs typeface="Times New Roman" panose="02020603050405020304" pitchFamily="18" charset="0"/>
+              </a:rPr>
+              <a:t>Dlib</a:t>
+            </a:r>
+            <a:r>
+              <a:rPr lang="en-GB" sz="1400" dirty="0" smtClean="0">
+                <a:latin typeface="Times New Roman" panose="02020603050405020304" pitchFamily="18" charset="0"/>
+                <a:cs typeface="Times New Roman" panose="02020603050405020304" pitchFamily="18" charset="0"/>
+              </a:rPr>
+              <a:t> </a:t>
+            </a:r>
+            <a:r>
+              <a:rPr lang="en-GB" sz="1400" dirty="0">
+                <a:latin typeface="Times New Roman" panose="02020603050405020304" pitchFamily="18" charset="0"/>
+                <a:cs typeface="Times New Roman" panose="02020603050405020304" pitchFamily="18" charset="0"/>
+              </a:rPr>
+              <a:t>because it offers higher accuracy with low-quality </a:t>
+            </a:r>
+            <a:r>
+              <a:rPr lang="en-GB" sz="1400" dirty="0" smtClean="0">
+                <a:latin typeface="Times New Roman" panose="02020603050405020304" pitchFamily="18" charset="0"/>
+                <a:cs typeface="Times New Roman" panose="02020603050405020304" pitchFamily="18" charset="0"/>
+              </a:rPr>
+              <a:t>images. However it takes more computational time</a:t>
+            </a:r>
+            <a:endParaRPr lang="en-GB" sz="1400" dirty="0">
+              <a:latin typeface="Times New Roman" panose="02020603050405020304" pitchFamily="18" charset="0"/>
+              <a:cs typeface="Times New Roman" panose="02020603050405020304" pitchFamily="18" charset="0"/>
+            </a:endParaRPr>
+          </a:p>
+        </p:txBody>
+      </p:sp>
+      <p:sp>
+        <p:nvSpPr>
+          <p:cNvPr id="11" name="TextBox 10"/>
+          <p:cNvSpPr txBox="1"/>
+          <p:nvPr/>
+        </p:nvSpPr>
+        <p:spPr>
+          <a:xfrm>
+            <a:off x="651531" y="9404023"/>
+            <a:ext cx="6231680" cy="415498"/>
+          </a:xfrm>
+          <a:prstGeom prst="rect">
+            <a:avLst/>
+          </a:prstGeom>
+          <a:noFill/>
+          <a:ln>
+            <a:solidFill>
+              <a:schemeClr val="tx1"/>
+            </a:solidFill>
+            <a:prstDash val="sysDot"/>
+          </a:ln>
+        </p:spPr>
+        <p:txBody>
+          <a:bodyPr wrap="square" rtlCol="0">
+            <a:spAutoFit/>
+          </a:bodyPr>
+          <a:lstStyle/>
+          <a:p>
+            <a:pPr algn="ctr"/>
+            <a:r>
+              <a:rPr lang="en-GB" sz="2100" b="1" u="sng" dirty="0" smtClean="0">
+                <a:solidFill>
+                  <a:schemeClr val="tx1">
+                    <a:lumMod val="85000"/>
+                    <a:lumOff val="15000"/>
+                  </a:schemeClr>
+                </a:solidFill>
+                <a:cs typeface="Times New Roman" panose="02020603050405020304" pitchFamily="18" charset="0"/>
+              </a:rPr>
+              <a:t>Research Methods</a:t>
+            </a:r>
+            <a:endParaRPr lang="en-GB" sz="2100" b="1" u="sng" dirty="0">
+              <a:solidFill>
+                <a:schemeClr val="tx1">
+                  <a:lumMod val="85000"/>
+                  <a:lumOff val="15000"/>
+                </a:schemeClr>
+              </a:solidFill>
+              <a:cs typeface="Times New Roman" panose="02020603050405020304" pitchFamily="18" charset="0"/>
+            </a:endParaRPr>
+          </a:p>
+        </p:txBody>
+      </p:sp>
+      <p:sp>
+        <p:nvSpPr>
+          <p:cNvPr id="36" name="Text Placeholder 301"/>
+          <p:cNvSpPr txBox="1">
+            <a:spLocks/>
+          </p:cNvSpPr>
+          <p:nvPr/>
+        </p:nvSpPr>
+        <p:spPr>
+          <a:xfrm>
+            <a:off x="596711" y="9983536"/>
+            <a:ext cx="6286500" cy="3064562"/>
+          </a:xfrm>
+          <a:prstGeom prst="rect">
+            <a:avLst/>
+          </a:prstGeom>
+        </p:spPr>
+        <p:txBody>
+          <a:bodyPr wrap="square" lIns="130622" tIns="130622" rIns="130622" bIns="130622">
+            <a:spAutoFit/>
+          </a:bodyPr>
+          <a:lstStyle>
+            <a:lvl1pPr marL="0" indent="0" algn="l" defTabSz="2507943" rtl="0" eaLnBrk="1" latinLnBrk="0" hangingPunct="1">
+              <a:spcBef>
+                <a:spcPct val="20000"/>
+              </a:spcBef>
+              <a:buFont typeface="Arial" pitchFamily="34" charset="0"/>
+              <a:buNone/>
+              <a:defRPr sz="1400" kern="1200">
+                <a:solidFill>
+                  <a:schemeClr val="accent5">
+                    <a:lumMod val="50000"/>
+                  </a:schemeClr>
+                </a:solidFill>
+                <a:latin typeface="Times New Roman" panose="02020603050405020304" pitchFamily="18" charset="0"/>
+                <a:ea typeface="+mn-ea"/>
+                <a:cs typeface="Times New Roman" panose="02020603050405020304" pitchFamily="18" charset="0"/>
+              </a:defRPr>
+            </a:lvl1pPr>
+            <a:lvl2pPr marL="849043" indent="-326555" algn="l" defTabSz="2507943" rtl="0" eaLnBrk="1" latinLnBrk="0" hangingPunct="1">
+              <a:spcBef>
+                <a:spcPct val="20000"/>
+              </a:spcBef>
+              <a:buFont typeface="Arial" pitchFamily="34" charset="0"/>
+              <a:buChar char="–"/>
+              <a:defRPr sz="1400" kern="1200">
+                <a:solidFill>
+                  <a:schemeClr val="tx1"/>
+                </a:solidFill>
+                <a:latin typeface="Trebuchet MS" pitchFamily="34" charset="0"/>
+                <a:ea typeface="+mn-ea"/>
+                <a:cs typeface="+mn-cs"/>
+              </a:defRPr>
+            </a:lvl2pPr>
+            <a:lvl3pPr marL="1175598" indent="-326555" algn="l" defTabSz="2507943" rtl="0" eaLnBrk="1" latinLnBrk="0" hangingPunct="1">
+              <a:spcBef>
+                <a:spcPct val="20000"/>
+              </a:spcBef>
+              <a:buFont typeface="Arial" pitchFamily="34" charset="0"/>
+              <a:buChar char="•"/>
+              <a:defRPr sz="1400" kern="1200">
+                <a:solidFill>
+                  <a:schemeClr val="tx1"/>
+                </a:solidFill>
+                <a:latin typeface="Trebuchet MS" pitchFamily="34" charset="0"/>
+                <a:ea typeface="+mn-ea"/>
+                <a:cs typeface="+mn-cs"/>
+              </a:defRPr>
+            </a:lvl3pPr>
+            <a:lvl4pPr marL="1534809" indent="-359211" algn="l" defTabSz="2507943" rtl="0" eaLnBrk="1" latinLnBrk="0" hangingPunct="1">
+              <a:spcBef>
+                <a:spcPct val="20000"/>
+              </a:spcBef>
+              <a:buFont typeface="Arial" pitchFamily="34" charset="0"/>
+              <a:buChar char="–"/>
+              <a:defRPr sz="1400" kern="1200">
+                <a:solidFill>
+                  <a:schemeClr val="tx1"/>
+                </a:solidFill>
+                <a:latin typeface="Trebuchet MS" pitchFamily="34" charset="0"/>
+                <a:ea typeface="+mn-ea"/>
+                <a:cs typeface="+mn-cs"/>
+              </a:defRPr>
+            </a:lvl4pPr>
+            <a:lvl5pPr marL="1796053" indent="-261244" algn="l" defTabSz="2507943" rtl="0" eaLnBrk="1" latinLnBrk="0" hangingPunct="1">
+              <a:spcBef>
+                <a:spcPct val="20000"/>
+              </a:spcBef>
+              <a:buFont typeface="Arial" pitchFamily="34" charset="0"/>
+              <a:buChar char="»"/>
+              <a:defRPr sz="1400" kern="1200">
+                <a:solidFill>
+                  <a:schemeClr val="tx1"/>
+                </a:solidFill>
+                <a:latin typeface="Trebuchet MS" pitchFamily="34" charset="0"/>
+                <a:ea typeface="+mn-ea"/>
+                <a:cs typeface="+mn-cs"/>
+              </a:defRPr>
+            </a:lvl5pPr>
+            <a:lvl6pPr marL="6896844" indent="-626986" algn="l" defTabSz="2507943" rtl="0" eaLnBrk="1" latinLnBrk="0" hangingPunct="1">
+              <a:spcBef>
+                <a:spcPct val="20000"/>
+              </a:spcBef>
+              <a:buFont typeface="Arial" pitchFamily="34" charset="0"/>
+              <a:buChar char="•"/>
+              <a:defRPr sz="5500" kern="1200">
+                <a:solidFill>
+                  <a:schemeClr val="tx1"/>
+                </a:solidFill>
+                <a:latin typeface="+mn-lt"/>
+                <a:ea typeface="+mn-ea"/>
+                <a:cs typeface="+mn-cs"/>
+              </a:defRPr>
+            </a:lvl6pPr>
+            <a:lvl7pPr marL="8150815" indent="-626986" algn="l" defTabSz="2507943" rtl="0" eaLnBrk="1" latinLnBrk="0" hangingPunct="1">
+              <a:spcBef>
+                <a:spcPct val="20000"/>
+              </a:spcBef>
+              <a:buFont typeface="Arial" pitchFamily="34" charset="0"/>
+              <a:buChar char="•"/>
+              <a:defRPr sz="5500" kern="1200">
+                <a:solidFill>
+                  <a:schemeClr val="tx1"/>
+                </a:solidFill>
+                <a:latin typeface="+mn-lt"/>
+                <a:ea typeface="+mn-ea"/>
+                <a:cs typeface="+mn-cs"/>
+              </a:defRPr>
+            </a:lvl7pPr>
+            <a:lvl8pPr marL="9404787" indent="-626986" algn="l" defTabSz="2507943" rtl="0" eaLnBrk="1" latinLnBrk="0" hangingPunct="1">
+              <a:spcBef>
+                <a:spcPct val="20000"/>
+              </a:spcBef>
+              <a:buFont typeface="Arial" pitchFamily="34" charset="0"/>
+              <a:buChar char="•"/>
+              <a:defRPr sz="5500" kern="1200">
+                <a:solidFill>
+                  <a:schemeClr val="tx1"/>
+                </a:solidFill>
+                <a:latin typeface="+mn-lt"/>
+                <a:ea typeface="+mn-ea"/>
+                <a:cs typeface="+mn-cs"/>
+              </a:defRPr>
+            </a:lvl8pPr>
+            <a:lvl9pPr marL="10658758" indent="-626986" algn="l" defTabSz="2507943" rtl="0" eaLnBrk="1" latinLnBrk="0" hangingPunct="1">
+              <a:spcBef>
+                <a:spcPct val="20000"/>
+              </a:spcBef>
+              <a:buFont typeface="Arial" pitchFamily="34" charset="0"/>
+              <a:buChar char="•"/>
+              <a:defRPr sz="5500" kern="1200">
+                <a:solidFill>
+                  <a:schemeClr val="tx1"/>
+                </a:solidFill>
+                <a:latin typeface="+mn-lt"/>
+                <a:ea typeface="+mn-ea"/>
+                <a:cs typeface="+mn-cs"/>
+              </a:defRPr>
+            </a:lvl9pPr>
+          </a:lstStyle>
+          <a:p>
+            <a:r>
+              <a:rPr lang="en-GB" sz="1300" dirty="0" smtClean="0"/>
+              <a:t>The research will be carried out through the use of a VM to simulate the presence of a  raspberry pi, the VM will run the facial recognition code as well as the file receiver python code simultaneously. Images of targets will then be sent to the VM  as the code is running to test the stability of the code. To simulate a drone, a third party software, </a:t>
+            </a:r>
+            <a:r>
+              <a:rPr lang="en-GB" sz="1300" dirty="0" err="1" smtClean="0"/>
+              <a:t>droidcam</a:t>
+            </a:r>
+            <a:r>
+              <a:rPr lang="en-GB" sz="1300" dirty="0" smtClean="0"/>
+              <a:t>, able to use mobile phones as computer cameras will be used to  connect a phone to the VM. Another device will then run the python script used to send a target image to the VM.</a:t>
+            </a:r>
+          </a:p>
+          <a:p>
+            <a:endParaRPr lang="en-GB" sz="1300" dirty="0"/>
+          </a:p>
+          <a:p>
+            <a:r>
+              <a:rPr lang="en-GB" sz="1300" dirty="0" smtClean="0"/>
+              <a:t>The accuracy and performance of different facial recognition libraries will be tested and the most suitable algorithm will be chosen.</a:t>
+            </a:r>
+          </a:p>
+          <a:p>
+            <a:endParaRPr lang="en-GB" sz="1300" dirty="0" smtClean="0"/>
+          </a:p>
+          <a:p>
+            <a:r>
+              <a:rPr lang="en-GB" sz="1300" dirty="0" smtClean="0"/>
+              <a:t>Asides from this, the ability of the algorithms to work in different lighting conditions will also be tested via speed of detection and confidence value </a:t>
+            </a:r>
+          </a:p>
+          <a:p>
+            <a:endParaRPr lang="en-US" sz="1300" dirty="0"/>
+          </a:p>
+        </p:txBody>
+      </p:sp>
+      <p:sp>
+        <p:nvSpPr>
+          <p:cNvPr id="37" name="Text Placeholder 307"/>
+          <p:cNvSpPr txBox="1">
+            <a:spLocks/>
+          </p:cNvSpPr>
+          <p:nvPr/>
+        </p:nvSpPr>
+        <p:spPr>
+          <a:xfrm>
+            <a:off x="20579674" y="2666895"/>
+            <a:ext cx="6279386" cy="428684"/>
+          </a:xfrm>
+          <a:prstGeom prst="rect">
+            <a:avLst/>
+          </a:prstGeom>
+          <a:noFill/>
+        </p:spPr>
+        <p:txBody>
+          <a:bodyPr wrap="square" lIns="52249" tIns="52249" rIns="52249" bIns="52249" anchor="ctr" anchorCtr="0">
+            <a:spAutoFit/>
+          </a:bodyPr>
+          <a:lstStyle>
+            <a:lvl1pPr marL="0" indent="0" algn="ctr" defTabSz="2507943" rtl="0" eaLnBrk="1" latinLnBrk="0" hangingPunct="1">
+              <a:spcBef>
+                <a:spcPct val="20000"/>
+              </a:spcBef>
+              <a:buFont typeface="Arial" pitchFamily="34" charset="0"/>
+              <a:buNone/>
+              <a:defRPr sz="2100" b="1" u="sng" kern="1200" baseline="0">
+                <a:solidFill>
+                  <a:schemeClr val="accent5">
+                    <a:lumMod val="50000"/>
+                  </a:schemeClr>
+                </a:solidFill>
+                <a:latin typeface="+mn-lt"/>
+                <a:ea typeface="+mn-ea"/>
+                <a:cs typeface="+mn-cs"/>
+              </a:defRPr>
+            </a:lvl1pPr>
+            <a:lvl2pPr marL="2037704" indent="-783732" algn="l" defTabSz="2507943" rtl="0" eaLnBrk="1" latinLnBrk="0" hangingPunct="1">
+              <a:spcBef>
+                <a:spcPct val="20000"/>
+              </a:spcBef>
+              <a:buFont typeface="Arial" pitchFamily="34" charset="0"/>
+              <a:buChar char="–"/>
+              <a:defRPr sz="7700" kern="1200">
+                <a:solidFill>
+                  <a:schemeClr val="tx1"/>
+                </a:solidFill>
+                <a:latin typeface="+mn-lt"/>
+                <a:ea typeface="+mn-ea"/>
+                <a:cs typeface="+mn-cs"/>
+              </a:defRPr>
+            </a:lvl2pPr>
+            <a:lvl3pPr marL="3134929" indent="-626986" algn="l" defTabSz="2507943" rtl="0" eaLnBrk="1" latinLnBrk="0" hangingPunct="1">
+              <a:spcBef>
+                <a:spcPct val="20000"/>
+              </a:spcBef>
+              <a:buFont typeface="Arial" pitchFamily="34" charset="0"/>
+              <a:buChar char="•"/>
+              <a:defRPr sz="6600" kern="1200">
+                <a:solidFill>
+                  <a:schemeClr val="tx1"/>
+                </a:solidFill>
+                <a:latin typeface="+mn-lt"/>
+                <a:ea typeface="+mn-ea"/>
+                <a:cs typeface="+mn-cs"/>
+              </a:defRPr>
+            </a:lvl3pPr>
+            <a:lvl4pPr marL="4388901" indent="-626986" algn="l" defTabSz="2507943" rtl="0" eaLnBrk="1" latinLnBrk="0" hangingPunct="1">
+              <a:spcBef>
+                <a:spcPct val="20000"/>
+              </a:spcBef>
+              <a:buFont typeface="Arial" pitchFamily="34" charset="0"/>
+              <a:buChar char="–"/>
+              <a:defRPr sz="5500" kern="1200">
+                <a:solidFill>
+                  <a:schemeClr val="tx1"/>
+                </a:solidFill>
+                <a:latin typeface="+mn-lt"/>
+                <a:ea typeface="+mn-ea"/>
+                <a:cs typeface="+mn-cs"/>
+              </a:defRPr>
+            </a:lvl4pPr>
+            <a:lvl5pPr marL="5642872" indent="-626986" algn="l" defTabSz="2507943" rtl="0" eaLnBrk="1" latinLnBrk="0" hangingPunct="1">
+              <a:spcBef>
+                <a:spcPct val="20000"/>
+              </a:spcBef>
+              <a:buFont typeface="Arial" pitchFamily="34" charset="0"/>
+              <a:buChar char="»"/>
+              <a:defRPr sz="5500" kern="1200">
+                <a:solidFill>
+                  <a:schemeClr val="tx1"/>
+                </a:solidFill>
+                <a:latin typeface="+mn-lt"/>
+                <a:ea typeface="+mn-ea"/>
+                <a:cs typeface="+mn-cs"/>
+              </a:defRPr>
+            </a:lvl5pPr>
+            <a:lvl6pPr marL="6896844" indent="-626986" algn="l" defTabSz="2507943" rtl="0" eaLnBrk="1" latinLnBrk="0" hangingPunct="1">
+              <a:spcBef>
+                <a:spcPct val="20000"/>
+              </a:spcBef>
+              <a:buFont typeface="Arial" pitchFamily="34" charset="0"/>
+              <a:buChar char="•"/>
+              <a:defRPr sz="5500" kern="1200">
+                <a:solidFill>
+                  <a:schemeClr val="tx1"/>
+                </a:solidFill>
+                <a:latin typeface="+mn-lt"/>
+                <a:ea typeface="+mn-ea"/>
+                <a:cs typeface="+mn-cs"/>
+              </a:defRPr>
+            </a:lvl6pPr>
+            <a:lvl7pPr marL="8150815" indent="-626986" algn="l" defTabSz="2507943" rtl="0" eaLnBrk="1" latinLnBrk="0" hangingPunct="1">
+              <a:spcBef>
+                <a:spcPct val="20000"/>
+              </a:spcBef>
+              <a:buFont typeface="Arial" pitchFamily="34" charset="0"/>
+              <a:buChar char="•"/>
+              <a:defRPr sz="5500" kern="1200">
+                <a:solidFill>
+                  <a:schemeClr val="tx1"/>
+                </a:solidFill>
+                <a:latin typeface="+mn-lt"/>
+                <a:ea typeface="+mn-ea"/>
+                <a:cs typeface="+mn-cs"/>
+              </a:defRPr>
+            </a:lvl7pPr>
+            <a:lvl8pPr marL="9404787" indent="-626986" algn="l" defTabSz="2507943" rtl="0" eaLnBrk="1" latinLnBrk="0" hangingPunct="1">
+              <a:spcBef>
+                <a:spcPct val="20000"/>
+              </a:spcBef>
+              <a:buFont typeface="Arial" pitchFamily="34" charset="0"/>
+              <a:buChar char="•"/>
+              <a:defRPr sz="5500" kern="1200">
+                <a:solidFill>
+                  <a:schemeClr val="tx1"/>
+                </a:solidFill>
+                <a:latin typeface="+mn-lt"/>
+                <a:ea typeface="+mn-ea"/>
+                <a:cs typeface="+mn-cs"/>
+              </a:defRPr>
+            </a:lvl8pPr>
+            <a:lvl9pPr marL="10658758" indent="-626986" algn="l" defTabSz="2507943" rtl="0" eaLnBrk="1" latinLnBrk="0" hangingPunct="1">
+              <a:spcBef>
+                <a:spcPct val="20000"/>
+              </a:spcBef>
+              <a:buFont typeface="Arial" pitchFamily="34" charset="0"/>
+              <a:buChar char="•"/>
+              <a:defRPr sz="5500" kern="1200">
+                <a:solidFill>
+                  <a:schemeClr val="tx1"/>
+                </a:solidFill>
+                <a:latin typeface="+mn-lt"/>
+                <a:ea typeface="+mn-ea"/>
+                <a:cs typeface="+mn-cs"/>
+              </a:defRPr>
+            </a:lvl9pPr>
+          </a:lstStyle>
+          <a:p>
+            <a:r>
+              <a:rPr lang="en-US" dirty="0" smtClean="0"/>
+              <a:t>Risk Analysis</a:t>
+            </a:r>
+            <a:endParaRPr lang="en-US" dirty="0"/>
+          </a:p>
+        </p:txBody>
+      </p:sp>
+      <p:graphicFrame>
+        <p:nvGraphicFramePr>
+          <p:cNvPr id="38" name="Table 37"/>
+          <p:cNvGraphicFramePr>
+            <a:graphicFrameLocks noGrp="1"/>
+          </p:cNvGraphicFramePr>
+          <p:nvPr>
+            <p:extLst>
+              <p:ext uri="{D42A27DB-BD31-4B8C-83A1-F6EECF244321}">
+                <p14:modId xmlns:p14="http://schemas.microsoft.com/office/powerpoint/2010/main" val="1701850731"/>
+              </p:ext>
+            </p:extLst>
+          </p:nvPr>
+        </p:nvGraphicFramePr>
+        <p:xfrm>
+          <a:off x="20578147" y="3243902"/>
+          <a:ext cx="6282532" cy="5005432"/>
+        </p:xfrm>
+        <a:graphic>
+          <a:graphicData uri="http://schemas.openxmlformats.org/drawingml/2006/table">
+            <a:tbl>
+              <a:tblPr firstRow="1" bandRow="1">
+                <a:solidFill>
+                  <a:srgbClr val="00B050"/>
+                </a:solidFill>
+                <a:tableStyleId>{5C22544A-7EE6-4342-B048-85BDC9FD1C3A}</a:tableStyleId>
+              </a:tblPr>
+              <a:tblGrid>
+                <a:gridCol w="1570633">
+                  <a:extLst>
+                    <a:ext uri="{9D8B030D-6E8A-4147-A177-3AD203B41FA5}">
+                      <a16:colId xmlns:a16="http://schemas.microsoft.com/office/drawing/2014/main" val="2239764257"/>
+                    </a:ext>
+                  </a:extLst>
+                </a:gridCol>
+                <a:gridCol w="1570633">
+                  <a:extLst>
+                    <a:ext uri="{9D8B030D-6E8A-4147-A177-3AD203B41FA5}">
+                      <a16:colId xmlns:a16="http://schemas.microsoft.com/office/drawing/2014/main" val="1059795350"/>
+                    </a:ext>
+                  </a:extLst>
+                </a:gridCol>
+                <a:gridCol w="1570633">
+                  <a:extLst>
+                    <a:ext uri="{9D8B030D-6E8A-4147-A177-3AD203B41FA5}">
+                      <a16:colId xmlns:a16="http://schemas.microsoft.com/office/drawing/2014/main" val="3525920208"/>
+                    </a:ext>
+                  </a:extLst>
+                </a:gridCol>
+                <a:gridCol w="1570633">
+                  <a:extLst>
+                    <a:ext uri="{9D8B030D-6E8A-4147-A177-3AD203B41FA5}">
+                      <a16:colId xmlns:a16="http://schemas.microsoft.com/office/drawing/2014/main" val="735773973"/>
+                    </a:ext>
+                  </a:extLst>
+                </a:gridCol>
+              </a:tblGrid>
+              <a:tr h="1094817">
+                <a:tc>
+                  <a:txBody>
+                    <a:bodyPr/>
+                    <a:lstStyle/>
+                    <a:p>
+                      <a:r>
+                        <a:rPr lang="en-GB" sz="1200" dirty="0" smtClean="0">
+                          <a:solidFill>
+                            <a:schemeClr val="bg1"/>
+                          </a:solidFill>
+                        </a:rPr>
+                        <a:t>Risk items (Potential future problems derived</a:t>
+                      </a:r>
+                      <a:r>
+                        <a:rPr lang="en-GB" sz="1200" baseline="0" dirty="0" smtClean="0">
+                          <a:solidFill>
+                            <a:schemeClr val="bg1"/>
+                          </a:solidFill>
+                        </a:rPr>
+                        <a:t> from Brainstorming</a:t>
+                      </a:r>
+                      <a:r>
+                        <a:rPr lang="en-GB" sz="1200" dirty="0" smtClean="0">
+                          <a:solidFill>
+                            <a:schemeClr val="bg1"/>
+                          </a:solidFill>
+                        </a:rPr>
+                        <a:t>)</a:t>
+                      </a:r>
+                      <a:endParaRPr lang="en-GB" sz="1200" dirty="0">
+                        <a:solidFill>
+                          <a:schemeClr val="bg1"/>
+                        </a:solidFill>
+                      </a:endParaRPr>
+                    </a:p>
+                  </a:txBody>
+                  <a:tcPr marL="42594" marR="42594" marT="21297" marB="21297">
+                    <a:solidFill>
+                      <a:srgbClr val="326BBA"/>
+                    </a:solidFill>
+                  </a:tcPr>
+                </a:tc>
+                <a:tc>
+                  <a:txBody>
+                    <a:bodyPr/>
+                    <a:lstStyle/>
+                    <a:p>
+                      <a:r>
+                        <a:rPr lang="en-GB" sz="1200" dirty="0" smtClean="0">
+                          <a:solidFill>
+                            <a:schemeClr val="bg1"/>
+                          </a:solidFill>
+                        </a:rPr>
+                        <a:t>Likelihood of Risk Item Occurring</a:t>
+                      </a:r>
+                      <a:endParaRPr lang="en-GB" sz="1200" dirty="0">
+                        <a:solidFill>
+                          <a:schemeClr val="bg1"/>
+                        </a:solidFill>
+                      </a:endParaRPr>
+                    </a:p>
+                  </a:txBody>
+                  <a:tcPr marL="42594" marR="42594" marT="21297" marB="21297">
+                    <a:solidFill>
+                      <a:srgbClr val="326BBA"/>
+                    </a:solidFill>
+                  </a:tcPr>
+                </a:tc>
+                <a:tc>
+                  <a:txBody>
+                    <a:bodyPr/>
+                    <a:lstStyle/>
+                    <a:p>
+                      <a:r>
+                        <a:rPr lang="en-GB" sz="1300" dirty="0" smtClean="0"/>
+                        <a:t>I</a:t>
+                      </a:r>
+                      <a:r>
+                        <a:rPr lang="en-GB" sz="1200" dirty="0" smtClean="0"/>
+                        <a:t>mpact to</a:t>
+                      </a:r>
+                      <a:r>
+                        <a:rPr lang="en-GB" sz="1200" baseline="0" dirty="0" smtClean="0"/>
+                        <a:t> project if Risk item does occur</a:t>
+                      </a:r>
+                      <a:endParaRPr lang="en-GB" sz="1200" dirty="0"/>
+                    </a:p>
+                  </a:txBody>
+                  <a:tcPr marL="42594" marR="42594" marT="21297" marB="21297">
+                    <a:solidFill>
+                      <a:srgbClr val="326BBA"/>
+                    </a:solidFill>
+                  </a:tcPr>
+                </a:tc>
+                <a:tc>
+                  <a:txBody>
+                    <a:bodyPr/>
+                    <a:lstStyle/>
+                    <a:p>
+                      <a:r>
+                        <a:rPr lang="en-GB" sz="1200" dirty="0" smtClean="0"/>
+                        <a:t>Solution</a:t>
+                      </a:r>
+                      <a:endParaRPr lang="en-GB" sz="1200" dirty="0"/>
+                    </a:p>
+                  </a:txBody>
+                  <a:tcPr marL="42594" marR="42594" marT="21297" marB="21297">
+                    <a:solidFill>
+                      <a:srgbClr val="326BBA"/>
+                    </a:solidFill>
+                  </a:tcPr>
+                </a:tc>
+                <a:extLst>
+                  <a:ext uri="{0D108BD9-81ED-4DB2-BD59-A6C34878D82A}">
+                    <a16:rowId xmlns:a16="http://schemas.microsoft.com/office/drawing/2014/main" val="251475392"/>
+                  </a:ext>
+                </a:extLst>
+              </a:tr>
+              <a:tr h="908541">
+                <a:tc>
+                  <a:txBody>
+                    <a:bodyPr/>
+                    <a:lstStyle/>
+                    <a:p>
+                      <a:r>
+                        <a:rPr lang="en-GB" sz="1200" dirty="0" smtClean="0"/>
+                        <a:t>Fail to get an autonomous drone</a:t>
+                      </a:r>
+                      <a:endParaRPr lang="en-GB" sz="1200" dirty="0"/>
+                    </a:p>
+                  </a:txBody>
+                  <a:tcPr marL="42594" marR="42594" marT="21297" marB="21297"/>
+                </a:tc>
+                <a:tc>
+                  <a:txBody>
+                    <a:bodyPr/>
+                    <a:lstStyle/>
+                    <a:p>
+                      <a:r>
+                        <a:rPr lang="en-GB" sz="1200" dirty="0" smtClean="0"/>
+                        <a:t>L:5, C:2</a:t>
+                      </a:r>
+                      <a:endParaRPr lang="en-GB" sz="1200" dirty="0"/>
+                    </a:p>
+                  </a:txBody>
+                  <a:tcPr marL="42594" marR="42594" marT="21297" marB="21297"/>
+                </a:tc>
+                <a:tc>
+                  <a:txBody>
+                    <a:bodyPr/>
+                    <a:lstStyle/>
+                    <a:p>
+                      <a:r>
+                        <a:rPr lang="en-GB" sz="1200" dirty="0" smtClean="0"/>
+                        <a:t>The project will have to be entirely simulation</a:t>
+                      </a:r>
+                      <a:r>
+                        <a:rPr lang="en-GB" sz="1200" baseline="0" dirty="0" smtClean="0"/>
+                        <a:t> based without a drone</a:t>
+                      </a:r>
+                      <a:endParaRPr lang="en-GB" sz="1200" dirty="0"/>
+                    </a:p>
+                  </a:txBody>
+                  <a:tcPr marL="42594" marR="42594" marT="21297" marB="21297"/>
+                </a:tc>
+                <a:tc>
+                  <a:txBody>
+                    <a:bodyPr/>
+                    <a:lstStyle/>
+                    <a:p>
+                      <a:r>
+                        <a:rPr lang="en-GB" sz="1200" dirty="0" smtClean="0"/>
+                        <a:t>I</a:t>
+                      </a:r>
+                      <a:r>
+                        <a:rPr lang="en-GB" sz="1200" baseline="0" dirty="0" smtClean="0"/>
+                        <a:t> am using</a:t>
+                      </a:r>
+                      <a:r>
+                        <a:rPr lang="en-GB" sz="1200" dirty="0" smtClean="0"/>
+                        <a:t> </a:t>
+                      </a:r>
+                      <a:r>
+                        <a:rPr lang="en-GB" sz="1200" baseline="0" dirty="0" smtClean="0"/>
+                        <a:t>VMs to simulate the raspberry pi a phone to simulate the drone</a:t>
+                      </a:r>
+                      <a:endParaRPr lang="en-GB" sz="1200" dirty="0"/>
+                    </a:p>
+                  </a:txBody>
+                  <a:tcPr marL="42594" marR="42594" marT="21297" marB="21297"/>
+                </a:tc>
+                <a:extLst>
+                  <a:ext uri="{0D108BD9-81ED-4DB2-BD59-A6C34878D82A}">
+                    <a16:rowId xmlns:a16="http://schemas.microsoft.com/office/drawing/2014/main" val="2500983172"/>
+                  </a:ext>
+                </a:extLst>
+              </a:tr>
+              <a:tr h="734440">
+                <a:tc>
+                  <a:txBody>
+                    <a:bodyPr/>
+                    <a:lstStyle/>
+                    <a:p>
+                      <a:r>
+                        <a:rPr lang="en-GB" sz="1200" dirty="0" smtClean="0"/>
+                        <a:t>Fail</a:t>
+                      </a:r>
+                      <a:r>
+                        <a:rPr lang="en-GB" sz="1200" baseline="0" dirty="0" smtClean="0"/>
+                        <a:t> to safely secure user data</a:t>
+                      </a:r>
+                      <a:endParaRPr lang="en-GB" sz="1200" dirty="0"/>
+                    </a:p>
+                  </a:txBody>
+                  <a:tcPr marL="42594" marR="42594" marT="21297" marB="21297"/>
+                </a:tc>
+                <a:tc>
+                  <a:txBody>
+                    <a:bodyPr/>
+                    <a:lstStyle/>
+                    <a:p>
+                      <a:r>
+                        <a:rPr lang="en-GB" sz="1200" dirty="0" smtClean="0"/>
+                        <a:t>L:2,C:5</a:t>
+                      </a:r>
+                      <a:endParaRPr lang="en-GB" sz="1200" dirty="0"/>
+                    </a:p>
+                  </a:txBody>
+                  <a:tcPr marL="42594" marR="42594" marT="21297" marB="21297"/>
+                </a:tc>
+                <a:tc>
+                  <a:txBody>
+                    <a:bodyPr/>
+                    <a:lstStyle/>
+                    <a:p>
+                      <a:r>
+                        <a:rPr lang="en-GB" sz="1200" baseline="0" dirty="0" smtClean="0"/>
+                        <a:t>The project will not be able to go on without secure encryption</a:t>
+                      </a:r>
+                      <a:endParaRPr lang="en-GB" sz="1200" dirty="0"/>
+                    </a:p>
+                  </a:txBody>
+                  <a:tcPr marL="42594" marR="42594" marT="21297" marB="21297"/>
+                </a:tc>
+                <a:tc>
+                  <a:txBody>
+                    <a:bodyPr/>
+                    <a:lstStyle/>
+                    <a:p>
+                      <a:r>
+                        <a:rPr lang="en-GB" sz="1100" dirty="0" smtClean="0"/>
+                        <a:t>The images will</a:t>
+                      </a:r>
+                      <a:r>
+                        <a:rPr lang="en-GB" sz="1100" baseline="0" dirty="0" smtClean="0"/>
+                        <a:t> be sent over the internet via a secure port and then will encrypted.</a:t>
+                      </a:r>
+                      <a:endParaRPr lang="en-GB" sz="1100" dirty="0"/>
+                    </a:p>
+                  </a:txBody>
+                  <a:tcPr marL="42594" marR="42594" marT="21297" marB="21297"/>
+                </a:tc>
+                <a:extLst>
+                  <a:ext uri="{0D108BD9-81ED-4DB2-BD59-A6C34878D82A}">
+                    <a16:rowId xmlns:a16="http://schemas.microsoft.com/office/drawing/2014/main" val="1345960299"/>
+                  </a:ext>
+                </a:extLst>
+              </a:tr>
+              <a:tr h="1219200">
+                <a:tc>
+                  <a:txBody>
+                    <a:bodyPr/>
+                    <a:lstStyle/>
+                    <a:p>
+                      <a:r>
+                        <a:rPr lang="en-GB" sz="1200" dirty="0" smtClean="0"/>
+                        <a:t>Fail to compare</a:t>
+                      </a:r>
+                      <a:r>
+                        <a:rPr lang="en-GB" sz="1200" baseline="0" dirty="0" smtClean="0"/>
+                        <a:t> other face recognition libraries</a:t>
+                      </a:r>
+                      <a:endParaRPr lang="en-GB" sz="1200" dirty="0"/>
+                    </a:p>
+                  </a:txBody>
+                  <a:tcPr marL="42594" marR="42594" marT="21297" marB="21297"/>
+                </a:tc>
+                <a:tc>
+                  <a:txBody>
+                    <a:bodyPr/>
+                    <a:lstStyle/>
+                    <a:p>
+                      <a:r>
+                        <a:rPr lang="en-GB" sz="1200" dirty="0" smtClean="0"/>
+                        <a:t>L:3,L:2</a:t>
+                      </a:r>
+                      <a:endParaRPr lang="en-GB" sz="1200" dirty="0"/>
+                    </a:p>
+                  </a:txBody>
+                  <a:tcPr marL="42594" marR="42594" marT="21297" marB="21297"/>
+                </a:tc>
+                <a:tc>
+                  <a:txBody>
+                    <a:bodyPr/>
+                    <a:lstStyle/>
+                    <a:p>
+                      <a:r>
+                        <a:rPr lang="en-GB" sz="1200" dirty="0" smtClean="0"/>
+                        <a:t>This will</a:t>
+                      </a:r>
+                      <a:r>
+                        <a:rPr lang="en-GB" sz="1200" baseline="0" dirty="0" smtClean="0"/>
+                        <a:t> mean a better face recognition library I do not test may provide better results in the future</a:t>
+                      </a:r>
+                      <a:endParaRPr lang="en-GB" sz="1200" dirty="0"/>
+                    </a:p>
+                  </a:txBody>
+                  <a:tcPr marL="42594" marR="42594" marT="21297" marB="21297"/>
+                </a:tc>
+                <a:tc>
+                  <a:txBody>
+                    <a:bodyPr/>
+                    <a:lstStyle/>
+                    <a:p>
+                      <a:pPr marL="0" marR="0" lvl="0" indent="0" algn="l" defTabSz="2507943" rtl="0" eaLnBrk="1" fontAlgn="auto" latinLnBrk="0" hangingPunct="1">
+                        <a:lnSpc>
+                          <a:spcPct val="100000"/>
+                        </a:lnSpc>
+                        <a:spcBef>
+                          <a:spcPts val="0"/>
+                        </a:spcBef>
+                        <a:spcAft>
+                          <a:spcPts val="0"/>
+                        </a:spcAft>
+                        <a:buClrTx/>
+                        <a:buSzTx/>
+                        <a:buFontTx/>
+                        <a:buNone/>
+                        <a:tabLst/>
+                        <a:defRPr/>
+                      </a:pPr>
+                      <a:r>
+                        <a:rPr lang="en-GB" sz="1200" dirty="0" smtClean="0"/>
+                        <a:t>The</a:t>
+                      </a:r>
+                      <a:r>
+                        <a:rPr lang="en-GB" sz="1200" baseline="0" dirty="0" smtClean="0"/>
+                        <a:t> main objectives of implementing facial recognition into a drone and being able to switch targets will be possible</a:t>
+                      </a:r>
+                      <a:endParaRPr lang="en-GB" sz="1200" dirty="0" smtClean="0"/>
+                    </a:p>
+                  </a:txBody>
+                  <a:tcPr marL="42594" marR="42594" marT="21297" marB="21297"/>
+                </a:tc>
+                <a:extLst>
+                  <a:ext uri="{0D108BD9-81ED-4DB2-BD59-A6C34878D82A}">
+                    <a16:rowId xmlns:a16="http://schemas.microsoft.com/office/drawing/2014/main" val="768528767"/>
+                  </a:ext>
+                </a:extLst>
+              </a:tr>
+              <a:tr h="778094">
+                <a:tc>
+                  <a:txBody>
+                    <a:bodyPr/>
+                    <a:lstStyle/>
+                    <a:p>
+                      <a:r>
+                        <a:rPr lang="en-GB" sz="1200" dirty="0" smtClean="0"/>
+                        <a:t>Fail to get</a:t>
+                      </a:r>
+                      <a:r>
+                        <a:rPr lang="en-GB" sz="1200" baseline="0" dirty="0" smtClean="0"/>
+                        <a:t> raspberry pi but get suitable drone</a:t>
+                      </a:r>
+                      <a:endParaRPr lang="en-GB" sz="1200" dirty="0"/>
+                    </a:p>
+                  </a:txBody>
+                  <a:tcPr marL="42594" marR="42594" marT="21297" marB="21297"/>
+                </a:tc>
+                <a:tc>
+                  <a:txBody>
+                    <a:bodyPr/>
+                    <a:lstStyle/>
+                    <a:p>
+                      <a:r>
+                        <a:rPr lang="en-GB" sz="1200" dirty="0" smtClean="0"/>
+                        <a:t>L:5, C:1</a:t>
+                      </a:r>
+                      <a:endParaRPr lang="en-GB" sz="1200" dirty="0"/>
+                    </a:p>
+                  </a:txBody>
+                  <a:tcPr marL="42594" marR="42594" marT="21297" marB="21297"/>
+                </a:tc>
+                <a:tc>
+                  <a:txBody>
+                    <a:bodyPr/>
+                    <a:lstStyle/>
+                    <a:p>
+                      <a:r>
+                        <a:rPr lang="en-GB" sz="1200" dirty="0" smtClean="0"/>
+                        <a:t>Without a raspberry pi the project</a:t>
+                      </a:r>
+                      <a:r>
+                        <a:rPr lang="en-GB" sz="1200" baseline="0" dirty="0" smtClean="0"/>
+                        <a:t> will have to be done with VMs</a:t>
+                      </a:r>
+                      <a:endParaRPr lang="en-GB" sz="1200" dirty="0"/>
+                    </a:p>
+                  </a:txBody>
+                  <a:tcPr marL="42594" marR="42594" marT="21297" marB="21297"/>
+                </a:tc>
+                <a:tc>
+                  <a:txBody>
+                    <a:bodyPr/>
+                    <a:lstStyle/>
+                    <a:p>
+                      <a:r>
+                        <a:rPr lang="en-GB" sz="1100" dirty="0" smtClean="0"/>
+                        <a:t>This means that</a:t>
+                      </a:r>
+                      <a:r>
+                        <a:rPr lang="en-GB" sz="1100" baseline="0" dirty="0" smtClean="0"/>
+                        <a:t> facial recognition will not happen on the drone and instead on a computer after the video is streamed</a:t>
+                      </a:r>
+                      <a:endParaRPr lang="en-GB" sz="1100" dirty="0"/>
+                    </a:p>
+                  </a:txBody>
+                  <a:tcPr marL="42594" marR="42594" marT="21297" marB="21297"/>
+                </a:tc>
+                <a:extLst>
+                  <a:ext uri="{0D108BD9-81ED-4DB2-BD59-A6C34878D82A}">
+                    <a16:rowId xmlns:a16="http://schemas.microsoft.com/office/drawing/2014/main" val="1112826368"/>
+                  </a:ext>
+                </a:extLst>
+              </a:tr>
+            </a:tbl>
+          </a:graphicData>
+        </a:graphic>
+      </p:graphicFrame>
+      <p:pic>
+        <p:nvPicPr>
+          <p:cNvPr id="39" name="Picture 38"/>
+          <p:cNvPicPr>
+            <a:picLocks noChangeAspect="1"/>
+          </p:cNvPicPr>
+          <p:nvPr/>
+        </p:nvPicPr>
+        <p:blipFill rotWithShape="1">
+          <a:blip r:embed="rId7"/>
+          <a:srcRect l="1" r="5815" b="9572"/>
+          <a:stretch/>
+        </p:blipFill>
+        <p:spPr>
+          <a:xfrm>
+            <a:off x="25850849" y="3578060"/>
+            <a:ext cx="571501" cy="536236"/>
+          </a:xfrm>
+          <a:prstGeom prst="rect">
+            <a:avLst/>
+          </a:prstGeom>
+        </p:spPr>
+      </p:pic>
+      <p:pic>
+        <p:nvPicPr>
+          <p:cNvPr id="40" name="Picture 39"/>
+          <p:cNvPicPr>
+            <a:picLocks noChangeAspect="1"/>
+          </p:cNvPicPr>
+          <p:nvPr/>
+        </p:nvPicPr>
+        <p:blipFill>
+          <a:blip r:embed="rId8"/>
+          <a:stretch>
+            <a:fillRect/>
+          </a:stretch>
+        </p:blipFill>
+        <p:spPr>
+          <a:xfrm>
+            <a:off x="24373353" y="3787573"/>
+            <a:ext cx="581310" cy="505487"/>
+          </a:xfrm>
+          <a:prstGeom prst="rect">
+            <a:avLst/>
+          </a:prstGeom>
+        </p:spPr>
+      </p:pic>
+      <p:pic>
+        <p:nvPicPr>
+          <p:cNvPr id="41" name="Picture 40"/>
+          <p:cNvPicPr>
+            <a:picLocks noChangeAspect="1"/>
+          </p:cNvPicPr>
+          <p:nvPr/>
+        </p:nvPicPr>
+        <p:blipFill>
+          <a:blip r:embed="rId9"/>
+          <a:stretch>
+            <a:fillRect/>
+          </a:stretch>
+        </p:blipFill>
+        <p:spPr>
+          <a:xfrm>
+            <a:off x="21626343" y="3799278"/>
+            <a:ext cx="518294" cy="446308"/>
+          </a:xfrm>
+          <a:prstGeom prst="rect">
+            <a:avLst/>
+          </a:prstGeom>
+        </p:spPr>
+      </p:pic>
+      <p:pic>
+        <p:nvPicPr>
+          <p:cNvPr id="13" name="Picture 12"/>
+          <p:cNvPicPr>
+            <a:picLocks noChangeAspect="1"/>
+          </p:cNvPicPr>
+          <p:nvPr/>
+        </p:nvPicPr>
+        <p:blipFill>
+          <a:blip r:embed="rId10" cstate="print">
+            <a:extLst>
+              <a:ext uri="{28A0092B-C50C-407E-A947-70E740481C1C}">
+                <a14:useLocalDpi xmlns:a14="http://schemas.microsoft.com/office/drawing/2010/main" val="0"/>
+              </a:ext>
+            </a:extLst>
+          </a:blip>
+          <a:stretch>
+            <a:fillRect/>
+          </a:stretch>
+        </p:blipFill>
+        <p:spPr>
+          <a:xfrm>
+            <a:off x="22801978" y="3767891"/>
+            <a:ext cx="636365" cy="636365"/>
+          </a:xfrm>
+          <a:prstGeom prst="rect">
+            <a:avLst/>
+          </a:prstGeom>
+        </p:spPr>
+      </p:pic>
+      <p:sp>
+        <p:nvSpPr>
+          <p:cNvPr id="14" name="TextBox 13"/>
+          <p:cNvSpPr txBox="1"/>
+          <p:nvPr/>
+        </p:nvSpPr>
+        <p:spPr>
+          <a:xfrm>
+            <a:off x="20597439" y="8270603"/>
+            <a:ext cx="2514235" cy="523220"/>
+          </a:xfrm>
+          <a:prstGeom prst="rect">
+            <a:avLst/>
+          </a:prstGeom>
+          <a:noFill/>
+        </p:spPr>
+        <p:txBody>
+          <a:bodyPr wrap="square" rtlCol="0">
+            <a:spAutoFit/>
+          </a:bodyPr>
+          <a:lstStyle/>
+          <a:p>
+            <a:r>
+              <a:rPr lang="en-GB" sz="1400" dirty="0" smtClean="0">
+                <a:latin typeface="Times New Roman" panose="02020603050405020304" pitchFamily="18" charset="0"/>
+                <a:cs typeface="Times New Roman" panose="02020603050405020304" pitchFamily="18" charset="0"/>
+              </a:rPr>
+              <a:t>L: Likelihood, C: Consequence, high numbers </a:t>
+            </a:r>
+            <a:r>
+              <a:rPr lang="en-GB" sz="1400" dirty="0" smtClean="0">
+                <a:latin typeface="Times New Roman" panose="02020603050405020304" pitchFamily="18" charset="0"/>
+                <a:cs typeface="Times New Roman" panose="02020603050405020304" pitchFamily="18" charset="0"/>
+              </a:rPr>
+              <a:t>mean more likely</a:t>
+            </a:r>
+            <a:endParaRPr lang="en-GB" sz="1400" dirty="0">
+              <a:latin typeface="Times New Roman" panose="02020603050405020304" pitchFamily="18" charset="0"/>
+              <a:cs typeface="Times New Roman" panose="02020603050405020304" pitchFamily="18" charset="0"/>
+            </a:endParaRPr>
           </a:p>
         </p:txBody>
       </p:sp>

</xml_diff>

<commit_message>
Improved the work on the poster for my frontiers of robotics research and almost have something presentable
</commit_message>
<xml_diff>
--- a/Frontiers of Robotics Research/Project/StephenRerriBekibeleDissertationPosterPresentations-36x60-Template-Newfield.pptx
+++ b/Frontiers of Robotics Research/Project/StephenRerriBekibeleDissertationPosterPresentations-36x60-Template-Newfield.pptx
@@ -6844,7 +6844,7 @@
                           <a:hlinkClick r:id="rId7">
                             <a:extLst>
                               <a:ext uri="{A12FA001-AC4F-418D-AE19-62706E023703}">
-                                <ahyp:hlinkClr xmlns:ahyp="http://schemas.microsoft.com/office/drawing/2018/hyperlinkcolor" xmlns="" val="tx"/>
+                                <ahyp:hlinkClr xmlns="" xmlns:ahyp="http://schemas.microsoft.com/office/drawing/2018/hyperlinkcolor" val="tx"/>
                               </a:ext>
                             </a:extLst>
                           </a:hlinkClick>
@@ -11179,7 +11179,7 @@
                           <a:hlinkClick r:id="rId7">
                             <a:extLst>
                               <a:ext uri="{A12FA001-AC4F-418D-AE19-62706E023703}">
-                                <ahyp:hlinkClr xmlns:ahyp="http://schemas.microsoft.com/office/drawing/2018/hyperlinkcolor" xmlns="" val="tx"/>
+                                <ahyp:hlinkClr xmlns="" xmlns:ahyp="http://schemas.microsoft.com/office/drawing/2018/hyperlinkcolor" val="tx"/>
                               </a:ext>
                             </a:extLst>
                           </a:hlinkClick>
@@ -14803,7 +14803,7 @@
                           <a:hlinkClick r:id="rId7">
                             <a:extLst>
                               <a:ext uri="{A12FA001-AC4F-418D-AE19-62706E023703}">
-                                <ahyp:hlinkClr xmlns:ahyp="http://schemas.microsoft.com/office/drawing/2018/hyperlinkcolor" xmlns="" val="tx"/>
+                                <ahyp:hlinkClr xmlns="" xmlns:ahyp="http://schemas.microsoft.com/office/drawing/2018/hyperlinkcolor" val="tx"/>
                               </a:ext>
                             </a:extLst>
                           </a:hlinkClick>
@@ -16399,7 +16399,7 @@
         <p:spPr>
           <a:xfrm>
             <a:off x="568308" y="3063161"/>
-            <a:ext cx="6285508" cy="2944529"/>
+            <a:ext cx="6285508" cy="3144584"/>
           </a:xfrm>
         </p:spPr>
         <p:txBody>
@@ -16413,13 +16413,16 @@
                     <a:lumMod val="50000"/>
                   </a:schemeClr>
                 </a:solidFill>
-                <a:latin typeface="Times New Roman" panose="02020603050405020304" pitchFamily="18" charset="0"/>
-                <a:cs typeface="Times New Roman" panose="02020603050405020304" pitchFamily="18" charset="0"/>
+                <a:latin typeface="Arial" panose="020B0604020202020204" pitchFamily="34" charset="0"/>
+                <a:cs typeface="Arial" panose="020B0604020202020204" pitchFamily="34" charset="0"/>
               </a:rPr>
               <a:t>The use of drones in the modern world has been increasing. From the little drones children play with in their backyard and parks to their distant cousins in warfare, movie making, nature observing, and the list continues to increase. As the uses of drones becomes more normalized in everyday life there has been a demand for harsher laws to prevent unlawful uses of our beloved toys. These laws mean there are restrictions on who can fly certain drones and where drones can be operated. One aim of this research paper is to challenge the question: if we can’t fly the drones, can we make the drones fly themselves and achieve meaningful results? One such application of this question is to design infrastructure that would allow law enforcement agencies and search and rescu</a:t>
             </a:r>
             <a:r>
-              <a:rPr lang="en-US" sz="1300" dirty="0"/>
+              <a:rPr lang="en-US" sz="1300" dirty="0">
+                <a:latin typeface="Arial" panose="020B0604020202020204" pitchFamily="34" charset="0"/>
+                <a:cs typeface="Arial" panose="020B0604020202020204" pitchFamily="34" charset="0"/>
+              </a:rPr>
               <a:t>e agencies </a:t>
             </a:r>
             <a:r>
@@ -16429,14 +16432,17 @@
                     <a:lumMod val="50000"/>
                   </a:schemeClr>
                 </a:solidFill>
-                <a:latin typeface="Times New Roman" panose="02020603050405020304" pitchFamily="18" charset="0"/>
-                <a:cs typeface="Times New Roman" panose="02020603050405020304" pitchFamily="18" charset="0"/>
+                <a:latin typeface="Arial" panose="020B0604020202020204" pitchFamily="34" charset="0"/>
+                <a:cs typeface="Arial" panose="020B0604020202020204" pitchFamily="34" charset="0"/>
               </a:rPr>
               <a:t>to employ the help of autonomous drones with facial recognition for law keeping and searching for people of interest in urban areas.</a:t>
             </a:r>
           </a:p>
           <a:p>
-            <a:endParaRPr lang="en-US" sz="1300" dirty="0"/>
+            <a:endParaRPr lang="en-US" sz="1300" dirty="0">
+              <a:latin typeface="Arial" panose="020B0604020202020204" pitchFamily="34" charset="0"/>
+              <a:cs typeface="Arial" panose="020B0604020202020204" pitchFamily="34" charset="0"/>
+            </a:endParaRPr>
           </a:p>
           <a:p>
             <a:r>
@@ -16446,8 +16452,8 @@
                     <a:lumMod val="50000"/>
                   </a:schemeClr>
                 </a:solidFill>
-                <a:latin typeface="Times New Roman" panose="02020603050405020304" pitchFamily="18" charset="0"/>
-                <a:cs typeface="Times New Roman" panose="02020603050405020304" pitchFamily="18" charset="0"/>
+                <a:latin typeface="Arial" panose="020B0604020202020204" pitchFamily="34" charset="0"/>
+                <a:cs typeface="Arial" panose="020B0604020202020204" pitchFamily="34" charset="0"/>
               </a:rPr>
               <a:t>According to research by PwC there could be 76,000 drones in the UK by 2030</a:t>
             </a:r>
@@ -16464,7 +16470,11 @@
             <p:ph type="body" sz="quarter" idx="11"/>
           </p:nvPr>
         </p:nvSpPr>
-        <p:spPr/>
+        <p:spPr>
+          <a:solidFill>
+            <a:srgbClr val="326BBA"/>
+          </a:solidFill>
+        </p:spPr>
         <p:txBody>
           <a:bodyPr/>
           <a:lstStyle/>
@@ -16524,36 +16534,60 @@
             </a:r>
           </a:p>
           <a:p>
+            <a:pPr marL="342900" indent="-342900">
+              <a:buFont typeface="+mj-lt"/>
+              <a:buAutoNum type="arabicPeriod"/>
+            </a:pPr>
             <a:r>
               <a:rPr lang="en-GB" sz="1300" dirty="0"/>
               <a:t>Create a solid and secure infrastructure for the communication of personal data to a remote server.</a:t>
             </a:r>
           </a:p>
           <a:p>
+            <a:pPr marL="342900" indent="-342900">
+              <a:buFont typeface="+mj-lt"/>
+              <a:buAutoNum type="arabicPeriod"/>
+            </a:pPr>
             <a:r>
               <a:rPr lang="en-GB" sz="1300" dirty="0"/>
               <a:t>To build a system that can receive images and act based on the received images during a live video feed</a:t>
             </a:r>
           </a:p>
           <a:p>
+            <a:pPr marL="342900" indent="-342900">
+              <a:buFont typeface="+mj-lt"/>
+              <a:buAutoNum type="arabicPeriod"/>
+            </a:pPr>
             <a:r>
               <a:rPr lang="en-GB" sz="1300" dirty="0"/>
               <a:t>To safely navigate to an individual in a crowded place</a:t>
             </a:r>
           </a:p>
           <a:p>
+            <a:pPr marL="342900" indent="-342900">
+              <a:buFont typeface="+mj-lt"/>
+              <a:buAutoNum type="arabicPeriod"/>
+            </a:pPr>
             <a:r>
               <a:rPr lang="en-GB" sz="1300" dirty="0"/>
               <a:t>To accurately navigate to the correct individual in a crowded place</a:t>
             </a:r>
           </a:p>
           <a:p>
+            <a:pPr marL="342900" indent="-342900">
+              <a:buFont typeface="+mj-lt"/>
+              <a:buAutoNum type="arabicPeriod"/>
+            </a:pPr>
             <a:r>
               <a:rPr lang="en-GB" sz="1300" dirty="0"/>
               <a:t>For the drone to be able to learn the best heights to be at for and accurate monitoring of a target.</a:t>
             </a:r>
           </a:p>
           <a:p>
+            <a:pPr marL="342900" indent="-342900">
+              <a:buFont typeface="+mj-lt"/>
+              <a:buAutoNum type="arabicPeriod"/>
+            </a:pPr>
             <a:r>
               <a:rPr lang="en-GB" sz="1300" dirty="0"/>
               <a:t>To introduce a novel and appropriate use of drone and facial recognition technology for the aid of government and corporation operations.</a:t>
@@ -16587,6 +16621,9 @@
             <a:off x="570293" y="6116831"/>
             <a:ext cx="6281539" cy="428684"/>
           </a:xfrm>
+          <a:solidFill>
+            <a:srgbClr val="326BBA"/>
+          </a:solidFill>
         </p:spPr>
         <p:txBody>
           <a:bodyPr/>
@@ -16594,15 +16631,7 @@
           <a:p>
             <a:r>
               <a:rPr lang="en-US" dirty="0" smtClean="0"/>
-              <a:t>Aims </a:t>
-            </a:r>
-            <a:r>
-              <a:rPr lang="en-US" dirty="0" smtClean="0"/>
-              <a:t>&amp; </a:t>
-            </a:r>
-            <a:r>
-              <a:rPr lang="en-US" dirty="0" smtClean="0"/>
-              <a:t>Objectives</a:t>
+              <a:t>Aims &amp; Objectives</a:t>
             </a:r>
             <a:endParaRPr lang="en-US" dirty="0"/>
           </a:p>
@@ -16621,7 +16650,7 @@
         <p:spPr>
           <a:xfrm>
             <a:off x="7241977" y="3079512"/>
-            <a:ext cx="12950030" cy="1166074"/>
+            <a:ext cx="12950030" cy="1624168"/>
           </a:xfrm>
         </p:spPr>
         <p:txBody>
@@ -16641,7 +16670,11 @@
               <a:t>The facial recognition library being used is the “world’s simplest face recognition library” such uses </a:t>
             </a:r>
             <a:r>
-              <a:rPr lang="en-US" sz="1300" dirty="0" err="1">
+              <a:rPr lang="en-US" sz="1300" dirty="0"/>
+              <a:t>D</a:t>
+            </a:r>
+            <a:r>
+              <a:rPr lang="en-US" sz="1300" dirty="0" smtClean="0">
                 <a:solidFill>
                   <a:schemeClr val="accent5">
                     <a:lumMod val="50000"/>
@@ -16650,7 +16683,7 @@
                 <a:latin typeface="Times New Roman" panose="02020603050405020304" pitchFamily="18" charset="0"/>
                 <a:cs typeface="Times New Roman" panose="02020603050405020304" pitchFamily="18" charset="0"/>
               </a:rPr>
-              <a:t>dlib’s</a:t>
+              <a:t>lib’s </a:t>
             </a:r>
             <a:r>
               <a:rPr lang="en-US" sz="1300" dirty="0">
@@ -16662,7 +16695,7 @@
                 <a:latin typeface="Times New Roman" panose="02020603050405020304" pitchFamily="18" charset="0"/>
                 <a:cs typeface="Times New Roman" panose="02020603050405020304" pitchFamily="18" charset="0"/>
               </a:rPr>
-              <a:t> state-of-the-art face recognition built with deep learning. The model has an accuracy of 99.38% on the </a:t>
+              <a:t>state-of-the-art face recognition built with deep learning. The model has an accuracy of 99.38% on the </a:t>
             </a:r>
             <a:r>
               <a:rPr lang="en-US" sz="1300" dirty="0">
@@ -16741,7 +16774,11 @@
             <p:ph type="body" sz="quarter" idx="22"/>
           </p:nvPr>
         </p:nvSpPr>
-        <p:spPr/>
+        <p:spPr>
+          <a:solidFill>
+            <a:srgbClr val="326BBA"/>
+          </a:solidFill>
+        </p:spPr>
         <p:txBody>
           <a:bodyPr/>
           <a:lstStyle/>
@@ -16788,34 +16825,6 @@
       </p:sp>
       <p:sp>
         <p:nvSpPr>
-          <p:cNvPr id="307" name="Text Placeholder 306"/>
-          <p:cNvSpPr>
-            <a:spLocks noGrp="1"/>
-          </p:cNvSpPr>
-          <p:nvPr>
-            <p:ph type="body" sz="quarter" idx="24"/>
-          </p:nvPr>
-        </p:nvSpPr>
-        <p:spPr>
-          <a:xfrm>
-            <a:off x="7240984" y="10406462"/>
-            <a:ext cx="12950031" cy="428684"/>
-          </a:xfrm>
-        </p:spPr>
-        <p:txBody>
-          <a:bodyPr/>
-          <a:lstStyle/>
-          <a:p>
-            <a:r>
-              <a:rPr lang="en-US" dirty="0" smtClean="0"/>
-              <a:t>Research Results</a:t>
-            </a:r>
-            <a:endParaRPr lang="en-US" dirty="0"/>
-          </a:p>
-        </p:txBody>
-      </p:sp>
-      <p:sp>
-        <p:nvSpPr>
           <p:cNvPr id="308" name="Text Placeholder 307"/>
           <p:cNvSpPr>
             <a:spLocks noGrp="1"/>
@@ -16829,6 +16838,9 @@
             <a:off x="20629945" y="8805781"/>
             <a:ext cx="6279386" cy="428684"/>
           </a:xfrm>
+          <a:solidFill>
+            <a:srgbClr val="326BBA"/>
+          </a:solidFill>
         </p:spPr>
         <p:txBody>
           <a:bodyPr/>
@@ -16914,11 +16926,18 @@
             <a:off x="20629945" y="12768866"/>
             <a:ext cx="6279386" cy="428684"/>
           </a:xfrm>
+          <a:solidFill>
+            <a:srgbClr val="326BBA"/>
+          </a:solidFill>
         </p:spPr>
         <p:txBody>
           <a:bodyPr/>
           <a:lstStyle/>
           <a:p>
+            <a:r>
+              <a:rPr lang="en-US" dirty="0" smtClean="0"/>
+              <a:t>References</a:t>
+            </a:r>
             <a:endParaRPr lang="en-US" dirty="0"/>
           </a:p>
         </p:txBody>
@@ -17012,6 +17031,9 @@
             <a:off x="20579674" y="15210368"/>
             <a:ext cx="6279386" cy="428684"/>
           </a:xfrm>
+          <a:solidFill>
+            <a:srgbClr val="326BBA"/>
+          </a:solidFill>
         </p:spPr>
         <p:txBody>
           <a:bodyPr/>
@@ -17174,8 +17196,8 @@
         </p:nvSpPr>
         <p:spPr>
           <a:xfrm>
-            <a:off x="7241978" y="9315145"/>
-            <a:ext cx="12950030" cy="1584157"/>
+            <a:off x="7189141" y="9134502"/>
+            <a:ext cx="12950030" cy="1344091"/>
           </a:xfrm>
           <a:prstGeom prst="rect">
             <a:avLst/>
@@ -17336,10 +17358,12 @@
           <a:p>
             <a:r>
               <a:rPr lang="en-US" sz="1300" dirty="0"/>
-              <a:t>To test the application 2 virtual machines were setup, one to simulate a drone with a raspberry pi and another to simulate a device sending target information to the drone. This was done via two python scripts one to act as a sender and the other, a receiver.</a:t>
+              <a:t>To test the application 2 virtual machines were setup, one to simulate a drone with a raspberry pi and another to simulate a device sending target information to the drone. This was done via two python scripts one to act as a sender and the other, a receiver</a:t>
             </a:r>
-          </a:p>
-          <a:p>
+            <a:r>
+              <a:rPr lang="en-US" sz="1300" dirty="0" smtClean="0"/>
+              <a:t>.</a:t>
+            </a:r>
             <a:endParaRPr lang="en-US" sz="1300" dirty="0"/>
           </a:p>
         </p:txBody>
@@ -17638,7 +17662,9 @@
           <a:prstGeom prst="rect">
             <a:avLst/>
           </a:prstGeom>
-          <a:noFill/>
+          <a:solidFill>
+            <a:srgbClr val="326BBA"/>
+          </a:solidFill>
           <a:ln>
             <a:solidFill>
               <a:schemeClr val="tx1"/>
@@ -18053,7 +18079,7 @@
           <p:nvPr>
             <p:extLst>
               <p:ext uri="{D42A27DB-BD31-4B8C-83A1-F6EECF244321}">
-                <p14:modId xmlns:p14="http://schemas.microsoft.com/office/powerpoint/2010/main" val="1701850731"/>
+                <p14:modId xmlns:p14="http://schemas.microsoft.com/office/powerpoint/2010/main" val="4196939652"/>
               </p:ext>
             </p:extLst>
           </p:nvPr>
@@ -18634,7 +18660,7 @@
         </p:blipFill>
         <p:spPr>
           <a:xfrm>
-            <a:off x="22801978" y="3767891"/>
+            <a:off x="22686114" y="3609221"/>
             <a:ext cx="636365" cy="636365"/>
           </a:xfrm>
           <a:prstGeom prst="rect">
@@ -18669,14 +18695,7 @@
                 <a:latin typeface="Times New Roman" panose="02020603050405020304" pitchFamily="18" charset="0"/>
                 <a:cs typeface="Times New Roman" panose="02020603050405020304" pitchFamily="18" charset="0"/>
               </a:rPr>
-              <a:t>L: Likelihood, C: Consequence, high numbers </a:t>
-            </a:r>
-            <a:r>
-              <a:rPr lang="en-GB" sz="1400" dirty="0" smtClean="0">
-                <a:latin typeface="Times New Roman" panose="02020603050405020304" pitchFamily="18" charset="0"/>
-                <a:cs typeface="Times New Roman" panose="02020603050405020304" pitchFamily="18" charset="0"/>
-              </a:rPr>
-              <a:t>mean more likely</a:t>
+              <a:t>L: Likelihood, C: Consequence, high numbers mean more likely</a:t>
             </a:r>
             <a:endParaRPr lang="en-GB" sz="1400" dirty="0">
               <a:latin typeface="Times New Roman" panose="02020603050405020304" pitchFamily="18" charset="0"/>
@@ -18685,6 +18704,97 @@
           </a:p>
         </p:txBody>
       </p:sp>
+      <p:sp>
+        <p:nvSpPr>
+          <p:cNvPr id="307" name="Text Placeholder 306"/>
+          <p:cNvSpPr>
+            <a:spLocks noGrp="1"/>
+          </p:cNvSpPr>
+          <p:nvPr>
+            <p:ph type="body" sz="quarter" idx="24"/>
+          </p:nvPr>
+        </p:nvSpPr>
+        <p:spPr>
+          <a:xfrm>
+            <a:off x="7240984" y="10406462"/>
+            <a:ext cx="12950031" cy="428684"/>
+          </a:xfrm>
+          <a:solidFill>
+            <a:srgbClr val="326BBA"/>
+          </a:solidFill>
+        </p:spPr>
+        <p:txBody>
+          <a:bodyPr/>
+          <a:lstStyle/>
+          <a:p>
+            <a:r>
+              <a:rPr lang="en-US" dirty="0" smtClean="0"/>
+              <a:t>Research Results</a:t>
+            </a:r>
+            <a:endParaRPr lang="en-US" dirty="0"/>
+          </a:p>
+        </p:txBody>
+      </p:sp>
+      <p:pic>
+        <p:nvPicPr>
+          <p:cNvPr id="6" name="Picture 5"/>
+          <p:cNvPicPr>
+            <a:picLocks noChangeAspect="1"/>
+          </p:cNvPicPr>
+          <p:nvPr/>
+        </p:nvPicPr>
+        <p:blipFill>
+          <a:blip r:embed="rId11">
+            <a:extLst>
+              <a:ext uri="{28A0092B-C50C-407E-A947-70E740481C1C}">
+                <a14:useLocalDpi xmlns:a14="http://schemas.microsoft.com/office/drawing/2010/main" val="0"/>
+              </a:ext>
+            </a:extLst>
+          </a:blip>
+          <a:stretch>
+            <a:fillRect/>
+          </a:stretch>
+        </p:blipFill>
+        <p:spPr>
+          <a:xfrm>
+            <a:off x="24527986" y="64689"/>
+            <a:ext cx="2148944" cy="2165570"/>
+          </a:xfrm>
+          <a:prstGeom prst="rect">
+            <a:avLst/>
+          </a:prstGeom>
+        </p:spPr>
+      </p:pic>
+      <p:pic>
+        <p:nvPicPr>
+          <p:cNvPr id="7" name="Picture 6"/>
+          <p:cNvPicPr>
+            <a:picLocks noChangeAspect="1"/>
+          </p:cNvPicPr>
+          <p:nvPr/>
+        </p:nvPicPr>
+        <p:blipFill>
+          <a:blip r:embed="rId12">
+            <a:extLst>
+              <a:ext uri="{28A0092B-C50C-407E-A947-70E740481C1C}">
+                <a14:useLocalDpi xmlns:a14="http://schemas.microsoft.com/office/drawing/2010/main" val="0"/>
+              </a:ext>
+            </a:extLst>
+          </a:blip>
+          <a:stretch>
+            <a:fillRect/>
+          </a:stretch>
+        </p:blipFill>
+        <p:spPr>
+          <a:xfrm>
+            <a:off x="-415328" y="-35344"/>
+            <a:ext cx="6638683" cy="3293667"/>
+          </a:xfrm>
+          <a:prstGeom prst="rect">
+            <a:avLst/>
+          </a:prstGeom>
+        </p:spPr>
+      </p:pic>
     </p:spTree>
     <p:extLst>
       <p:ext uri="{BB962C8B-B14F-4D97-AF65-F5344CB8AC3E}">
@@ -18695,6 +18805,13 @@
   <p:clrMapOvr>
     <a:masterClrMapping/>
   </p:clrMapOvr>
+  <p:timing>
+    <p:tnLst>
+      <p:par>
+        <p:cTn id="1" dur="indefinite" restart="never" nodeType="tmRoot"/>
+      </p:par>
+    </p:tnLst>
+  </p:timing>
 </p:sld>
 </file>
 

</xml_diff>

<commit_message>
Recovered some work from my broken computer
</commit_message>
<xml_diff>
--- a/Frontiers of Robotics Research/Project/StephenRerriBekibeleDissertationPosterPresentations-36x60-Template-Newfield.pptx
+++ b/Frontiers of Robotics Research/Project/StephenRerriBekibeleDissertationPosterPresentations-36x60-Template-Newfield.pptx
@@ -6844,7 +6844,7 @@
                           <a:hlinkClick r:id="rId7">
                             <a:extLst>
                               <a:ext uri="{A12FA001-AC4F-418D-AE19-62706E023703}">
-                                <ahyp:hlinkClr xmlns:ahyp="http://schemas.microsoft.com/office/drawing/2018/hyperlinkcolor" xmlns="" val="tx"/>
+                                <ahyp:hlinkClr xmlns="" xmlns:ahyp="http://schemas.microsoft.com/office/drawing/2018/hyperlinkcolor" val="tx"/>
                               </a:ext>
                             </a:extLst>
                           </a:hlinkClick>
@@ -11179,7 +11179,7 @@
                           <a:hlinkClick r:id="rId7">
                             <a:extLst>
                               <a:ext uri="{A12FA001-AC4F-418D-AE19-62706E023703}">
-                                <ahyp:hlinkClr xmlns:ahyp="http://schemas.microsoft.com/office/drawing/2018/hyperlinkcolor" xmlns="" val="tx"/>
+                                <ahyp:hlinkClr xmlns="" xmlns:ahyp="http://schemas.microsoft.com/office/drawing/2018/hyperlinkcolor" val="tx"/>
                               </a:ext>
                             </a:extLst>
                           </a:hlinkClick>
@@ -14803,7 +14803,7 @@
                           <a:hlinkClick r:id="rId7">
                             <a:extLst>
                               <a:ext uri="{A12FA001-AC4F-418D-AE19-62706E023703}">
-                                <ahyp:hlinkClr xmlns:ahyp="http://schemas.microsoft.com/office/drawing/2018/hyperlinkcolor" xmlns="" val="tx"/>
+                                <ahyp:hlinkClr xmlns="" xmlns:ahyp="http://schemas.microsoft.com/office/drawing/2018/hyperlinkcolor" val="tx"/>
                               </a:ext>
                             </a:extLst>
                           </a:hlinkClick>
@@ -16943,7 +16943,7 @@
         <p:spPr>
           <a:xfrm>
             <a:off x="20626800" y="13392313"/>
-            <a:ext cx="6282531" cy="1888855"/>
+            <a:ext cx="6282531" cy="2128921"/>
           </a:xfrm>
         </p:spPr>
         <p:txBody>
@@ -16971,27 +16971,61 @@
             <a:endParaRPr lang="en-GB" u="sng" dirty="0" smtClean="0"/>
           </a:p>
           <a:p>
-            <a:endParaRPr lang="en-GB" sz="1300" u="sng" dirty="0">
-              <a:solidFill>
-                <a:schemeClr val="accent5">
-                  <a:lumMod val="50000"/>
-                </a:schemeClr>
-              </a:solidFill>
-              <a:latin typeface="Times New Roman" panose="02020603050405020304" pitchFamily="18" charset="0"/>
-              <a:cs typeface="Times New Roman" panose="02020603050405020304" pitchFamily="18" charset="0"/>
-            </a:endParaRPr>
-          </a:p>
-          <a:p>
             <a:r>
               <a:rPr lang="en-GB" sz="1300" u="sng" dirty="0" smtClean="0"/>
-              <a:t>Labelled Faces in the wild:</a:t>
+              <a:t>Labelled </a:t>
+            </a:r>
+            <a:r>
+              <a:rPr lang="en-GB" sz="1300" u="sng" dirty="0" smtClean="0"/>
+              <a:t>Faces in the wild:</a:t>
             </a:r>
           </a:p>
           <a:p>
             <a:r>
-              <a:rPr lang="en-US" sz="1300" dirty="0"/>
-              <a:t>http://vis-www.cs.umass.edu/lfw/results.html</a:t>
+              <a:rPr lang="en-US" sz="1300" dirty="0">
+                <a:hlinkClick r:id="rId4"/>
+              </a:rPr>
+              <a:t>http://</a:t>
             </a:r>
+            <a:r>
+              <a:rPr lang="en-US" sz="1300" dirty="0" smtClean="0">
+                <a:hlinkClick r:id="rId4"/>
+              </a:rPr>
+              <a:t>vis-www.cs.umass.edu/lfw/results.html</a:t>
+            </a:r>
+            <a:endParaRPr lang="en-US" sz="1300" dirty="0" smtClean="0"/>
+          </a:p>
+          <a:p>
+            <a:r>
+              <a:rPr lang="en-US" sz="1300" dirty="0" err="1" smtClean="0">
+                <a:solidFill>
+                  <a:schemeClr val="accent5">
+                    <a:lumMod val="50000"/>
+                  </a:schemeClr>
+                </a:solidFill>
+                <a:latin typeface="Times New Roman" panose="02020603050405020304" pitchFamily="18" charset="0"/>
+                <a:cs typeface="Times New Roman" panose="02020603050405020304" pitchFamily="18" charset="0"/>
+              </a:rPr>
+              <a:t>Dlib</a:t>
+            </a:r>
+            <a:r>
+              <a:rPr lang="en-US" sz="1300" smtClean="0">
+                <a:solidFill>
+                  <a:schemeClr val="accent5">
+                    <a:lumMod val="50000"/>
+                  </a:schemeClr>
+                </a:solidFill>
+                <a:latin typeface="Times New Roman" panose="02020603050405020304" pitchFamily="18" charset="0"/>
+                <a:cs typeface="Times New Roman" panose="02020603050405020304" pitchFamily="18" charset="0"/>
+              </a:rPr>
+              <a:t>: </a:t>
+            </a:r>
+            <a:r>
+              <a:rPr lang="en-US" sz="1300"/>
+              <a:t>http://dlib.net/</a:t>
+            </a:r>
+          </a:p>
+          <a:p>
             <a:endParaRPr lang="en-US" sz="1300" dirty="0">
               <a:solidFill>
                 <a:schemeClr val="accent5">
@@ -17365,7 +17399,7 @@
           <p:nvPr/>
         </p:nvPicPr>
         <p:blipFill>
-          <a:blip r:embed="rId4">
+          <a:blip r:embed="rId5">
             <a:extLst>
               <a:ext uri="{28A0092B-C50C-407E-A947-70E740481C1C}">
                 <a14:useLocalDpi xmlns:a14="http://schemas.microsoft.com/office/drawing/2010/main" val="0"/>
@@ -17393,7 +17427,7 @@
           <p:nvPr/>
         </p:nvPicPr>
         <p:blipFill>
-          <a:blip r:embed="rId5"/>
+          <a:blip r:embed="rId6"/>
           <a:stretch>
             <a:fillRect/>
           </a:stretch>
@@ -17463,7 +17497,7 @@
           <p:nvPr/>
         </p:nvPicPr>
         <p:blipFill>
-          <a:blip r:embed="rId6">
+          <a:blip r:embed="rId7">
             <a:extLst>
               <a:ext uri="{28A0092B-C50C-407E-A947-70E740481C1C}">
                 <a14:useLocalDpi xmlns:a14="http://schemas.microsoft.com/office/drawing/2010/main" val="0"/>
@@ -17862,11 +17896,7 @@
             </a:r>
             <a:r>
               <a:rPr lang="en-GB" sz="1300" dirty="0" smtClean="0"/>
-              <a:t>roidcam</a:t>
-            </a:r>
-            <a:r>
-              <a:rPr lang="en-GB" sz="1300" dirty="0" smtClean="0"/>
-              <a:t>, able to use mobile phones as computer cameras will be used to  connect a phone to the VM. Another device will then run the python script used to send a target image to the VM.</a:t>
+              <a:t>roidcam, able to use mobile phones as computer cameras will be used to  connect a phone to the VM. Another device will then run the python script used to send a target image to the VM.</a:t>
             </a:r>
           </a:p>
           <a:p>
@@ -17881,11 +17911,7 @@
           <a:p>
             <a:r>
               <a:rPr lang="en-GB" sz="1300" dirty="0" smtClean="0"/>
-              <a:t>Asides </a:t>
-            </a:r>
-            <a:r>
-              <a:rPr lang="en-GB" sz="1300" dirty="0" smtClean="0"/>
-              <a:t>from this, the ability of the algorithms to work in different lighting conditions will also be tested via speed of detection and confidence value </a:t>
+              <a:t>Asides from this, the ability of the algorithms to work in different lighting conditions will also be tested via speed of detection and confidence value </a:t>
             </a:r>
           </a:p>
           <a:p>
@@ -18571,7 +18597,7 @@
           <p:nvPr/>
         </p:nvPicPr>
         <p:blipFill rotWithShape="1">
-          <a:blip r:embed="rId7"/>
+          <a:blip r:embed="rId8"/>
           <a:srcRect l="1" r="5815" b="9572"/>
           <a:stretch/>
         </p:blipFill>
@@ -18594,7 +18620,7 @@
           <p:nvPr/>
         </p:nvPicPr>
         <p:blipFill>
-          <a:blip r:embed="rId8"/>
+          <a:blip r:embed="rId9"/>
           <a:stretch>
             <a:fillRect/>
           </a:stretch>
@@ -18618,7 +18644,7 @@
           <p:nvPr/>
         </p:nvPicPr>
         <p:blipFill>
-          <a:blip r:embed="rId9"/>
+          <a:blip r:embed="rId10"/>
           <a:stretch>
             <a:fillRect/>
           </a:stretch>
@@ -18642,7 +18668,7 @@
           <p:nvPr/>
         </p:nvPicPr>
         <p:blipFill>
-          <a:blip r:embed="rId10" cstate="print">
+          <a:blip r:embed="rId11" cstate="print">
             <a:extLst>
               <a:ext uri="{28A0092B-C50C-407E-A947-70E740481C1C}">
                 <a14:useLocalDpi xmlns:a14="http://schemas.microsoft.com/office/drawing/2010/main" val="0"/>
@@ -18739,7 +18765,7 @@
           <p:nvPr/>
         </p:nvPicPr>
         <p:blipFill>
-          <a:blip r:embed="rId11">
+          <a:blip r:embed="rId12">
             <a:extLst>
               <a:ext uri="{28A0092B-C50C-407E-A947-70E740481C1C}">
                 <a14:useLocalDpi xmlns:a14="http://schemas.microsoft.com/office/drawing/2010/main" val="0"/>
@@ -18769,7 +18795,7 @@
           <p:nvPr/>
         </p:nvPicPr>
         <p:blipFill>
-          <a:blip r:embed="rId12">
+          <a:blip r:embed="rId13">
             <a:extLst>
               <a:ext uri="{28A0092B-C50C-407E-A947-70E740481C1C}">
                 <a14:useLocalDpi xmlns:a14="http://schemas.microsoft.com/office/drawing/2010/main" val="0"/>
@@ -18790,46 +18816,6 @@
           </a:prstGeom>
         </p:spPr>
       </p:pic>
-      <p:sp>
-        <p:nvSpPr>
-          <p:cNvPr id="2" name="Rounded Rectangle 1"/>
-          <p:cNvSpPr/>
-          <p:nvPr/>
-        </p:nvSpPr>
-        <p:spPr>
-          <a:xfrm>
-            <a:off x="16050749" y="3799278"/>
-            <a:ext cx="914400" cy="914400"/>
-          </a:xfrm>
-          <a:prstGeom prst="roundRect">
-            <a:avLst/>
-          </a:prstGeom>
-        </p:spPr>
-        <p:style>
-          <a:lnRef idx="2">
-            <a:schemeClr val="accent1">
-              <a:shade val="50000"/>
-            </a:schemeClr>
-          </a:lnRef>
-          <a:fillRef idx="1">
-            <a:schemeClr val="accent1"/>
-          </a:fillRef>
-          <a:effectRef idx="0">
-            <a:schemeClr val="accent1"/>
-          </a:effectRef>
-          <a:fontRef idx="minor">
-            <a:schemeClr val="lt1"/>
-          </a:fontRef>
-        </p:style>
-        <p:txBody>
-          <a:bodyPr rtlCol="0" anchor="ctr"/>
-          <a:lstStyle/>
-          <a:p>
-            <a:pPr algn="ctr"/>
-            <a:endParaRPr lang="en-GB"/>
-          </a:p>
-        </p:txBody>
-      </p:sp>
       <p:grpSp>
         <p:nvGrpSpPr>
           <p:cNvPr id="19" name="Group 18"/>
@@ -18853,7 +18839,7 @@
             <p:nvPr/>
           </p:nvPicPr>
           <p:blipFill rotWithShape="1">
-            <a:blip r:embed="rId13">
+            <a:blip r:embed="rId14">
               <a:extLst>
                 <a:ext uri="{28A0092B-C50C-407E-A947-70E740481C1C}">
                   <a14:useLocalDpi xmlns:a14="http://schemas.microsoft.com/office/drawing/2010/main" val="0"/>
@@ -18882,7 +18868,7 @@
             <p:nvPr/>
           </p:nvPicPr>
           <p:blipFill rotWithShape="1">
-            <a:blip r:embed="rId13">
+            <a:blip r:embed="rId14">
               <a:extLst>
                 <a:ext uri="{28A0092B-C50C-407E-A947-70E740481C1C}">
                   <a14:useLocalDpi xmlns:a14="http://schemas.microsoft.com/office/drawing/2010/main" val="0"/>
@@ -18936,6 +18922,186 @@
               <a:latin typeface="Times New Roman" panose="02020603050405020304" pitchFamily="18" charset="0"/>
               <a:cs typeface="Times New Roman" panose="02020603050405020304" pitchFamily="18" charset="0"/>
             </a:endParaRPr>
+          </a:p>
+        </p:txBody>
+      </p:sp>
+      <p:sp>
+        <p:nvSpPr>
+          <p:cNvPr id="42" name="TextBox 41">
+            <a:extLst>
+              <a:ext uri="{FF2B5EF4-FFF2-40B4-BE49-F238E27FC236}">
+                <a16:creationId xmlns:a16="http://schemas.microsoft.com/office/drawing/2014/main" id="{104EBF87-5AF7-78B0-9ABF-1886709B5269}"/>
+              </a:ext>
+            </a:extLst>
+          </p:cNvPr>
+          <p:cNvSpPr txBox="1"/>
+          <p:nvPr/>
+        </p:nvSpPr>
+        <p:spPr>
+          <a:xfrm>
+            <a:off x="17601455" y="6470962"/>
+            <a:ext cx="3073138" cy="307777"/>
+          </a:xfrm>
+          <a:prstGeom prst="rect">
+            <a:avLst/>
+          </a:prstGeom>
+          <a:noFill/>
+        </p:spPr>
+        <p:txBody>
+          <a:bodyPr wrap="square" rtlCol="0">
+            <a:spAutoFit/>
+          </a:bodyPr>
+          <a:lstStyle/>
+          <a:p>
+            <a:r>
+              <a:rPr lang="en-GB" sz="1400" dirty="0">
+                <a:latin typeface="Times New Roman" panose="02020603050405020304" pitchFamily="18" charset="0"/>
+                <a:cs typeface="Times New Roman" panose="02020603050405020304" pitchFamily="18" charset="0"/>
+              </a:rPr>
+              <a:t>MX-chip is an </a:t>
+            </a:r>
+            <a:r>
+              <a:rPr lang="en-GB" sz="1400" dirty="0" err="1">
+                <a:latin typeface="Times New Roman" panose="02020603050405020304" pitchFamily="18" charset="0"/>
+                <a:cs typeface="Times New Roman" panose="02020603050405020304" pitchFamily="18" charset="0"/>
+              </a:rPr>
+              <a:t>iot</a:t>
+            </a:r>
+            <a:r>
+              <a:rPr lang="en-GB" sz="1400" dirty="0">
+                <a:latin typeface="Times New Roman" panose="02020603050405020304" pitchFamily="18" charset="0"/>
+                <a:cs typeface="Times New Roman" panose="02020603050405020304" pitchFamily="18" charset="0"/>
+              </a:rPr>
+              <a:t> device used to…..</a:t>
+            </a:r>
+          </a:p>
+        </p:txBody>
+      </p:sp>
+      <p:sp>
+        <p:nvSpPr>
+          <p:cNvPr id="43" name="TextBox 42">
+            <a:extLst>
+              <a:ext uri="{FF2B5EF4-FFF2-40B4-BE49-F238E27FC236}">
+                <a16:creationId xmlns:a16="http://schemas.microsoft.com/office/drawing/2014/main" id="{51AC535D-C030-92E8-7FF5-7ED989ECBCF4}"/>
+              </a:ext>
+            </a:extLst>
+          </p:cNvPr>
+          <p:cNvSpPr txBox="1"/>
+          <p:nvPr/>
+        </p:nvSpPr>
+        <p:spPr>
+          <a:xfrm>
+            <a:off x="10220033" y="8457394"/>
+            <a:ext cx="3073138" cy="523220"/>
+          </a:xfrm>
+          <a:prstGeom prst="rect">
+            <a:avLst/>
+          </a:prstGeom>
+          <a:noFill/>
+        </p:spPr>
+        <p:txBody>
+          <a:bodyPr wrap="square" rtlCol="0">
+            <a:spAutoFit/>
+          </a:bodyPr>
+          <a:lstStyle/>
+          <a:p>
+            <a:r>
+              <a:rPr lang="en-GB" sz="1400" dirty="0">
+                <a:latin typeface="Times New Roman" panose="02020603050405020304" pitchFamily="18" charset="0"/>
+                <a:cs typeface="Times New Roman" panose="02020603050405020304" pitchFamily="18" charset="0"/>
+              </a:rPr>
+              <a:t>Responsible for redirecting the drone </a:t>
+            </a:r>
+            <a:r>
+              <a:rPr lang="en-GB" sz="1400" dirty="0" err="1">
+                <a:latin typeface="Times New Roman" panose="02020603050405020304" pitchFamily="18" charset="0"/>
+                <a:cs typeface="Times New Roman" panose="02020603050405020304" pitchFamily="18" charset="0"/>
+              </a:rPr>
+              <a:t>fottage</a:t>
+            </a:r>
+            <a:r>
+              <a:rPr lang="en-GB" sz="1400" dirty="0">
+                <a:latin typeface="Times New Roman" panose="02020603050405020304" pitchFamily="18" charset="0"/>
+                <a:cs typeface="Times New Roman" panose="02020603050405020304" pitchFamily="18" charset="0"/>
+              </a:rPr>
+              <a:t> to the app client…..</a:t>
+            </a:r>
+          </a:p>
+        </p:txBody>
+      </p:sp>
+      <p:sp>
+        <p:nvSpPr>
+          <p:cNvPr id="44" name="TextBox 43">
+            <a:extLst>
+              <a:ext uri="{FF2B5EF4-FFF2-40B4-BE49-F238E27FC236}">
+                <a16:creationId xmlns:a16="http://schemas.microsoft.com/office/drawing/2014/main" id="{135E6FB6-2372-508B-5E5A-9EFFE0120D62}"/>
+              </a:ext>
+            </a:extLst>
+          </p:cNvPr>
+          <p:cNvSpPr txBox="1"/>
+          <p:nvPr/>
+        </p:nvSpPr>
+        <p:spPr>
+          <a:xfrm>
+            <a:off x="7860985" y="6409407"/>
+            <a:ext cx="3073138" cy="738664"/>
+          </a:xfrm>
+          <a:prstGeom prst="rect">
+            <a:avLst/>
+          </a:prstGeom>
+          <a:noFill/>
+        </p:spPr>
+        <p:txBody>
+          <a:bodyPr wrap="square" rtlCol="0">
+            <a:spAutoFit/>
+          </a:bodyPr>
+          <a:lstStyle/>
+          <a:p>
+            <a:r>
+              <a:rPr lang="en-GB" sz="1400" dirty="0">
+                <a:latin typeface="Times New Roman" panose="02020603050405020304" pitchFamily="18" charset="0"/>
+                <a:cs typeface="Times New Roman" panose="02020603050405020304" pitchFamily="18" charset="0"/>
+              </a:rPr>
+              <a:t>The app client will enable viewing of the resultant video stream as well as sending images to the drone…..</a:t>
+            </a:r>
+          </a:p>
+        </p:txBody>
+      </p:sp>
+      <p:sp>
+        <p:nvSpPr>
+          <p:cNvPr id="46" name="TextBox 45">
+            <a:extLst>
+              <a:ext uri="{FF2B5EF4-FFF2-40B4-BE49-F238E27FC236}">
+                <a16:creationId xmlns:a16="http://schemas.microsoft.com/office/drawing/2014/main" id="{1CCC593C-E9A8-803F-D9C8-C0134AA915CB}"/>
+              </a:ext>
+            </a:extLst>
+          </p:cNvPr>
+          <p:cNvSpPr txBox="1"/>
+          <p:nvPr/>
+        </p:nvSpPr>
+        <p:spPr>
+          <a:xfrm>
+            <a:off x="14916760" y="4503207"/>
+            <a:ext cx="3073138" cy="307777"/>
+          </a:xfrm>
+          <a:prstGeom prst="rect">
+            <a:avLst/>
+          </a:prstGeom>
+          <a:noFill/>
+        </p:spPr>
+        <p:txBody>
+          <a:bodyPr wrap="square" rtlCol="0">
+            <a:spAutoFit/>
+          </a:bodyPr>
+          <a:lstStyle/>
+          <a:p>
+            <a:r>
+              <a:rPr lang="en-GB" sz="1400" dirty="0">
+                <a:latin typeface="Times New Roman" panose="02020603050405020304" pitchFamily="18" charset="0"/>
+                <a:cs typeface="Times New Roman" panose="02020603050405020304" pitchFamily="18" charset="0"/>
+              </a:rPr>
+              <a:t>Raspberry pi is a device used to…..</a:t>
+            </a:r>
           </a:p>
         </p:txBody>
       </p:sp>

</xml_diff>

<commit_message>
Finished a literature review for the Frontiers of robotics research assignment
</commit_message>
<xml_diff>
--- a/Frontiers of Robotics Research/Project/StephenRerriBekibeleDissertationPosterPresentations-36x60-Template-Newfield.pptx
+++ b/Frontiers of Robotics Research/Project/StephenRerriBekibeleDissertationPosterPresentations-36x60-Template-Newfield.pptx
@@ -377,7 +377,7 @@
             <a:fld id="{E6CC2317-6751-4CD4-9995-8782DD78E936}" type="datetimeFigureOut">
               <a:rPr lang="en-US" smtClean="0"/>
               <a:pPr/>
-              <a:t>5/10/2022</a:t>
+              <a:t>5/11/2022</a:t>
             </a:fld>
             <a:endParaRPr lang="en-US" dirty="0"/>
           </a:p>
@@ -6844,7 +6844,7 @@
                           <a:hlinkClick r:id="rId7">
                             <a:extLst>
                               <a:ext uri="{A12FA001-AC4F-418D-AE19-62706E023703}">
-                                <ahyp:hlinkClr xmlns="" xmlns:ahyp="http://schemas.microsoft.com/office/drawing/2018/hyperlinkcolor" val="tx"/>
+                                <ahyp:hlinkClr xmlns:ahyp="http://schemas.microsoft.com/office/drawing/2018/hyperlinkcolor" xmlns="" val="tx"/>
                               </a:ext>
                             </a:extLst>
                           </a:hlinkClick>
@@ -11179,7 +11179,7 @@
                           <a:hlinkClick r:id="rId7">
                             <a:extLst>
                               <a:ext uri="{A12FA001-AC4F-418D-AE19-62706E023703}">
-                                <ahyp:hlinkClr xmlns="" xmlns:ahyp="http://schemas.microsoft.com/office/drawing/2018/hyperlinkcolor" val="tx"/>
+                                <ahyp:hlinkClr xmlns:ahyp="http://schemas.microsoft.com/office/drawing/2018/hyperlinkcolor" xmlns="" val="tx"/>
                               </a:ext>
                             </a:extLst>
                           </a:hlinkClick>
@@ -14803,7 +14803,7 @@
                           <a:hlinkClick r:id="rId7">
                             <a:extLst>
                               <a:ext uri="{A12FA001-AC4F-418D-AE19-62706E023703}">
-                                <ahyp:hlinkClr xmlns="" xmlns:ahyp="http://schemas.microsoft.com/office/drawing/2018/hyperlinkcolor" val="tx"/>
+                                <ahyp:hlinkClr xmlns:ahyp="http://schemas.microsoft.com/office/drawing/2018/hyperlinkcolor" xmlns="" val="tx"/>
                               </a:ext>
                             </a:extLst>
                           </a:hlinkClick>
@@ -16973,11 +16973,7 @@
           <a:p>
             <a:r>
               <a:rPr lang="en-GB" sz="1300" u="sng" dirty="0" smtClean="0"/>
-              <a:t>Labelled </a:t>
-            </a:r>
-            <a:r>
-              <a:rPr lang="en-GB" sz="1300" u="sng" dirty="0" smtClean="0"/>
-              <a:t>Faces in the wild:</a:t>
+              <a:t>Labelled Faces in the wild:</a:t>
             </a:r>
           </a:p>
           <a:p>
@@ -18100,14 +18096,14 @@
           <p:nvPr>
             <p:extLst>
               <p:ext uri="{D42A27DB-BD31-4B8C-83A1-F6EECF244321}">
-                <p14:modId xmlns:p14="http://schemas.microsoft.com/office/powerpoint/2010/main" val="4196939652"/>
+                <p14:modId xmlns:p14="http://schemas.microsoft.com/office/powerpoint/2010/main" val="2001147960"/>
               </p:ext>
             </p:extLst>
           </p:nvPr>
         </p:nvGraphicFramePr>
         <p:xfrm>
           <a:off x="20578147" y="3243902"/>
-          <a:ext cx="6282532" cy="5005432"/>
+          <a:ext cx="6282532" cy="5045106"/>
         </p:xfrm>
         <a:graphic>
           <a:graphicData uri="http://schemas.openxmlformats.org/drawingml/2006/table">
@@ -18399,14 +18395,14 @@
                     <a:lstStyle/>
                     <a:p>
                       <a:r>
-                        <a:rPr lang="en-GB" sz="1100" dirty="0" smtClean="0"/>
+                        <a:rPr lang="en-GB" sz="1200" dirty="0" smtClean="0"/>
                         <a:t>The images will</a:t>
                       </a:r>
                       <a:r>
-                        <a:rPr lang="en-GB" sz="1100" baseline="0" dirty="0" smtClean="0"/>
+                        <a:rPr lang="en-GB" sz="1200" baseline="0" dirty="0" smtClean="0"/>
                         <a:t> be sent over the internet via a secure port and then will encrypted.</a:t>
                       </a:r>
-                      <a:endParaRPr lang="en-GB" sz="1100" dirty="0"/>
+                      <a:endParaRPr lang="en-GB" sz="1200" dirty="0"/>
                     </a:p>
                   </a:txBody>
                   <a:tcPr marL="42594" marR="42594" marT="21297" marB="21297"/>

</xml_diff>

<commit_message>
Finished working on Literature review and Project Poster for Frontiers of Robotics Research
</commit_message>
<xml_diff>
--- a/Frontiers of Robotics Research/Project/StephenRerriBekibeleDissertationPosterPresentations-36x60-Template-Newfield.pptx
+++ b/Frontiers of Robotics Research/Project/StephenRerriBekibeleDissertationPosterPresentations-36x60-Template-Newfield.pptx
@@ -377,7 +377,7 @@
             <a:fld id="{E6CC2317-6751-4CD4-9995-8782DD78E936}" type="datetimeFigureOut">
               <a:rPr lang="en-US" smtClean="0"/>
               <a:pPr/>
-              <a:t>5/11/2022</a:t>
+              <a:t>5/12/2022</a:t>
             </a:fld>
             <a:endParaRPr lang="en-US" dirty="0"/>
           </a:p>
@@ -16406,6 +16406,7 @@
           <a:bodyPr/>
           <a:lstStyle/>
           <a:p>
+            <a:pPr algn="just"/>
             <a:r>
               <a:rPr lang="en-US" sz="1300" dirty="0">
                 <a:solidFill>
@@ -16439,12 +16440,14 @@
             </a:r>
           </a:p>
           <a:p>
+            <a:pPr algn="just"/>
             <a:endParaRPr lang="en-US" sz="1300" dirty="0">
               <a:latin typeface="Arial" panose="020B0604020202020204" pitchFamily="34" charset="0"/>
               <a:cs typeface="Arial" panose="020B0604020202020204" pitchFamily="34" charset="0"/>
             </a:endParaRPr>
           </a:p>
           <a:p>
+            <a:pPr algn="just"/>
             <a:r>
               <a:rPr lang="en-US" sz="1300" dirty="0">
                 <a:solidFill>
@@ -16487,7 +16490,10 @@
           <a:lstStyle/>
           <a:p>
             <a:r>
-              <a:rPr lang="en-US" u="none" dirty="0"/>
+              <a:rPr lang="en-US" u="none" dirty="0">
+                <a:latin typeface="Arial" panose="020B0604020202020204" pitchFamily="34" charset="0"/>
+                <a:cs typeface="Arial" panose="020B0604020202020204" pitchFamily="34" charset="0"/>
+              </a:rPr>
               <a:t>Introduction</a:t>
             </a:r>
           </a:p>
@@ -16513,6 +16519,7 @@
           <a:bodyPr/>
           <a:lstStyle/>
           <a:p>
+            <a:pPr algn="just"/>
             <a:r>
               <a:rPr lang="en-US" sz="1300" dirty="0">
                 <a:solidFill>
@@ -16520,8 +16527,10 @@
                     <a:lumMod val="50000"/>
                   </a:schemeClr>
                 </a:solidFill>
+                <a:latin typeface="Arial" panose="020B0604020202020204" pitchFamily="34" charset="0"/>
+                <a:cs typeface="Arial" panose="020B0604020202020204" pitchFamily="34" charset="0"/>
               </a:rPr>
-              <a:t>Implement infrastructure for sending data to drone for facial recognition over internet</a:t>
+              <a:t>Implement infrastructure </a:t>
             </a:r>
             <a:r>
               <a:rPr lang="en-US" sz="1300" dirty="0" smtClean="0">
@@ -16530,85 +16539,147 @@
                     <a:lumMod val="50000"/>
                   </a:schemeClr>
                 </a:solidFill>
+                <a:latin typeface="Arial" panose="020B0604020202020204" pitchFamily="34" charset="0"/>
+                <a:cs typeface="Arial" panose="020B0604020202020204" pitchFamily="34" charset="0"/>
               </a:rPr>
-              <a:t>.</a:t>
+              <a:t>for drone surveillance with facial recognition</a:t>
             </a:r>
+            <a:endParaRPr lang="en-US" sz="1300" dirty="0" smtClean="0">
+              <a:solidFill>
+                <a:schemeClr val="accent5">
+                  <a:lumMod val="50000"/>
+                </a:schemeClr>
+              </a:solidFill>
+              <a:latin typeface="Arial" panose="020B0604020202020204" pitchFamily="34" charset="0"/>
+              <a:cs typeface="Arial" panose="020B0604020202020204" pitchFamily="34" charset="0"/>
+            </a:endParaRPr>
           </a:p>
           <a:p>
+            <a:pPr algn="just"/>
             <a:r>
-              <a:rPr lang="en-GB" sz="1300" dirty="0"/>
+              <a:rPr lang="en-GB" sz="1300" dirty="0">
+                <a:latin typeface="Arial" panose="020B0604020202020204" pitchFamily="34" charset="0"/>
+                <a:cs typeface="Arial" panose="020B0604020202020204" pitchFamily="34" charset="0"/>
+              </a:rPr>
               <a:t>The objectives of my project is to:</a:t>
             </a:r>
           </a:p>
           <a:p>
-            <a:pPr marL="342900" indent="-342900">
+            <a:pPr marL="342900" indent="-342900" algn="just">
               <a:buFont typeface="+mj-lt"/>
               <a:buAutoNum type="arabicPeriod"/>
             </a:pPr>
             <a:r>
-              <a:rPr lang="en-GB" sz="1300" dirty="0"/>
+              <a:rPr lang="en-GB" sz="1300" dirty="0">
+                <a:latin typeface="Arial" panose="020B0604020202020204" pitchFamily="34" charset="0"/>
+                <a:cs typeface="Arial" panose="020B0604020202020204" pitchFamily="34" charset="0"/>
+              </a:rPr>
               <a:t>Create a solid and secure infrastructure for the communication of personal data to a remote server.</a:t>
             </a:r>
           </a:p>
           <a:p>
-            <a:pPr marL="342900" indent="-342900">
+            <a:pPr marL="342900" indent="-342900" algn="just">
               <a:buFont typeface="+mj-lt"/>
               <a:buAutoNum type="arabicPeriod"/>
             </a:pPr>
             <a:r>
-              <a:rPr lang="en-GB" sz="1300" dirty="0"/>
+              <a:rPr lang="en-GB" sz="1300" dirty="0">
+                <a:latin typeface="Arial" panose="020B0604020202020204" pitchFamily="34" charset="0"/>
+                <a:cs typeface="Arial" panose="020B0604020202020204" pitchFamily="34" charset="0"/>
+              </a:rPr>
               <a:t>To build a system that can receive images and act based on the received images during a live video feed</a:t>
             </a:r>
           </a:p>
           <a:p>
-            <a:pPr marL="342900" indent="-342900">
+            <a:pPr marL="342900" indent="-342900" algn="just">
               <a:buFont typeface="+mj-lt"/>
               <a:buAutoNum type="arabicPeriod"/>
             </a:pPr>
             <a:r>
-              <a:rPr lang="en-GB" sz="1300" dirty="0"/>
+              <a:rPr lang="en-GB" sz="1300" dirty="0">
+                <a:latin typeface="Arial" panose="020B0604020202020204" pitchFamily="34" charset="0"/>
+                <a:cs typeface="Arial" panose="020B0604020202020204" pitchFamily="34" charset="0"/>
+              </a:rPr>
               <a:t>To safely navigate to an individual in a crowded place</a:t>
             </a:r>
           </a:p>
           <a:p>
-            <a:pPr marL="342900" indent="-342900">
+            <a:pPr marL="342900" indent="-342900" algn="just">
               <a:buFont typeface="+mj-lt"/>
               <a:buAutoNum type="arabicPeriod"/>
             </a:pPr>
             <a:r>
-              <a:rPr lang="en-GB" sz="1300" dirty="0"/>
+              <a:rPr lang="en-GB" sz="1300" dirty="0">
+                <a:latin typeface="Arial" panose="020B0604020202020204" pitchFamily="34" charset="0"/>
+                <a:cs typeface="Arial" panose="020B0604020202020204" pitchFamily="34" charset="0"/>
+              </a:rPr>
               <a:t>To accurately navigate to the correct individual in a crowded place</a:t>
             </a:r>
           </a:p>
           <a:p>
-            <a:pPr marL="342900" indent="-342900">
+            <a:pPr marL="342900" indent="-342900" algn="just">
               <a:buFont typeface="+mj-lt"/>
               <a:buAutoNum type="arabicPeriod"/>
             </a:pPr>
             <a:r>
-              <a:rPr lang="en-GB" sz="1300" dirty="0"/>
+              <a:rPr lang="en-GB" sz="1300" dirty="0">
+                <a:latin typeface="Arial" panose="020B0604020202020204" pitchFamily="34" charset="0"/>
+                <a:cs typeface="Arial" panose="020B0604020202020204" pitchFamily="34" charset="0"/>
+              </a:rPr>
               <a:t>For the drone to be able to learn the best heights to be at for and accurate monitoring of a target.</a:t>
             </a:r>
           </a:p>
           <a:p>
-            <a:pPr marL="342900" indent="-342900">
+            <a:pPr marL="342900" indent="-342900" algn="just">
               <a:buFont typeface="+mj-lt"/>
               <a:buAutoNum type="arabicPeriod"/>
             </a:pPr>
             <a:r>
-              <a:rPr lang="en-GB" sz="1300" dirty="0"/>
-              <a:t>To introduce a novel and appropriate use of drone and facial recognition technology for the aid of government and corporation operations.</a:t>
+              <a:rPr lang="en-GB" sz="1300" dirty="0">
+                <a:latin typeface="Arial" panose="020B0604020202020204" pitchFamily="34" charset="0"/>
+                <a:cs typeface="Arial" panose="020B0604020202020204" pitchFamily="34" charset="0"/>
+              </a:rPr>
+              <a:t>To introduce a novel and appropriate use of drone and facial recognition technology for the aid of </a:t>
+            </a:r>
+            <a:r>
+              <a:rPr lang="en-GB" sz="1300" dirty="0" smtClean="0">
+                <a:latin typeface="Arial" panose="020B0604020202020204" pitchFamily="34" charset="0"/>
+                <a:cs typeface="Arial" panose="020B0604020202020204" pitchFamily="34" charset="0"/>
+              </a:rPr>
+              <a:t>law keeping </a:t>
+            </a:r>
+            <a:r>
+              <a:rPr lang="en-GB" sz="1300" dirty="0">
+                <a:latin typeface="Arial" panose="020B0604020202020204" pitchFamily="34" charset="0"/>
+                <a:cs typeface="Arial" panose="020B0604020202020204" pitchFamily="34" charset="0"/>
+              </a:rPr>
+              <a:t>and </a:t>
+            </a:r>
+            <a:r>
+              <a:rPr lang="en-GB" sz="1300" dirty="0" smtClean="0">
+                <a:latin typeface="Arial" panose="020B0604020202020204" pitchFamily="34" charset="0"/>
+                <a:cs typeface="Arial" panose="020B0604020202020204" pitchFamily="34" charset="0"/>
+              </a:rPr>
+              <a:t>search and rescue </a:t>
+            </a:r>
+            <a:r>
+              <a:rPr lang="en-GB" sz="1300" dirty="0">
+                <a:latin typeface="Arial" panose="020B0604020202020204" pitchFamily="34" charset="0"/>
+                <a:cs typeface="Arial" panose="020B0604020202020204" pitchFamily="34" charset="0"/>
+              </a:rPr>
+              <a:t>operations.</a:t>
             </a:r>
           </a:p>
           <a:p>
+            <a:pPr algn="just"/>
             <a:endParaRPr lang="en-US" sz="1300" dirty="0">
               <a:solidFill>
                 <a:schemeClr val="accent5">
                   <a:lumMod val="50000"/>
                 </a:schemeClr>
               </a:solidFill>
-              <a:latin typeface="Times New Roman" panose="02020603050405020304" pitchFamily="18" charset="0"/>
-              <a:cs typeface="Times New Roman" panose="02020603050405020304" pitchFamily="18" charset="0"/>
+              <a:latin typeface="Arial" panose="020B0604020202020204" pitchFamily="34" charset="0"/>
+              <a:cs typeface="Arial" panose="020B0604020202020204" pitchFamily="34" charset="0"/>
             </a:endParaRPr>
           </a:p>
         </p:txBody>
@@ -16637,10 +16708,16 @@
           <a:lstStyle/>
           <a:p>
             <a:r>
-              <a:rPr lang="en-US" u="none" dirty="0" smtClean="0"/>
+              <a:rPr lang="en-US" u="none" dirty="0" smtClean="0">
+                <a:latin typeface="Arial" panose="020B0604020202020204" pitchFamily="34" charset="0"/>
+                <a:cs typeface="Arial" panose="020B0604020202020204" pitchFamily="34" charset="0"/>
+              </a:rPr>
               <a:t>Aims &amp; Objectives</a:t>
             </a:r>
-            <a:endParaRPr lang="en-US" u="none" dirty="0"/>
+            <a:endParaRPr lang="en-US" u="none" dirty="0">
+              <a:latin typeface="Arial" panose="020B0604020202020204" pitchFamily="34" charset="0"/>
+              <a:cs typeface="Arial" panose="020B0604020202020204" pitchFamily="34" charset="0"/>
+            </a:endParaRPr>
           </a:p>
         </p:txBody>
       </p:sp>
@@ -16667,6 +16744,7 @@
           <a:bodyPr/>
           <a:lstStyle/>
           <a:p>
+            <a:pPr algn="just"/>
             <a:r>
               <a:rPr lang="en-US" sz="1300" dirty="0">
                 <a:solidFill>
@@ -16674,13 +16752,71 @@
                     <a:lumMod val="50000"/>
                   </a:schemeClr>
                 </a:solidFill>
-                <a:latin typeface="Times New Roman" panose="02020603050405020304" pitchFamily="18" charset="0"/>
-                <a:cs typeface="Times New Roman" panose="02020603050405020304" pitchFamily="18" charset="0"/>
+                <a:latin typeface="Arial" panose="020B0604020202020204" pitchFamily="34" charset="0"/>
+                <a:cs typeface="Arial" panose="020B0604020202020204" pitchFamily="34" charset="0"/>
               </a:rPr>
-              <a:t>The facial recognition library being used is the “world’s simplest face recognition library” such uses </a:t>
+              <a:t>The facial recognition </a:t>
             </a:r>
             <a:r>
-              <a:rPr lang="en-US" sz="1300" dirty="0"/>
+              <a:rPr lang="en-US" sz="1300" dirty="0" smtClean="0">
+                <a:solidFill>
+                  <a:schemeClr val="accent5">
+                    <a:lumMod val="50000"/>
+                  </a:schemeClr>
+                </a:solidFill>
+                <a:latin typeface="Arial" panose="020B0604020202020204" pitchFamily="34" charset="0"/>
+                <a:cs typeface="Arial" panose="020B0604020202020204" pitchFamily="34" charset="0"/>
+              </a:rPr>
+              <a:t>library I have proposed is </a:t>
+            </a:r>
+            <a:r>
+              <a:rPr lang="en-US" sz="1300" dirty="0">
+                <a:solidFill>
+                  <a:schemeClr val="accent5">
+                    <a:lumMod val="50000"/>
+                  </a:schemeClr>
+                </a:solidFill>
+                <a:latin typeface="Arial" panose="020B0604020202020204" pitchFamily="34" charset="0"/>
+                <a:cs typeface="Arial" panose="020B0604020202020204" pitchFamily="34" charset="0"/>
+              </a:rPr>
+              <a:t>the “world’s simplest face recognition library” </a:t>
+            </a:r>
+            <a:r>
+              <a:rPr lang="en-US" sz="1300" dirty="0" smtClean="0">
+                <a:latin typeface="Arial" panose="020B0604020202020204" pitchFamily="34" charset="0"/>
+                <a:cs typeface="Arial" panose="020B0604020202020204" pitchFamily="34" charset="0"/>
+              </a:rPr>
+              <a:t>whic</a:t>
+            </a:r>
+            <a:r>
+              <a:rPr lang="en-US" sz="1300" dirty="0" smtClean="0">
+                <a:solidFill>
+                  <a:schemeClr val="accent5">
+                    <a:lumMod val="50000"/>
+                  </a:schemeClr>
+                </a:solidFill>
+                <a:latin typeface="Arial" panose="020B0604020202020204" pitchFamily="34" charset="0"/>
+                <a:cs typeface="Arial" panose="020B0604020202020204" pitchFamily="34" charset="0"/>
+              </a:rPr>
+              <a:t>h </a:t>
+            </a:r>
+            <a:r>
+              <a:rPr lang="en-US" sz="1300" dirty="0">
+                <a:solidFill>
+                  <a:schemeClr val="accent5">
+                    <a:lumMod val="50000"/>
+                  </a:schemeClr>
+                </a:solidFill>
+                <a:latin typeface="Arial" panose="020B0604020202020204" pitchFamily="34" charset="0"/>
+                <a:cs typeface="Arial" panose="020B0604020202020204" pitchFamily="34" charset="0"/>
+              </a:rPr>
+              <a:t>uses </a:t>
+            </a:r>
+            <a:r>
+              <a:rPr lang="en-US" sz="1300" dirty="0">
+                <a:latin typeface="Arial" panose="020B0604020202020204" pitchFamily="34" charset="0"/>
+                <a:cs typeface="Arial" panose="020B0604020202020204" pitchFamily="34" charset="0"/>
+              </a:rPr>
               <a:t>D</a:t>
             </a:r>
             <a:r>
@@ -16690,8 +16826,8 @@
                     <a:lumMod val="50000"/>
                   </a:schemeClr>
                 </a:solidFill>
-                <a:latin typeface="Times New Roman" panose="02020603050405020304" pitchFamily="18" charset="0"/>
-                <a:cs typeface="Times New Roman" panose="02020603050405020304" pitchFamily="18" charset="0"/>
+                <a:latin typeface="Arial" panose="020B0604020202020204" pitchFamily="34" charset="0"/>
+                <a:cs typeface="Arial" panose="020B0604020202020204" pitchFamily="34" charset="0"/>
               </a:rPr>
               <a:t>lib’s </a:t>
             </a:r>
@@ -16702,8 +16838,8 @@
                     <a:lumMod val="50000"/>
                   </a:schemeClr>
                 </a:solidFill>
-                <a:latin typeface="Times New Roman" panose="02020603050405020304" pitchFamily="18" charset="0"/>
-                <a:cs typeface="Times New Roman" panose="02020603050405020304" pitchFamily="18" charset="0"/>
+                <a:latin typeface="Arial" panose="020B0604020202020204" pitchFamily="34" charset="0"/>
+                <a:cs typeface="Arial" panose="020B0604020202020204" pitchFamily="34" charset="0"/>
               </a:rPr>
               <a:t>state-of-the-art face recognition built with deep learning. The model has an accuracy of 99.38% on the </a:t>
             </a:r>
@@ -16712,8 +16848,8 @@
                 <a:solidFill>
                   <a:srgbClr val="00B0F0"/>
                 </a:solidFill>
-                <a:latin typeface="Times New Roman" panose="02020603050405020304" pitchFamily="18" charset="0"/>
-                <a:cs typeface="Times New Roman" panose="02020603050405020304" pitchFamily="18" charset="0"/>
+                <a:latin typeface="Arial" panose="020B0604020202020204" pitchFamily="34" charset="0"/>
+                <a:cs typeface="Arial" panose="020B0604020202020204" pitchFamily="34" charset="0"/>
               </a:rPr>
               <a:t>Labeled Faces in the Wild</a:t>
             </a:r>
@@ -16724,13 +16860,14 @@
                     <a:lumMod val="50000"/>
                   </a:schemeClr>
                 </a:solidFill>
-                <a:latin typeface="Times New Roman" panose="02020603050405020304" pitchFamily="18" charset="0"/>
-                <a:cs typeface="Times New Roman" panose="02020603050405020304" pitchFamily="18" charset="0"/>
+                <a:latin typeface="Arial" panose="020B0604020202020204" pitchFamily="34" charset="0"/>
+                <a:cs typeface="Arial" panose="020B0604020202020204" pitchFamily="34" charset="0"/>
               </a:rPr>
               <a:t> benchmark.</a:t>
             </a:r>
           </a:p>
           <a:p>
+            <a:pPr algn="just"/>
             <a:r>
               <a:rPr lang="en-US" sz="1300" dirty="0">
                 <a:solidFill>
@@ -16738,38 +16875,44 @@
                     <a:lumMod val="50000"/>
                   </a:schemeClr>
                 </a:solidFill>
-                <a:latin typeface="Times New Roman" panose="02020603050405020304" pitchFamily="18" charset="0"/>
-                <a:cs typeface="Times New Roman" panose="02020603050405020304" pitchFamily="18" charset="0"/>
+                <a:latin typeface="Arial" panose="020B0604020202020204" pitchFamily="34" charset="0"/>
+                <a:cs typeface="Arial" panose="020B0604020202020204" pitchFamily="34" charset="0"/>
               </a:rPr>
               <a:t>Bar chart of long it takes to switch targets and locate a new target?</a:t>
             </a:r>
           </a:p>
           <a:p>
+            <a:pPr algn="just"/>
             <a:r>
-              <a:rPr lang="en-US" sz="1300" dirty="0"/>
+              <a:rPr lang="en-US" sz="1300" dirty="0">
+                <a:latin typeface="Arial" panose="020B0604020202020204" pitchFamily="34" charset="0"/>
+                <a:cs typeface="Arial" panose="020B0604020202020204" pitchFamily="34" charset="0"/>
+              </a:rPr>
               <a:t>How may people can be detected simultaneously</a:t>
             </a:r>
           </a:p>
           <a:p>
+            <a:pPr algn="just"/>
             <a:endParaRPr lang="en-US" sz="1300" dirty="0">
               <a:solidFill>
                 <a:schemeClr val="accent5">
                   <a:lumMod val="50000"/>
                 </a:schemeClr>
               </a:solidFill>
-              <a:latin typeface="Times New Roman" panose="02020603050405020304" pitchFamily="18" charset="0"/>
-              <a:cs typeface="Times New Roman" panose="02020603050405020304" pitchFamily="18" charset="0"/>
+              <a:latin typeface="Arial" panose="020B0604020202020204" pitchFamily="34" charset="0"/>
+              <a:cs typeface="Arial" panose="020B0604020202020204" pitchFamily="34" charset="0"/>
             </a:endParaRPr>
           </a:p>
           <a:p>
+            <a:pPr algn="just"/>
             <a:endParaRPr lang="en-US" sz="1300" dirty="0">
               <a:solidFill>
                 <a:schemeClr val="accent5">
                   <a:lumMod val="50000"/>
                 </a:schemeClr>
               </a:solidFill>
-              <a:latin typeface="Times New Roman" panose="02020603050405020304" pitchFamily="18" charset="0"/>
-              <a:cs typeface="Times New Roman" panose="02020603050405020304" pitchFamily="18" charset="0"/>
+              <a:latin typeface="Arial" panose="020B0604020202020204" pitchFamily="34" charset="0"/>
+              <a:cs typeface="Arial" panose="020B0604020202020204" pitchFamily="34" charset="0"/>
             </a:endParaRPr>
           </a:p>
         </p:txBody>
@@ -16804,10 +16947,16 @@
           <a:lstStyle/>
           <a:p>
             <a:r>
-              <a:rPr lang="en-US" u="none" dirty="0" smtClean="0"/>
+              <a:rPr lang="en-US" u="none" dirty="0" smtClean="0">
+                <a:latin typeface="Arial" panose="020B0604020202020204" pitchFamily="34" charset="0"/>
+                <a:cs typeface="Arial" panose="020B0604020202020204" pitchFamily="34" charset="0"/>
+              </a:rPr>
               <a:t>Research Plan</a:t>
             </a:r>
-            <a:endParaRPr lang="en-US" u="none" dirty="0"/>
+            <a:endParaRPr lang="en-US" u="none" dirty="0">
+              <a:latin typeface="Arial" panose="020B0604020202020204" pitchFamily="34" charset="0"/>
+              <a:cs typeface="Arial" panose="020B0604020202020204" pitchFamily="34" charset="0"/>
+            </a:endParaRPr>
           </a:p>
         </p:txBody>
       </p:sp>
@@ -16823,7 +16972,7 @@
         </p:nvSpPr>
         <p:spPr>
           <a:xfrm>
-            <a:off x="20629945" y="8805781"/>
+            <a:off x="20633090" y="9280297"/>
             <a:ext cx="6279386" cy="428684"/>
           </a:xfrm>
           <a:solidFill>
@@ -16835,10 +16984,16 @@
           <a:lstStyle/>
           <a:p>
             <a:r>
-              <a:rPr lang="en-US" u="none" dirty="0" smtClean="0"/>
+              <a:rPr lang="en-US" u="none" dirty="0" smtClean="0">
+                <a:latin typeface="Arial" panose="020B0604020202020204" pitchFamily="34" charset="0"/>
+                <a:cs typeface="Arial" panose="020B0604020202020204" pitchFamily="34" charset="0"/>
+              </a:rPr>
               <a:t>Conclusions</a:t>
             </a:r>
-            <a:endParaRPr lang="en-US" u="none" dirty="0"/>
+            <a:endParaRPr lang="en-US" u="none" dirty="0">
+              <a:latin typeface="Arial" panose="020B0604020202020204" pitchFamily="34" charset="0"/>
+              <a:cs typeface="Arial" panose="020B0604020202020204" pitchFamily="34" charset="0"/>
+            </a:endParaRPr>
           </a:p>
         </p:txBody>
       </p:sp>
@@ -16854,47 +17009,67 @@
         </p:nvSpPr>
         <p:spPr>
           <a:xfrm>
-            <a:off x="20578102" y="9199341"/>
-            <a:ext cx="6279386" cy="3649337"/>
+            <a:off x="20569756" y="9789676"/>
+            <a:ext cx="6279386" cy="3624715"/>
           </a:xfrm>
         </p:spPr>
         <p:txBody>
           <a:bodyPr/>
           <a:lstStyle/>
           <a:p>
+            <a:pPr algn="just"/>
             <a:r>
-              <a:rPr lang="en-GB" dirty="0"/>
+              <a:rPr lang="en-GB" sz="1300" dirty="0">
+                <a:latin typeface="Arial" panose="020B0604020202020204" pitchFamily="34" charset="0"/>
+                <a:cs typeface="Arial" panose="020B0604020202020204" pitchFamily="34" charset="0"/>
+              </a:rPr>
               <a:t>In conclusion the project has demonstrated that facial recognition for use on drones is very reliable and accurate but when used on drones various constraints have to be considered for the drone’s camera to operate as well as a camera in an isolated environment such as the optimal height of the drone and angle of the camera for accurately detecting the faces of people</a:t>
             </a:r>
             <a:r>
-              <a:rPr lang="en-GB" dirty="0" smtClean="0"/>
+              <a:rPr lang="en-GB" sz="1300" dirty="0" smtClean="0">
+                <a:latin typeface="Arial" panose="020B0604020202020204" pitchFamily="34" charset="0"/>
+                <a:cs typeface="Arial" panose="020B0604020202020204" pitchFamily="34" charset="0"/>
+              </a:rPr>
               <a:t>.</a:t>
             </a:r>
           </a:p>
           <a:p>
-            <a:endParaRPr lang="en-GB" dirty="0"/>
+            <a:pPr algn="just"/>
+            <a:endParaRPr lang="en-GB" sz="1300" dirty="0">
+              <a:latin typeface="Arial" panose="020B0604020202020204" pitchFamily="34" charset="0"/>
+              <a:cs typeface="Arial" panose="020B0604020202020204" pitchFamily="34" charset="0"/>
+            </a:endParaRPr>
           </a:p>
           <a:p>
+            <a:pPr algn="just"/>
             <a:r>
-              <a:rPr lang="en-GB" dirty="0"/>
+              <a:rPr lang="en-GB" sz="1300" dirty="0">
+                <a:latin typeface="Arial" panose="020B0604020202020204" pitchFamily="34" charset="0"/>
+                <a:cs typeface="Arial" panose="020B0604020202020204" pitchFamily="34" charset="0"/>
+              </a:rPr>
               <a:t>In addition, the project also highlighted the dangers of drone usage for surveillance and the vulnerability of drones for surveillance operating at street level making them conspicuous and thus unable to be applied as a means of covert surveillance unlike UAVs to some degree due to the abilities to operate at higher altitudes and safe from target retaliation such as people trying to shoot them down.</a:t>
             </a:r>
           </a:p>
           <a:p>
+            <a:pPr algn="just"/>
             <a:r>
-              <a:rPr lang="en-GB" dirty="0"/>
+              <a:rPr lang="en-GB" sz="1300" dirty="0">
+                <a:latin typeface="Arial" panose="020B0604020202020204" pitchFamily="34" charset="0"/>
+                <a:cs typeface="Arial" panose="020B0604020202020204" pitchFamily="34" charset="0"/>
+              </a:rPr>
               <a:t>Furthermore, the drones can be limited by how long they can operate for and the conditions they can be applied in due to their small sizes making them susceptible to the wind and small battery capacity.</a:t>
             </a:r>
           </a:p>
           <a:p>
+            <a:pPr algn="just"/>
             <a:endParaRPr lang="en-US" sz="1300" dirty="0">
               <a:solidFill>
                 <a:schemeClr val="accent5">
                   <a:lumMod val="50000"/>
                 </a:schemeClr>
               </a:solidFill>
-              <a:latin typeface="Times New Roman" panose="02020603050405020304" pitchFamily="18" charset="0"/>
-              <a:cs typeface="Times New Roman" panose="02020603050405020304" pitchFamily="18" charset="0"/>
+              <a:latin typeface="Arial" panose="020B0604020202020204" pitchFamily="34" charset="0"/>
+              <a:cs typeface="Arial" panose="020B0604020202020204" pitchFamily="34" charset="0"/>
             </a:endParaRPr>
           </a:p>
         </p:txBody>
@@ -16911,7 +17086,7 @@
         </p:nvSpPr>
         <p:spPr>
           <a:xfrm>
-            <a:off x="20629945" y="12768866"/>
+            <a:off x="20629945" y="13054279"/>
             <a:ext cx="6279386" cy="428684"/>
           </a:xfrm>
           <a:solidFill>
@@ -16923,10 +17098,16 @@
           <a:lstStyle/>
           <a:p>
             <a:r>
-              <a:rPr lang="en-US" u="none" dirty="0" smtClean="0"/>
+              <a:rPr lang="en-US" u="none" dirty="0" smtClean="0">
+                <a:latin typeface="Arial" panose="020B0604020202020204" pitchFamily="34" charset="0"/>
+                <a:cs typeface="Arial" panose="020B0604020202020204" pitchFamily="34" charset="0"/>
+              </a:rPr>
               <a:t>References</a:t>
             </a:r>
-            <a:endParaRPr lang="en-US" u="none" dirty="0"/>
+            <a:endParaRPr lang="en-US" u="none" dirty="0">
+              <a:latin typeface="Arial" panose="020B0604020202020204" pitchFamily="34" charset="0"/>
+              <a:cs typeface="Arial" panose="020B0604020202020204" pitchFamily="34" charset="0"/>
+            </a:endParaRPr>
           </a:p>
         </p:txBody>
       </p:sp>
@@ -16942,7 +17123,7 @@
         </p:nvSpPr>
         <p:spPr>
           <a:xfrm>
-            <a:off x="20626800" y="13392313"/>
+            <a:off x="20641857" y="13542928"/>
             <a:ext cx="6282531" cy="2128921"/>
           </a:xfrm>
         </p:spPr>
@@ -16950,86 +17131,103 @@
           <a:bodyPr/>
           <a:lstStyle/>
           <a:p>
+            <a:pPr algn="just"/>
             <a:r>
-              <a:rPr lang="en-GB" dirty="0" smtClean="0"/>
+              <a:rPr lang="en-GB" dirty="0" smtClean="0">
+                <a:latin typeface="Arial" panose="020B0604020202020204" pitchFamily="34" charset="0"/>
+                <a:cs typeface="Arial" panose="020B0604020202020204" pitchFamily="34" charset="0"/>
+              </a:rPr>
               <a:t>A webpage comparing an explaining the best face recognition models and their performance:</a:t>
             </a:r>
           </a:p>
           <a:p>
+            <a:pPr algn="just"/>
             <a:r>
               <a:rPr lang="en-GB" u="sng" dirty="0">
+                <a:latin typeface="Arial" panose="020B0604020202020204" pitchFamily="34" charset="0"/>
+                <a:cs typeface="Arial" panose="020B0604020202020204" pitchFamily="34" charset="0"/>
                 <a:hlinkClick r:id="rId3"/>
               </a:rPr>
               <a:t>https://</a:t>
             </a:r>
             <a:r>
               <a:rPr lang="en-GB" u="sng" dirty="0" smtClean="0">
+                <a:latin typeface="Arial" panose="020B0604020202020204" pitchFamily="34" charset="0"/>
+                <a:cs typeface="Arial" panose="020B0604020202020204" pitchFamily="34" charset="0"/>
                 <a:hlinkClick r:id="rId3"/>
               </a:rPr>
               <a:t>rupeshthetech.medium.com/face-detection-models-and-their-performance-comparison-eb8da55f328c</a:t>
             </a:r>
-            <a:endParaRPr lang="en-GB" u="sng" dirty="0" smtClean="0"/>
+            <a:endParaRPr lang="en-GB" u="sng" dirty="0" smtClean="0">
+              <a:latin typeface="Arial" panose="020B0604020202020204" pitchFamily="34" charset="0"/>
+              <a:cs typeface="Arial" panose="020B0604020202020204" pitchFamily="34" charset="0"/>
+            </a:endParaRPr>
           </a:p>
           <a:p>
+            <a:pPr algn="just"/>
             <a:r>
-              <a:rPr lang="en-GB" sz="1300" u="sng" dirty="0" smtClean="0"/>
+              <a:rPr lang="en-GB" sz="1300" u="sng" dirty="0" smtClean="0">
+                <a:latin typeface="Arial" panose="020B0604020202020204" pitchFamily="34" charset="0"/>
+                <a:cs typeface="Arial" panose="020B0604020202020204" pitchFamily="34" charset="0"/>
+              </a:rPr>
               <a:t>Labelled Faces in the wild:</a:t>
             </a:r>
           </a:p>
           <a:p>
+            <a:pPr algn="just"/>
             <a:r>
               <a:rPr lang="en-US" sz="1300" dirty="0">
+                <a:latin typeface="Arial" panose="020B0604020202020204" pitchFamily="34" charset="0"/>
+                <a:cs typeface="Arial" panose="020B0604020202020204" pitchFamily="34" charset="0"/>
                 <a:hlinkClick r:id="rId4"/>
               </a:rPr>
               <a:t>http://</a:t>
             </a:r>
             <a:r>
               <a:rPr lang="en-US" sz="1300" dirty="0" smtClean="0">
+                <a:latin typeface="Arial" panose="020B0604020202020204" pitchFamily="34" charset="0"/>
+                <a:cs typeface="Arial" panose="020B0604020202020204" pitchFamily="34" charset="0"/>
                 <a:hlinkClick r:id="rId4"/>
               </a:rPr>
               <a:t>vis-www.cs.umass.edu/lfw/results.html</a:t>
             </a:r>
-            <a:endParaRPr lang="en-US" sz="1300" dirty="0" smtClean="0"/>
+            <a:endParaRPr lang="en-US" sz="1300" dirty="0" smtClean="0">
+              <a:latin typeface="Arial" panose="020B0604020202020204" pitchFamily="34" charset="0"/>
+              <a:cs typeface="Arial" panose="020B0604020202020204" pitchFamily="34" charset="0"/>
+            </a:endParaRPr>
           </a:p>
           <a:p>
+            <a:pPr algn="just"/>
             <a:r>
-              <a:rPr lang="en-US" sz="1300" dirty="0" err="1" smtClean="0">
+              <a:rPr lang="en-US" sz="1300" dirty="0" smtClean="0">
                 <a:solidFill>
                   <a:schemeClr val="accent5">
                     <a:lumMod val="50000"/>
                   </a:schemeClr>
                 </a:solidFill>
-                <a:latin typeface="Times New Roman" panose="02020603050405020304" pitchFamily="18" charset="0"/>
-                <a:cs typeface="Times New Roman" panose="02020603050405020304" pitchFamily="18" charset="0"/>
+                <a:latin typeface="Arial" panose="020B0604020202020204" pitchFamily="34" charset="0"/>
+                <a:cs typeface="Arial" panose="020B0604020202020204" pitchFamily="34" charset="0"/>
               </a:rPr>
-              <a:t>Dlib</a:t>
+              <a:t>Dlib: </a:t>
             </a:r>
             <a:r>
-              <a:rPr lang="en-US" sz="1300" smtClean="0">
-                <a:solidFill>
-                  <a:schemeClr val="accent5">
-                    <a:lumMod val="50000"/>
-                  </a:schemeClr>
-                </a:solidFill>
-                <a:latin typeface="Times New Roman" panose="02020603050405020304" pitchFamily="18" charset="0"/>
-                <a:cs typeface="Times New Roman" panose="02020603050405020304" pitchFamily="18" charset="0"/>
+              <a:rPr lang="en-US" sz="1300" dirty="0">
+                <a:latin typeface="Arial" panose="020B0604020202020204" pitchFamily="34" charset="0"/>
+                <a:cs typeface="Arial" panose="020B0604020202020204" pitchFamily="34" charset="0"/>
               </a:rPr>
-              <a:t>: </a:t>
-            </a:r>
-            <a:r>
-              <a:rPr lang="en-US" sz="1300"/>
               <a:t>http://dlib.net/</a:t>
             </a:r>
           </a:p>
           <a:p>
+            <a:pPr algn="just"/>
             <a:endParaRPr lang="en-US" sz="1300" dirty="0">
               <a:solidFill>
                 <a:schemeClr val="accent5">
                   <a:lumMod val="50000"/>
                 </a:schemeClr>
               </a:solidFill>
-              <a:latin typeface="Times New Roman" panose="02020603050405020304" pitchFamily="18" charset="0"/>
-              <a:cs typeface="Times New Roman" panose="02020603050405020304" pitchFamily="18" charset="0"/>
+              <a:latin typeface="Arial" panose="020B0604020202020204" pitchFamily="34" charset="0"/>
+              <a:cs typeface="Arial" panose="020B0604020202020204" pitchFamily="34" charset="0"/>
             </a:endParaRPr>
           </a:p>
         </p:txBody>
@@ -17046,7 +17244,7 @@
         </p:nvSpPr>
         <p:spPr>
           <a:xfrm>
-            <a:off x="20579674" y="15210368"/>
+            <a:off x="20579674" y="15495781"/>
             <a:ext cx="6279386" cy="428684"/>
           </a:xfrm>
           <a:solidFill>
@@ -17058,10 +17256,16 @@
           <a:lstStyle/>
           <a:p>
             <a:r>
-              <a:rPr lang="en-US" u="none" dirty="0" smtClean="0"/>
+              <a:rPr lang="en-US" u="none" dirty="0" smtClean="0">
+                <a:latin typeface="Arial" panose="020B0604020202020204" pitchFamily="34" charset="0"/>
+                <a:cs typeface="Arial" panose="020B0604020202020204" pitchFamily="34" charset="0"/>
+              </a:rPr>
               <a:t>Acknowledgements</a:t>
             </a:r>
-            <a:endParaRPr lang="en-US" u="none" dirty="0"/>
+            <a:endParaRPr lang="en-US" u="none" dirty="0">
+              <a:latin typeface="Arial" panose="020B0604020202020204" pitchFamily="34" charset="0"/>
+              <a:cs typeface="Arial" panose="020B0604020202020204" pitchFamily="34" charset="0"/>
+            </a:endParaRPr>
           </a:p>
         </p:txBody>
       </p:sp>
@@ -17077,7 +17281,7 @@
         </p:nvSpPr>
         <p:spPr>
           <a:xfrm>
-            <a:off x="20629945" y="15639052"/>
+            <a:off x="20641857" y="15924465"/>
             <a:ext cx="6282531" cy="463850"/>
           </a:xfrm>
         </p:spPr>
@@ -17092,8 +17296,8 @@
                     <a:lumMod val="50000"/>
                   </a:schemeClr>
                 </a:solidFill>
-                <a:latin typeface="Times New Roman" panose="02020603050405020304" pitchFamily="18" charset="0"/>
-                <a:cs typeface="Times New Roman" panose="02020603050405020304" pitchFamily="18" charset="0"/>
+                <a:latin typeface="Arial" panose="020B0604020202020204" pitchFamily="34" charset="0"/>
+                <a:cs typeface="Arial" panose="020B0604020202020204" pitchFamily="34" charset="0"/>
               </a:rPr>
               <a:t>Dr Miao Yu</a:t>
             </a:r>
@@ -17124,6 +17328,8 @@
                     <a:lumMod val="50000"/>
                   </a:schemeClr>
                 </a:solidFill>
+                <a:latin typeface="Arial" panose="020B0604020202020204" pitchFamily="34" charset="0"/>
+                <a:cs typeface="Arial" panose="020B0604020202020204" pitchFamily="34" charset="0"/>
               </a:rPr>
               <a:t>Stephen Rerri-Bekibele</a:t>
             </a:r>
@@ -17152,11 +17358,16 @@
                     <a:lumMod val="50000"/>
                   </a:schemeClr>
                 </a:solidFill>
+                <a:latin typeface="Arial" panose="020B0604020202020204" pitchFamily="34" charset="0"/>
+                <a:cs typeface="Arial" panose="020B0604020202020204" pitchFamily="34" charset="0"/>
               </a:rPr>
               <a:t>School of C</a:t>
             </a:r>
             <a:r>
-              <a:rPr lang="en-US" dirty="0"/>
+              <a:rPr lang="en-US" dirty="0">
+                <a:latin typeface="Arial" panose="020B0604020202020204" pitchFamily="34" charset="0"/>
+                <a:cs typeface="Arial" panose="020B0604020202020204" pitchFamily="34" charset="0"/>
+              </a:rPr>
               <a:t>omputer Science</a:t>
             </a:r>
             <a:endParaRPr lang="en-US" dirty="0">
@@ -17165,6 +17376,8 @@
                   <a:lumMod val="50000"/>
                 </a:schemeClr>
               </a:solidFill>
+              <a:latin typeface="Arial" panose="020B0604020202020204" pitchFamily="34" charset="0"/>
+              <a:cs typeface="Arial" panose="020B0604020202020204" pitchFamily="34" charset="0"/>
             </a:endParaRPr>
           </a:p>
         </p:txBody>
@@ -17181,19 +17394,33 @@
         </p:nvSpPr>
         <p:spPr/>
         <p:txBody>
-          <a:bodyPr/>
+          <a:bodyPr>
+            <a:normAutofit/>
+          </a:bodyPr>
           <a:lstStyle/>
           <a:p>
             <a:r>
-              <a:rPr lang="en-US" dirty="0"/>
-              <a:t>Designing an autonomous drone infrastructure for surveillance</a:t>
+              <a:rPr lang="en-US" sz="3600" dirty="0">
+                <a:latin typeface="Arial" panose="020B0604020202020204" pitchFamily="34" charset="0"/>
+                <a:cs typeface="Arial" panose="020B0604020202020204" pitchFamily="34" charset="0"/>
+              </a:rPr>
+              <a:t>Designing an autonomous drone infrastructure for </a:t>
             </a:r>
-            <a:endParaRPr lang="en-US" b="1" dirty="0">
+            <a:r>
+              <a:rPr lang="en-US" sz="3600" dirty="0" smtClean="0">
+                <a:latin typeface="Arial" panose="020B0604020202020204" pitchFamily="34" charset="0"/>
+                <a:cs typeface="Arial" panose="020B0604020202020204" pitchFamily="34" charset="0"/>
+              </a:rPr>
+              <a:t>surveillance with facial recognition</a:t>
+            </a:r>
+            <a:endParaRPr lang="en-US" sz="3600" b="1" dirty="0">
               <a:solidFill>
                 <a:schemeClr val="accent5">
                   <a:lumMod val="50000"/>
                 </a:schemeClr>
               </a:solidFill>
+              <a:latin typeface="Arial" panose="020B0604020202020204" pitchFamily="34" charset="0"/>
+              <a:cs typeface="Arial" panose="020B0604020202020204" pitchFamily="34" charset="0"/>
             </a:endParaRPr>
           </a:p>
         </p:txBody>
@@ -17365,24 +17592,56 @@
             </a:lvl9pPr>
           </a:lstStyle>
           <a:p>
+            <a:pPr algn="just"/>
             <a:r>
-              <a:rPr lang="en-US" sz="1300" dirty="0"/>
-              <a:t>The Local device sends pictures of targets to the autonomous drone which adds these images to an “unknown” folder. On board the drone also has a “known” folder which contains pictures of known targets named as such. These known pictures are then matched against the unknowns to verify if  a match is found.</a:t>
+              <a:rPr lang="en-US" sz="1300" dirty="0">
+                <a:latin typeface="Arial" panose="020B0604020202020204" pitchFamily="34" charset="0"/>
+                <a:cs typeface="Arial" panose="020B0604020202020204" pitchFamily="34" charset="0"/>
+              </a:rPr>
+              <a:t>The Local device sends pictures of targets to the autonomous drone which adds these images to an “unknown” folder. On board the drone also has a “known” folder which contains pictures of known targets </a:t>
+            </a:r>
+            <a:r>
+              <a:rPr lang="en-US" sz="1300" dirty="0" smtClean="0">
+                <a:latin typeface="Arial" panose="020B0604020202020204" pitchFamily="34" charset="0"/>
+                <a:cs typeface="Arial" panose="020B0604020202020204" pitchFamily="34" charset="0"/>
+              </a:rPr>
+              <a:t>with labels. </a:t>
+            </a:r>
+            <a:r>
+              <a:rPr lang="en-US" sz="1300" dirty="0">
+                <a:latin typeface="Arial" panose="020B0604020202020204" pitchFamily="34" charset="0"/>
+                <a:cs typeface="Arial" panose="020B0604020202020204" pitchFamily="34" charset="0"/>
+              </a:rPr>
+              <a:t>These known pictures are then matched against the unknowns to verify if  a match is found.</a:t>
             </a:r>
           </a:p>
           <a:p>
-            <a:endParaRPr lang="en-US" sz="1300" dirty="0"/>
+            <a:pPr algn="just"/>
+            <a:endParaRPr lang="en-US" sz="1300" dirty="0">
+              <a:latin typeface="Arial" panose="020B0604020202020204" pitchFamily="34" charset="0"/>
+              <a:cs typeface="Arial" panose="020B0604020202020204" pitchFamily="34" charset="0"/>
+            </a:endParaRPr>
           </a:p>
           <a:p>
+            <a:pPr algn="just"/>
             <a:r>
-              <a:rPr lang="en-US" sz="1300" dirty="0"/>
+              <a:rPr lang="en-US" sz="1300" dirty="0">
+                <a:latin typeface="Arial" panose="020B0604020202020204" pitchFamily="34" charset="0"/>
+                <a:cs typeface="Arial" panose="020B0604020202020204" pitchFamily="34" charset="0"/>
+              </a:rPr>
               <a:t>To test the application 2 virtual machines were setup, one to simulate a drone with a raspberry pi and another to simulate a device sending target information to the drone. This was done via two python scripts one to act as a sender and the other, a receiver</a:t>
             </a:r>
             <a:r>
-              <a:rPr lang="en-US" sz="1300" dirty="0" smtClean="0"/>
+              <a:rPr lang="en-US" sz="1300" dirty="0" smtClean="0">
+                <a:latin typeface="Arial" panose="020B0604020202020204" pitchFamily="34" charset="0"/>
+                <a:cs typeface="Arial" panose="020B0604020202020204" pitchFamily="34" charset="0"/>
+              </a:rPr>
               <a:t>.</a:t>
             </a:r>
-            <a:endParaRPr lang="en-US" sz="1300" dirty="0"/>
+            <a:endParaRPr lang="en-US" sz="1300" dirty="0">
+              <a:latin typeface="Arial" panose="020B0604020202020204" pitchFamily="34" charset="0"/>
+              <a:cs typeface="Arial" panose="020B0604020202020204" pitchFamily="34" charset="0"/>
+            </a:endParaRPr>
           </a:p>
         </p:txBody>
       </p:sp>
@@ -17446,7 +17705,7 @@
         </p:nvSpPr>
         <p:spPr>
           <a:xfrm>
-            <a:off x="7781694" y="15345533"/>
+            <a:off x="7881199" y="15510109"/>
             <a:ext cx="4789987" cy="892552"/>
           </a:xfrm>
           <a:prstGeom prst="rect">
@@ -17460,26 +17719,27 @@
           </a:bodyPr>
           <a:lstStyle/>
           <a:p>
+            <a:pPr algn="just"/>
             <a:r>
               <a:rPr lang="en-GB" sz="1300" dirty="0" smtClean="0">
-                <a:latin typeface="Times New Roman" panose="02020603050405020304" pitchFamily="18" charset="0"/>
-                <a:cs typeface="Times New Roman" panose="02020603050405020304" pitchFamily="18" charset="0"/>
+                <a:latin typeface="Arial" panose="020B0604020202020204" pitchFamily="34" charset="0"/>
+                <a:cs typeface="Arial" panose="020B0604020202020204" pitchFamily="34" charset="0"/>
               </a:rPr>
               <a:t>Figure 1 is a graph  showing the performance of different algorithms based on the Labelled Faces in the wild benchmark. These are all different implementations of </a:t>
             </a:r>
             <a:r>
-              <a:rPr lang="en-GB" sz="1300" dirty="0" err="1" smtClean="0">
-                <a:latin typeface="Times New Roman" panose="02020603050405020304" pitchFamily="18" charset="0"/>
-                <a:cs typeface="Times New Roman" panose="02020603050405020304" pitchFamily="18" charset="0"/>
+              <a:rPr lang="en-GB" sz="1300" dirty="0">
+                <a:latin typeface="Arial" panose="020B0604020202020204" pitchFamily="34" charset="0"/>
+                <a:cs typeface="Arial" panose="020B0604020202020204" pitchFamily="34" charset="0"/>
               </a:rPr>
-              <a:t>dlib’s</a:t>
+              <a:t>D</a:t>
             </a:r>
             <a:r>
               <a:rPr lang="en-GB" sz="1300" dirty="0" smtClean="0">
-                <a:latin typeface="Times New Roman" panose="02020603050405020304" pitchFamily="18" charset="0"/>
-                <a:cs typeface="Times New Roman" panose="02020603050405020304" pitchFamily="18" charset="0"/>
+                <a:latin typeface="Arial" panose="020B0604020202020204" pitchFamily="34" charset="0"/>
+                <a:cs typeface="Arial" panose="020B0604020202020204" pitchFamily="34" charset="0"/>
               </a:rPr>
-              <a:t> state of the art face recognition built using deep learning.</a:t>
+              <a:t>lib’s state of the art face recognition built using deep learning.</a:t>
             </a:r>
           </a:p>
         </p:txBody>
@@ -17523,7 +17783,7 @@
         <p:spPr>
           <a:xfrm>
             <a:off x="7781694" y="15037756"/>
-            <a:ext cx="3974908" cy="307777"/>
+            <a:ext cx="3974908" cy="523220"/>
           </a:xfrm>
           <a:prstGeom prst="rect">
             <a:avLst/>
@@ -17541,13 +17801,12 @@
               <a:buAutoNum type="arabicPeriod"/>
             </a:pPr>
             <a:r>
-              <a:rPr lang="en-GB" sz="1400" dirty="0"/>
+              <a:rPr lang="en-GB" sz="1400" dirty="0">
+                <a:latin typeface="Arial" panose="020B0604020202020204" pitchFamily="34" charset="0"/>
+                <a:cs typeface="Arial" panose="020B0604020202020204" pitchFamily="34" charset="0"/>
+              </a:rPr>
               <a:t>ROC curves averaged over 10 folds of View 2.</a:t>
             </a:r>
-            <a:endParaRPr lang="en-GB" sz="1400" dirty="0">
-              <a:latin typeface="Times New Roman" panose="02020603050405020304" pitchFamily="18" charset="0"/>
-              <a:cs typeface="Times New Roman" panose="02020603050405020304" pitchFamily="18" charset="0"/>
-            </a:endParaRPr>
           </a:p>
         </p:txBody>
       </p:sp>
@@ -17560,7 +17819,7 @@
         <p:spPr>
           <a:xfrm>
             <a:off x="13986851" y="15038060"/>
-            <a:ext cx="3974908" cy="307777"/>
+            <a:ext cx="3974908" cy="523220"/>
           </a:xfrm>
           <a:prstGeom prst="rect">
             <a:avLst/>
@@ -17578,13 +17837,12 @@
               <a:buAutoNum type="arabicPeriod" startAt="2"/>
             </a:pPr>
             <a:r>
-              <a:rPr lang="en-GB" sz="1400" dirty="0"/>
+              <a:rPr lang="en-GB" sz="1400" dirty="0">
+                <a:latin typeface="Arial" panose="020B0604020202020204" pitchFamily="34" charset="0"/>
+                <a:cs typeface="Arial" panose="020B0604020202020204" pitchFamily="34" charset="0"/>
+              </a:rPr>
               <a:t>ROC curves averaged over 10 folds of View 2.</a:t>
             </a:r>
-            <a:endParaRPr lang="en-GB" sz="1400" dirty="0">
-              <a:latin typeface="Times New Roman" panose="02020603050405020304" pitchFamily="18" charset="0"/>
-              <a:cs typeface="Times New Roman" panose="02020603050405020304" pitchFamily="18" charset="0"/>
-            </a:endParaRPr>
           </a:p>
         </p:txBody>
       </p:sp>
@@ -17596,8 +17854,8 @@
         </p:nvSpPr>
         <p:spPr>
           <a:xfrm>
-            <a:off x="13986851" y="15328269"/>
-            <a:ext cx="6153917" cy="738664"/>
+            <a:off x="13986851" y="15438386"/>
+            <a:ext cx="6153917" cy="954107"/>
           </a:xfrm>
           <a:prstGeom prst="rect">
             <a:avLst/>
@@ -17610,58 +17868,38 @@
           </a:bodyPr>
           <a:lstStyle/>
           <a:p>
+            <a:pPr algn="just"/>
             <a:r>
               <a:rPr lang="en-GB" sz="1400" dirty="0">
-                <a:latin typeface="Times New Roman" panose="02020603050405020304" pitchFamily="18" charset="0"/>
-                <a:cs typeface="Times New Roman" panose="02020603050405020304" pitchFamily="18" charset="0"/>
+                <a:latin typeface="Arial" panose="020B0604020202020204" pitchFamily="34" charset="0"/>
+                <a:cs typeface="Arial" panose="020B0604020202020204" pitchFamily="34" charset="0"/>
               </a:rPr>
-              <a:t>Figure 2 is a comparison between </a:t>
+              <a:t>Figure 2 is a comparison between Dlib’s library and other known face recognition libraries. Tiny Face model is best compared to </a:t>
             </a:r>
             <a:r>
-              <a:rPr lang="en-GB" sz="1400" dirty="0" err="1">
-                <a:latin typeface="Times New Roman" panose="02020603050405020304" pitchFamily="18" charset="0"/>
-                <a:cs typeface="Times New Roman" panose="02020603050405020304" pitchFamily="18" charset="0"/>
+              <a:rPr lang="en-GB" sz="1400" dirty="0" smtClean="0">
+                <a:latin typeface="Arial" panose="020B0604020202020204" pitchFamily="34" charset="0"/>
+                <a:cs typeface="Arial" panose="020B0604020202020204" pitchFamily="34" charset="0"/>
               </a:rPr>
-              <a:t>Dlib’s</a:t>
+              <a:t>Dlib </a:t>
             </a:r>
             <a:r>
               <a:rPr lang="en-GB" sz="1400" dirty="0">
-                <a:latin typeface="Times New Roman" panose="02020603050405020304" pitchFamily="18" charset="0"/>
-                <a:cs typeface="Times New Roman" panose="02020603050405020304" pitchFamily="18" charset="0"/>
-              </a:rPr>
-              <a:t> library and other known face recognition libraries. Tiny Face model is best compared to </a:t>
-            </a:r>
-            <a:r>
-              <a:rPr lang="en-GB" sz="1400" dirty="0" err="1" smtClean="0">
-                <a:latin typeface="Times New Roman" panose="02020603050405020304" pitchFamily="18" charset="0"/>
-                <a:cs typeface="Times New Roman" panose="02020603050405020304" pitchFamily="18" charset="0"/>
-              </a:rPr>
-              <a:t>Dlib</a:t>
-            </a:r>
-            <a:r>
-              <a:rPr lang="en-GB" sz="1400" dirty="0" smtClean="0">
-                <a:latin typeface="Times New Roman" panose="02020603050405020304" pitchFamily="18" charset="0"/>
-                <a:cs typeface="Times New Roman" panose="02020603050405020304" pitchFamily="18" charset="0"/>
-              </a:rPr>
-              <a:t> </a:t>
-            </a:r>
-            <a:r>
-              <a:rPr lang="en-GB" sz="1400" dirty="0">
-                <a:latin typeface="Times New Roman" panose="02020603050405020304" pitchFamily="18" charset="0"/>
-                <a:cs typeface="Times New Roman" panose="02020603050405020304" pitchFamily="18" charset="0"/>
+                <a:latin typeface="Arial" panose="020B0604020202020204" pitchFamily="34" charset="0"/>
+                <a:cs typeface="Arial" panose="020B0604020202020204" pitchFamily="34" charset="0"/>
               </a:rPr>
               <a:t>because it offers higher accuracy with low-quality </a:t>
             </a:r>
             <a:r>
               <a:rPr lang="en-GB" sz="1400" dirty="0" smtClean="0">
-                <a:latin typeface="Times New Roman" panose="02020603050405020304" pitchFamily="18" charset="0"/>
-                <a:cs typeface="Times New Roman" panose="02020603050405020304" pitchFamily="18" charset="0"/>
+                <a:latin typeface="Arial" panose="020B0604020202020204" pitchFamily="34" charset="0"/>
+                <a:cs typeface="Arial" panose="020B0604020202020204" pitchFamily="34" charset="0"/>
               </a:rPr>
               <a:t>images. However it takes more computational time</a:t>
             </a:r>
             <a:endParaRPr lang="en-GB" sz="1400" dirty="0">
-              <a:latin typeface="Times New Roman" panose="02020603050405020304" pitchFamily="18" charset="0"/>
-              <a:cs typeface="Times New Roman" panose="02020603050405020304" pitchFamily="18" charset="0"/>
+              <a:latin typeface="Arial" panose="020B0604020202020204" pitchFamily="34" charset="0"/>
+              <a:cs typeface="Arial" panose="020B0604020202020204" pitchFamily="34" charset="0"/>
             </a:endParaRPr>
           </a:p>
         </p:txBody>
@@ -17705,7 +17943,8 @@
                     <a:lumOff val="15000"/>
                   </a:schemeClr>
                 </a:solidFill>
-                <a:cs typeface="Times New Roman" panose="02020603050405020304" pitchFamily="18" charset="0"/>
+                <a:latin typeface="Arial" panose="020B0604020202020204" pitchFamily="34" charset="0"/>
+                <a:cs typeface="Arial" panose="020B0604020202020204" pitchFamily="34" charset="0"/>
               </a:rPr>
               <a:t>Research Methods</a:t>
             </a:r>
@@ -17716,7 +17955,8 @@
                   <a:lumOff val="15000"/>
                 </a:schemeClr>
               </a:solidFill>
-              <a:cs typeface="Times New Roman" panose="02020603050405020304" pitchFamily="18" charset="0"/>
+              <a:latin typeface="Arial" panose="020B0604020202020204" pitchFamily="34" charset="0"/>
+              <a:cs typeface="Arial" panose="020B0604020202020204" pitchFamily="34" charset="0"/>
             </a:endParaRPr>
           </a:p>
         </p:txBody>
@@ -17731,8 +17971,8 @@
         </p:nvSpPr>
         <p:spPr>
           <a:xfrm>
-            <a:off x="596711" y="9983536"/>
-            <a:ext cx="6286500" cy="2824496"/>
+            <a:off x="523899" y="9793854"/>
+            <a:ext cx="6441116" cy="3224606"/>
           </a:xfrm>
           <a:prstGeom prst="rect">
             <a:avLst/>
@@ -17882,36 +18122,111 @@
             </a:lvl9pPr>
           </a:lstStyle>
           <a:p>
+            <a:pPr algn="just"/>
             <a:r>
-              <a:rPr lang="en-GB" sz="1300" dirty="0" smtClean="0"/>
-              <a:t>The research will be carried out through the use of a VM to simulate the presence of a  raspberry pi, the VM will run the facial recognition code as well as the file receiver python code simultaneously. Images of targets will then be sent to the VM  as the code is running to test the stability of the code. To simulate a drone, a third party software, </a:t>
+              <a:rPr lang="en-GB" sz="1300" dirty="0" smtClean="0">
+                <a:latin typeface="Arial" panose="020B0604020202020204" pitchFamily="34" charset="0"/>
+                <a:cs typeface="Arial" panose="020B0604020202020204" pitchFamily="34" charset="0"/>
+              </a:rPr>
+              <a:t>The research will be carried out through the use of </a:t>
             </a:r>
             <a:r>
-              <a:rPr lang="en-GB" sz="1300" dirty="0"/>
+              <a:rPr lang="en-GB" sz="1300" dirty="0" smtClean="0">
+                <a:latin typeface="Arial" panose="020B0604020202020204" pitchFamily="34" charset="0"/>
+                <a:cs typeface="Arial" panose="020B0604020202020204" pitchFamily="34" charset="0"/>
+              </a:rPr>
+              <a:t> experiments in simulation </a:t>
+            </a:r>
+            <a:r>
+              <a:rPr lang="en-GB" sz="1300" dirty="0" smtClean="0">
+                <a:latin typeface="Arial" panose="020B0604020202020204" pitchFamily="34" charset="0"/>
+                <a:cs typeface="Arial" panose="020B0604020202020204" pitchFamily="34" charset="0"/>
+              </a:rPr>
+              <a:t>and with </a:t>
+            </a:r>
+            <a:r>
+              <a:rPr lang="en-GB" sz="1300" dirty="0" smtClean="0">
+                <a:latin typeface="Arial" panose="020B0604020202020204" pitchFamily="34" charset="0"/>
+                <a:cs typeface="Arial" panose="020B0604020202020204" pitchFamily="34" charset="0"/>
+              </a:rPr>
+              <a:t>a </a:t>
+            </a:r>
+            <a:r>
+              <a:rPr lang="en-GB" sz="1300" dirty="0" smtClean="0">
+                <a:latin typeface="Arial" panose="020B0604020202020204" pitchFamily="34" charset="0"/>
+                <a:cs typeface="Arial" panose="020B0604020202020204" pitchFamily="34" charset="0"/>
+              </a:rPr>
+              <a:t>VM to simulate the presence of a  raspberry pi, the VM will run the facial recognition code as well as the file receiver python code simultaneously. Images of targets will then be sent to the VM  as the code is running to test the stability of the code. To simulate a drone, a third party software, </a:t>
+            </a:r>
+            <a:r>
+              <a:rPr lang="en-GB" sz="1300" dirty="0">
+                <a:latin typeface="Arial" panose="020B0604020202020204" pitchFamily="34" charset="0"/>
+                <a:cs typeface="Arial" panose="020B0604020202020204" pitchFamily="34" charset="0"/>
+              </a:rPr>
               <a:t>D</a:t>
             </a:r>
             <a:r>
-              <a:rPr lang="en-GB" sz="1300" dirty="0" smtClean="0"/>
+              <a:rPr lang="en-GB" sz="1300" dirty="0" smtClean="0">
+                <a:latin typeface="Arial" panose="020B0604020202020204" pitchFamily="34" charset="0"/>
+                <a:cs typeface="Arial" panose="020B0604020202020204" pitchFamily="34" charset="0"/>
+              </a:rPr>
               <a:t>roidcam, able to use mobile phones as computer cameras will be used to  connect a phone to the VM. Another device will then run the python script used to send a target image to the VM.</a:t>
             </a:r>
           </a:p>
           <a:p>
-            <a:endParaRPr lang="en-GB" sz="1300" dirty="0"/>
+            <a:pPr algn="just"/>
+            <a:endParaRPr lang="en-GB" sz="1300" dirty="0" smtClean="0">
+              <a:latin typeface="Arial" panose="020B0604020202020204" pitchFamily="34" charset="0"/>
+              <a:cs typeface="Arial" panose="020B0604020202020204" pitchFamily="34" charset="0"/>
+            </a:endParaRPr>
           </a:p>
           <a:p>
+            <a:pPr algn="just"/>
             <a:r>
-              <a:rPr lang="en-GB" sz="1300" dirty="0" smtClean="0"/>
-              <a:t>The accuracy and performance of different facial recognition libraries will be tested and the most suitable algorithm will be chosen.</a:t>
+              <a:rPr lang="en-GB" sz="1300" dirty="0" smtClean="0">
+                <a:latin typeface="Arial" panose="020B0604020202020204" pitchFamily="34" charset="0"/>
+                <a:cs typeface="Arial" panose="020B0604020202020204" pitchFamily="34" charset="0"/>
+              </a:rPr>
+              <a:t>The </a:t>
+            </a:r>
+            <a:r>
+              <a:rPr lang="en-GB" sz="1300" dirty="0" smtClean="0">
+                <a:latin typeface="Arial" panose="020B0604020202020204" pitchFamily="34" charset="0"/>
+                <a:cs typeface="Arial" panose="020B0604020202020204" pitchFamily="34" charset="0"/>
+              </a:rPr>
+              <a:t>accuracy and performance of different facial recognition libraries will be tested and the most suitable algorithm will be chosen.</a:t>
             </a:r>
           </a:p>
           <a:p>
+            <a:pPr algn="just"/>
             <a:r>
-              <a:rPr lang="en-GB" sz="1300" dirty="0" smtClean="0"/>
-              <a:t>Asides from this, the ability of the algorithms to work in different lighting conditions will also be tested via speed of detection and confidence value </a:t>
+              <a:rPr lang="en-GB" sz="1300" dirty="0" smtClean="0">
+                <a:latin typeface="Arial" panose="020B0604020202020204" pitchFamily="34" charset="0"/>
+                <a:cs typeface="Arial" panose="020B0604020202020204" pitchFamily="34" charset="0"/>
+              </a:rPr>
+              <a:t>Asides from this, the ability of the algorithms to work in different lighting conditions will also be tested via speed of detection and confidence value.</a:t>
             </a:r>
           </a:p>
           <a:p>
-            <a:endParaRPr lang="en-US" sz="1300" dirty="0"/>
+            <a:pPr algn="just"/>
+            <a:r>
+              <a:rPr lang="en-GB" sz="1300" dirty="0" smtClean="0">
+                <a:latin typeface="Arial" panose="020B0604020202020204" pitchFamily="34" charset="0"/>
+                <a:cs typeface="Arial" panose="020B0604020202020204" pitchFamily="34" charset="0"/>
+              </a:rPr>
+              <a:t>The ability of the drone to seek and follow a target safely will also be tested. As a measure of the deployability of the drone in a real world </a:t>
+            </a:r>
+            <a:r>
+              <a:rPr lang="en-GB" sz="1300" dirty="0" smtClean="0">
+                <a:latin typeface="Arial" panose="020B0604020202020204" pitchFamily="34" charset="0"/>
+                <a:cs typeface="Arial" panose="020B0604020202020204" pitchFamily="34" charset="0"/>
+              </a:rPr>
+              <a:t>scenarios.</a:t>
+            </a:r>
+            <a:endParaRPr lang="en-US" sz="1300" dirty="0">
+              <a:latin typeface="Arial" panose="020B0604020202020204" pitchFamily="34" charset="0"/>
+              <a:cs typeface="Arial" panose="020B0604020202020204" pitchFamily="34" charset="0"/>
+            </a:endParaRPr>
           </a:p>
         </p:txBody>
       </p:sp>
@@ -18080,10 +18395,16 @@
           </a:lstStyle>
           <a:p>
             <a:r>
-              <a:rPr lang="en-US" u="none" dirty="0" smtClean="0"/>
+              <a:rPr lang="en-US" u="none" dirty="0" smtClean="0">
+                <a:latin typeface="Arial" panose="020B0604020202020204" pitchFamily="34" charset="0"/>
+                <a:cs typeface="Arial" panose="020B0604020202020204" pitchFamily="34" charset="0"/>
+              </a:rPr>
               <a:t>Risk Analysis</a:t>
             </a:r>
-            <a:endParaRPr lang="en-US" u="none" dirty="0"/>
+            <a:endParaRPr lang="en-US" u="none" dirty="0">
+              <a:latin typeface="Arial" panose="020B0604020202020204" pitchFamily="34" charset="0"/>
+              <a:cs typeface="Arial" panose="020B0604020202020204" pitchFamily="34" charset="0"/>
+            </a:endParaRPr>
           </a:p>
         </p:txBody>
       </p:sp>
@@ -18096,14 +18417,14 @@
           <p:nvPr>
             <p:extLst>
               <p:ext uri="{D42A27DB-BD31-4B8C-83A1-F6EECF244321}">
-                <p14:modId xmlns:p14="http://schemas.microsoft.com/office/powerpoint/2010/main" val="2001147960"/>
+                <p14:modId xmlns:p14="http://schemas.microsoft.com/office/powerpoint/2010/main" val="2570603349"/>
               </p:ext>
             </p:extLst>
           </p:nvPr>
         </p:nvGraphicFramePr>
         <p:xfrm>
-          <a:off x="20578147" y="3243902"/>
-          <a:ext cx="6282532" cy="5045106"/>
+          <a:off x="20597439" y="3071918"/>
+          <a:ext cx="6282532" cy="5762398"/>
         </p:xfrm>
         <a:graphic>
           <a:graphicData uri="http://schemas.openxmlformats.org/drawingml/2006/table">
@@ -18115,14 +18436,14 @@
                 <a:tableStyleId>{5C22544A-7EE6-4342-B048-85BDC9FD1C3A}</a:tableStyleId>
               </a:tblPr>
               <a:tblGrid>
-                <a:gridCol w="1570633">
+                <a:gridCol w="1957761">
                   <a:extLst>
                     <a:ext uri="{9D8B030D-6E8A-4147-A177-3AD203B41FA5}">
                       <a16:colId xmlns:a16="http://schemas.microsoft.com/office/drawing/2014/main" val="2239764257"/>
                     </a:ext>
                   </a:extLst>
                 </a:gridCol>
-                <a:gridCol w="1570633">
+                <a:gridCol w="1183505">
                   <a:extLst>
                     <a:ext uri="{9D8B030D-6E8A-4147-A177-3AD203B41FA5}">
                       <a16:colId xmlns:a16="http://schemas.microsoft.com/office/drawing/2014/main" val="1059795350"/>
@@ -18144,40 +18465,49 @@
                   </a:extLst>
                 </a:gridCol>
               </a:tblGrid>
-              <a:tr h="1094817">
+              <a:tr h="1233382">
                 <a:tc>
                   <a:txBody>
                     <a:bodyPr/>
                     <a:lstStyle/>
                     <a:p>
-                      <a:r>
-                        <a:rPr lang="en-GB" sz="1200" dirty="0" smtClean="0">
+                      <a:pPr algn="l"/>
+                      <a:r>
+                        <a:rPr lang="en-GB" sz="1300" dirty="0" smtClean="0">
                           <a:solidFill>
                             <a:schemeClr val="bg1"/>
                           </a:solidFill>
+                          <a:latin typeface="Arial" panose="020B0604020202020204" pitchFamily="34" charset="0"/>
+                          <a:cs typeface="Arial" panose="020B0604020202020204" pitchFamily="34" charset="0"/>
                         </a:rPr>
                         <a:t>Risk items (Potential future problems derived</a:t>
                       </a:r>
                       <a:r>
-                        <a:rPr lang="en-GB" sz="1200" baseline="0" dirty="0" smtClean="0">
+                        <a:rPr lang="en-GB" sz="1300" baseline="0" dirty="0" smtClean="0">
                           <a:solidFill>
                             <a:schemeClr val="bg1"/>
                           </a:solidFill>
+                          <a:latin typeface="Arial" panose="020B0604020202020204" pitchFamily="34" charset="0"/>
+                          <a:cs typeface="Arial" panose="020B0604020202020204" pitchFamily="34" charset="0"/>
                         </a:rPr>
                         <a:t> from Brainstorming</a:t>
                       </a:r>
                       <a:r>
-                        <a:rPr lang="en-GB" sz="1200" dirty="0" smtClean="0">
+                        <a:rPr lang="en-GB" sz="1300" dirty="0" smtClean="0">
                           <a:solidFill>
                             <a:schemeClr val="bg1"/>
                           </a:solidFill>
+                          <a:latin typeface="Arial" panose="020B0604020202020204" pitchFamily="34" charset="0"/>
+                          <a:cs typeface="Arial" panose="020B0604020202020204" pitchFamily="34" charset="0"/>
                         </a:rPr>
                         <a:t>)</a:t>
                       </a:r>
-                      <a:endParaRPr lang="en-GB" sz="1200" dirty="0">
+                      <a:endParaRPr lang="en-GB" sz="1300" dirty="0">
                         <a:solidFill>
                           <a:schemeClr val="bg1"/>
                         </a:solidFill>
+                        <a:latin typeface="Arial" panose="020B0604020202020204" pitchFamily="34" charset="0"/>
+                        <a:cs typeface="Arial" panose="020B0604020202020204" pitchFamily="34" charset="0"/>
                       </a:endParaRPr>
                     </a:p>
                   </a:txBody>
@@ -18192,18 +18522,23 @@
                     <a:bodyPr/>
                     <a:lstStyle/>
                     <a:p>
-                      <a:r>
-                        <a:rPr lang="en-GB" sz="1200" dirty="0" smtClean="0">
+                      <a:pPr algn="l"/>
+                      <a:r>
+                        <a:rPr lang="en-GB" sz="1300" dirty="0" smtClean="0">
                           <a:solidFill>
                             <a:schemeClr val="bg1"/>
                           </a:solidFill>
+                          <a:latin typeface="Arial" panose="020B0604020202020204" pitchFamily="34" charset="0"/>
+                          <a:cs typeface="Arial" panose="020B0604020202020204" pitchFamily="34" charset="0"/>
                         </a:rPr>
                         <a:t>Likelihood of Risk Item Occurring</a:t>
                       </a:r>
-                      <a:endParaRPr lang="en-GB" sz="1200" dirty="0">
+                      <a:endParaRPr lang="en-GB" sz="1300" dirty="0">
                         <a:solidFill>
                           <a:schemeClr val="bg1"/>
                         </a:solidFill>
+                        <a:latin typeface="Arial" panose="020B0604020202020204" pitchFamily="34" charset="0"/>
+                        <a:cs typeface="Arial" panose="020B0604020202020204" pitchFamily="34" charset="0"/>
                       </a:endParaRPr>
                     </a:p>
                   </a:txBody>
@@ -18218,19 +18553,25 @@
                     <a:bodyPr/>
                     <a:lstStyle/>
                     <a:p>
-                      <a:r>
-                        <a:rPr lang="en-GB" sz="1300" dirty="0" smtClean="0"/>
-                        <a:t>I</a:t>
-                      </a:r>
-                      <a:r>
-                        <a:rPr lang="en-GB" sz="1200" dirty="0" smtClean="0"/>
-                        <a:t>mpact to</a:t>
-                      </a:r>
-                      <a:r>
-                        <a:rPr lang="en-GB" sz="1200" baseline="0" dirty="0" smtClean="0"/>
+                      <a:pPr algn="l"/>
+                      <a:r>
+                        <a:rPr lang="en-GB" sz="1300" dirty="0" smtClean="0">
+                          <a:latin typeface="Arial" panose="020B0604020202020204" pitchFamily="34" charset="0"/>
+                          <a:cs typeface="Arial" panose="020B0604020202020204" pitchFamily="34" charset="0"/>
+                        </a:rPr>
+                        <a:t>Impact to</a:t>
+                      </a:r>
+                      <a:r>
+                        <a:rPr lang="en-GB" sz="1300" baseline="0" dirty="0" smtClean="0">
+                          <a:latin typeface="Arial" panose="020B0604020202020204" pitchFamily="34" charset="0"/>
+                          <a:cs typeface="Arial" panose="020B0604020202020204" pitchFamily="34" charset="0"/>
+                        </a:rPr>
                         <a:t> project if Risk item does occur</a:t>
                       </a:r>
-                      <a:endParaRPr lang="en-GB" sz="1200" dirty="0"/>
+                      <a:endParaRPr lang="en-GB" sz="1300" dirty="0">
+                        <a:latin typeface="Arial" panose="020B0604020202020204" pitchFamily="34" charset="0"/>
+                        <a:cs typeface="Arial" panose="020B0604020202020204" pitchFamily="34" charset="0"/>
+                      </a:endParaRPr>
                     </a:p>
                   </a:txBody>
                   <a:tcPr marL="42594" marR="42594" marT="21297" marB="21297">
@@ -18244,11 +18585,18 @@
                     <a:bodyPr/>
                     <a:lstStyle/>
                     <a:p>
-                      <a:r>
-                        <a:rPr lang="en-GB" sz="1200" dirty="0" smtClean="0"/>
+                      <a:pPr algn="l"/>
+                      <a:r>
+                        <a:rPr lang="en-GB" sz="1300" dirty="0" smtClean="0">
+                          <a:latin typeface="Arial" panose="020B0604020202020204" pitchFamily="34" charset="0"/>
+                          <a:cs typeface="Arial" panose="020B0604020202020204" pitchFamily="34" charset="0"/>
+                        </a:rPr>
                         <a:t>Solution</a:t>
                       </a:r>
-                      <a:endParaRPr lang="en-GB" sz="1200" dirty="0"/>
+                      <a:endParaRPr lang="en-GB" sz="1300" dirty="0">
+                        <a:latin typeface="Arial" panose="020B0604020202020204" pitchFamily="34" charset="0"/>
+                        <a:cs typeface="Arial" panose="020B0604020202020204" pitchFamily="34" charset="0"/>
+                      </a:endParaRPr>
                     </a:p>
                   </a:txBody>
                   <a:tcPr marL="42594" marR="42594" marT="21297" marB="21297">
@@ -18269,11 +18617,18 @@
                     <a:bodyPr/>
                     <a:lstStyle/>
                     <a:p>
-                      <a:r>
-                        <a:rPr lang="en-GB" sz="1200" dirty="0" smtClean="0"/>
+                      <a:pPr algn="l"/>
+                      <a:r>
+                        <a:rPr lang="en-GB" sz="1300" dirty="0" smtClean="0">
+                          <a:latin typeface="Arial" panose="020B0604020202020204" pitchFamily="34" charset="0"/>
+                          <a:cs typeface="Arial" panose="020B0604020202020204" pitchFamily="34" charset="0"/>
+                        </a:rPr>
                         <a:t>Fail to get an autonomous drone</a:t>
                       </a:r>
-                      <a:endParaRPr lang="en-GB" sz="1200" dirty="0"/>
+                      <a:endParaRPr lang="en-GB" sz="1300" dirty="0">
+                        <a:latin typeface="Arial" panose="020B0604020202020204" pitchFamily="34" charset="0"/>
+                        <a:cs typeface="Arial" panose="020B0604020202020204" pitchFamily="34" charset="0"/>
+                      </a:endParaRPr>
                     </a:p>
                   </a:txBody>
                   <a:tcPr marL="42594" marR="42594" marT="21297" marB="21297"/>
@@ -18283,11 +18638,18 @@
                     <a:bodyPr/>
                     <a:lstStyle/>
                     <a:p>
-                      <a:r>
-                        <a:rPr lang="en-GB" sz="1200" dirty="0" smtClean="0"/>
+                      <a:pPr algn="l"/>
+                      <a:r>
+                        <a:rPr lang="en-GB" sz="1300" dirty="0" smtClean="0">
+                          <a:latin typeface="Arial" panose="020B0604020202020204" pitchFamily="34" charset="0"/>
+                          <a:cs typeface="Arial" panose="020B0604020202020204" pitchFamily="34" charset="0"/>
+                        </a:rPr>
                         <a:t>L:5, C:2</a:t>
                       </a:r>
-                      <a:endParaRPr lang="en-GB" sz="1200" dirty="0"/>
+                      <a:endParaRPr lang="en-GB" sz="1300" dirty="0">
+                        <a:latin typeface="Arial" panose="020B0604020202020204" pitchFamily="34" charset="0"/>
+                        <a:cs typeface="Arial" panose="020B0604020202020204" pitchFamily="34" charset="0"/>
+                      </a:endParaRPr>
                     </a:p>
                   </a:txBody>
                   <a:tcPr marL="42594" marR="42594" marT="21297" marB="21297"/>
@@ -18297,15 +18659,25 @@
                     <a:bodyPr/>
                     <a:lstStyle/>
                     <a:p>
-                      <a:r>
-                        <a:rPr lang="en-GB" sz="1200" dirty="0" smtClean="0"/>
+                      <a:pPr algn="l"/>
+                      <a:r>
+                        <a:rPr lang="en-GB" sz="1300" dirty="0" smtClean="0">
+                          <a:latin typeface="Arial" panose="020B0604020202020204" pitchFamily="34" charset="0"/>
+                          <a:cs typeface="Arial" panose="020B0604020202020204" pitchFamily="34" charset="0"/>
+                        </a:rPr>
                         <a:t>The project will have to be entirely simulation</a:t>
                       </a:r>
                       <a:r>
-                        <a:rPr lang="en-GB" sz="1200" baseline="0" dirty="0" smtClean="0"/>
+                        <a:rPr lang="en-GB" sz="1300" baseline="0" dirty="0" smtClean="0">
+                          <a:latin typeface="Arial" panose="020B0604020202020204" pitchFamily="34" charset="0"/>
+                          <a:cs typeface="Arial" panose="020B0604020202020204" pitchFamily="34" charset="0"/>
+                        </a:rPr>
                         <a:t> based without a drone</a:t>
                       </a:r>
-                      <a:endParaRPr lang="en-GB" sz="1200" dirty="0"/>
+                      <a:endParaRPr lang="en-GB" sz="1300" dirty="0">
+                        <a:latin typeface="Arial" panose="020B0604020202020204" pitchFamily="34" charset="0"/>
+                        <a:cs typeface="Arial" panose="020B0604020202020204" pitchFamily="34" charset="0"/>
+                      </a:endParaRPr>
                     </a:p>
                   </a:txBody>
                   <a:tcPr marL="42594" marR="42594" marT="21297" marB="21297"/>
@@ -18315,23 +18687,39 @@
                     <a:bodyPr/>
                     <a:lstStyle/>
                     <a:p>
-                      <a:r>
-                        <a:rPr lang="en-GB" sz="1200" dirty="0" smtClean="0"/>
+                      <a:pPr algn="l"/>
+                      <a:r>
+                        <a:rPr lang="en-GB" sz="1300" dirty="0" smtClean="0">
+                          <a:latin typeface="Arial" panose="020B0604020202020204" pitchFamily="34" charset="0"/>
+                          <a:cs typeface="Arial" panose="020B0604020202020204" pitchFamily="34" charset="0"/>
+                        </a:rPr>
                         <a:t>I</a:t>
                       </a:r>
                       <a:r>
-                        <a:rPr lang="en-GB" sz="1200" baseline="0" dirty="0" smtClean="0"/>
+                        <a:rPr lang="en-GB" sz="1300" baseline="0" dirty="0" smtClean="0">
+                          <a:latin typeface="Arial" panose="020B0604020202020204" pitchFamily="34" charset="0"/>
+                          <a:cs typeface="Arial" panose="020B0604020202020204" pitchFamily="34" charset="0"/>
+                        </a:rPr>
                         <a:t> am using</a:t>
                       </a:r>
                       <a:r>
-                        <a:rPr lang="en-GB" sz="1200" dirty="0" smtClean="0"/>
+                        <a:rPr lang="en-GB" sz="1300" dirty="0" smtClean="0">
+                          <a:latin typeface="Arial" panose="020B0604020202020204" pitchFamily="34" charset="0"/>
+                          <a:cs typeface="Arial" panose="020B0604020202020204" pitchFamily="34" charset="0"/>
+                        </a:rPr>
                         <a:t> </a:t>
                       </a:r>
                       <a:r>
-                        <a:rPr lang="en-GB" sz="1200" baseline="0" dirty="0" smtClean="0"/>
+                        <a:rPr lang="en-GB" sz="1300" baseline="0" dirty="0" smtClean="0">
+                          <a:latin typeface="Arial" panose="020B0604020202020204" pitchFamily="34" charset="0"/>
+                          <a:cs typeface="Arial" panose="020B0604020202020204" pitchFamily="34" charset="0"/>
+                        </a:rPr>
                         <a:t>VMs to simulate the raspberry pi a phone to simulate the drone</a:t>
                       </a:r>
-                      <a:endParaRPr lang="en-GB" sz="1200" dirty="0"/>
+                      <a:endParaRPr lang="en-GB" sz="1300" dirty="0">
+                        <a:latin typeface="Arial" panose="020B0604020202020204" pitchFamily="34" charset="0"/>
+                        <a:cs typeface="Arial" panose="020B0604020202020204" pitchFamily="34" charset="0"/>
+                      </a:endParaRPr>
                     </a:p>
                   </a:txBody>
                   <a:tcPr marL="42594" marR="42594" marT="21297" marB="21297"/>
@@ -18348,15 +18736,25 @@
                     <a:bodyPr/>
                     <a:lstStyle/>
                     <a:p>
-                      <a:r>
-                        <a:rPr lang="en-GB" sz="1200" dirty="0" smtClean="0"/>
+                      <a:pPr algn="l"/>
+                      <a:r>
+                        <a:rPr lang="en-GB" sz="1300" dirty="0" smtClean="0">
+                          <a:latin typeface="Arial" panose="020B0604020202020204" pitchFamily="34" charset="0"/>
+                          <a:cs typeface="Arial" panose="020B0604020202020204" pitchFamily="34" charset="0"/>
+                        </a:rPr>
                         <a:t>Fail</a:t>
                       </a:r>
                       <a:r>
-                        <a:rPr lang="en-GB" sz="1200" baseline="0" dirty="0" smtClean="0"/>
+                        <a:rPr lang="en-GB" sz="1300" baseline="0" dirty="0" smtClean="0">
+                          <a:latin typeface="Arial" panose="020B0604020202020204" pitchFamily="34" charset="0"/>
+                          <a:cs typeface="Arial" panose="020B0604020202020204" pitchFamily="34" charset="0"/>
+                        </a:rPr>
                         <a:t> to safely secure user data</a:t>
                       </a:r>
-                      <a:endParaRPr lang="en-GB" sz="1200" dirty="0"/>
+                      <a:endParaRPr lang="en-GB" sz="1300" dirty="0">
+                        <a:latin typeface="Arial" panose="020B0604020202020204" pitchFamily="34" charset="0"/>
+                        <a:cs typeface="Arial" panose="020B0604020202020204" pitchFamily="34" charset="0"/>
+                      </a:endParaRPr>
                     </a:p>
                   </a:txBody>
                   <a:tcPr marL="42594" marR="42594" marT="21297" marB="21297"/>
@@ -18366,11 +18764,18 @@
                     <a:bodyPr/>
                     <a:lstStyle/>
                     <a:p>
-                      <a:r>
-                        <a:rPr lang="en-GB" sz="1200" dirty="0" smtClean="0"/>
+                      <a:pPr algn="l"/>
+                      <a:r>
+                        <a:rPr lang="en-GB" sz="1300" dirty="0" smtClean="0">
+                          <a:latin typeface="Arial" panose="020B0604020202020204" pitchFamily="34" charset="0"/>
+                          <a:cs typeface="Arial" panose="020B0604020202020204" pitchFamily="34" charset="0"/>
+                        </a:rPr>
                         <a:t>L:2,C:5</a:t>
                       </a:r>
-                      <a:endParaRPr lang="en-GB" sz="1200" dirty="0"/>
+                      <a:endParaRPr lang="en-GB" sz="1300" dirty="0">
+                        <a:latin typeface="Arial" panose="020B0604020202020204" pitchFamily="34" charset="0"/>
+                        <a:cs typeface="Arial" panose="020B0604020202020204" pitchFamily="34" charset="0"/>
+                      </a:endParaRPr>
                     </a:p>
                   </a:txBody>
                   <a:tcPr marL="42594" marR="42594" marT="21297" marB="21297"/>
@@ -18380,11 +18785,18 @@
                     <a:bodyPr/>
                     <a:lstStyle/>
                     <a:p>
-                      <a:r>
-                        <a:rPr lang="en-GB" sz="1200" baseline="0" dirty="0" smtClean="0"/>
+                      <a:pPr algn="l"/>
+                      <a:r>
+                        <a:rPr lang="en-GB" sz="1300" baseline="0" dirty="0" smtClean="0">
+                          <a:latin typeface="Arial" panose="020B0604020202020204" pitchFamily="34" charset="0"/>
+                          <a:cs typeface="Arial" panose="020B0604020202020204" pitchFamily="34" charset="0"/>
+                        </a:rPr>
                         <a:t>The project will not be able to go on without secure encryption</a:t>
                       </a:r>
-                      <a:endParaRPr lang="en-GB" sz="1200" dirty="0"/>
+                      <a:endParaRPr lang="en-GB" sz="1300" dirty="0">
+                        <a:latin typeface="Arial" panose="020B0604020202020204" pitchFamily="34" charset="0"/>
+                        <a:cs typeface="Arial" panose="020B0604020202020204" pitchFamily="34" charset="0"/>
+                      </a:endParaRPr>
                     </a:p>
                   </a:txBody>
                   <a:tcPr marL="42594" marR="42594" marT="21297" marB="21297"/>
@@ -18394,15 +18806,25 @@
                     <a:bodyPr/>
                     <a:lstStyle/>
                     <a:p>
-                      <a:r>
-                        <a:rPr lang="en-GB" sz="1200" dirty="0" smtClean="0"/>
+                      <a:pPr algn="l"/>
+                      <a:r>
+                        <a:rPr lang="en-GB" sz="1300" dirty="0" smtClean="0">
+                          <a:latin typeface="Arial" panose="020B0604020202020204" pitchFamily="34" charset="0"/>
+                          <a:cs typeface="Arial" panose="020B0604020202020204" pitchFamily="34" charset="0"/>
+                        </a:rPr>
                         <a:t>The images will</a:t>
                       </a:r>
                       <a:r>
-                        <a:rPr lang="en-GB" sz="1200" baseline="0" dirty="0" smtClean="0"/>
+                        <a:rPr lang="en-GB" sz="1300" baseline="0" dirty="0" smtClean="0">
+                          <a:latin typeface="Arial" panose="020B0604020202020204" pitchFamily="34" charset="0"/>
+                          <a:cs typeface="Arial" panose="020B0604020202020204" pitchFamily="34" charset="0"/>
+                        </a:rPr>
                         <a:t> be sent over the internet via a secure port and then will encrypted.</a:t>
                       </a:r>
-                      <a:endParaRPr lang="en-GB" sz="1200" dirty="0"/>
+                      <a:endParaRPr lang="en-GB" sz="1300" dirty="0">
+                        <a:latin typeface="Arial" panose="020B0604020202020204" pitchFamily="34" charset="0"/>
+                        <a:cs typeface="Arial" panose="020B0604020202020204" pitchFamily="34" charset="0"/>
+                      </a:endParaRPr>
                     </a:p>
                   </a:txBody>
                   <a:tcPr marL="42594" marR="42594" marT="21297" marB="21297"/>
@@ -18419,15 +18841,25 @@
                     <a:bodyPr/>
                     <a:lstStyle/>
                     <a:p>
-                      <a:r>
-                        <a:rPr lang="en-GB" sz="1200" dirty="0" smtClean="0"/>
+                      <a:pPr algn="l"/>
+                      <a:r>
+                        <a:rPr lang="en-GB" sz="1300" dirty="0" smtClean="0">
+                          <a:latin typeface="Arial" panose="020B0604020202020204" pitchFamily="34" charset="0"/>
+                          <a:cs typeface="Arial" panose="020B0604020202020204" pitchFamily="34" charset="0"/>
+                        </a:rPr>
                         <a:t>Fail to compare</a:t>
                       </a:r>
                       <a:r>
-                        <a:rPr lang="en-GB" sz="1200" baseline="0" dirty="0" smtClean="0"/>
+                        <a:rPr lang="en-GB" sz="1300" baseline="0" dirty="0" smtClean="0">
+                          <a:latin typeface="Arial" panose="020B0604020202020204" pitchFamily="34" charset="0"/>
+                          <a:cs typeface="Arial" panose="020B0604020202020204" pitchFamily="34" charset="0"/>
+                        </a:rPr>
                         <a:t> other face recognition libraries</a:t>
                       </a:r>
-                      <a:endParaRPr lang="en-GB" sz="1200" dirty="0"/>
+                      <a:endParaRPr lang="en-GB" sz="1300" dirty="0">
+                        <a:latin typeface="Arial" panose="020B0604020202020204" pitchFamily="34" charset="0"/>
+                        <a:cs typeface="Arial" panose="020B0604020202020204" pitchFamily="34" charset="0"/>
+                      </a:endParaRPr>
                     </a:p>
                   </a:txBody>
                   <a:tcPr marL="42594" marR="42594" marT="21297" marB="21297"/>
@@ -18437,11 +18869,18 @@
                     <a:bodyPr/>
                     <a:lstStyle/>
                     <a:p>
-                      <a:r>
-                        <a:rPr lang="en-GB" sz="1200" dirty="0" smtClean="0"/>
+                      <a:pPr algn="l"/>
+                      <a:r>
+                        <a:rPr lang="en-GB" sz="1300" dirty="0" smtClean="0">
+                          <a:latin typeface="Arial" panose="020B0604020202020204" pitchFamily="34" charset="0"/>
+                          <a:cs typeface="Arial" panose="020B0604020202020204" pitchFamily="34" charset="0"/>
+                        </a:rPr>
                         <a:t>L:3,L:2</a:t>
                       </a:r>
-                      <a:endParaRPr lang="en-GB" sz="1200" dirty="0"/>
+                      <a:endParaRPr lang="en-GB" sz="1300" dirty="0">
+                        <a:latin typeface="Arial" panose="020B0604020202020204" pitchFamily="34" charset="0"/>
+                        <a:cs typeface="Arial" panose="020B0604020202020204" pitchFamily="34" charset="0"/>
+                      </a:endParaRPr>
                     </a:p>
                   </a:txBody>
                   <a:tcPr marL="42594" marR="42594" marT="21297" marB="21297"/>
@@ -18451,15 +18890,25 @@
                     <a:bodyPr/>
                     <a:lstStyle/>
                     <a:p>
-                      <a:r>
-                        <a:rPr lang="en-GB" sz="1200" dirty="0" smtClean="0"/>
+                      <a:pPr algn="l"/>
+                      <a:r>
+                        <a:rPr lang="en-GB" sz="1300" dirty="0" smtClean="0">
+                          <a:latin typeface="Arial" panose="020B0604020202020204" pitchFamily="34" charset="0"/>
+                          <a:cs typeface="Arial" panose="020B0604020202020204" pitchFamily="34" charset="0"/>
+                        </a:rPr>
                         <a:t>This will</a:t>
                       </a:r>
                       <a:r>
-                        <a:rPr lang="en-GB" sz="1200" baseline="0" dirty="0" smtClean="0"/>
+                        <a:rPr lang="en-GB" sz="1300" baseline="0" dirty="0" smtClean="0">
+                          <a:latin typeface="Arial" panose="020B0604020202020204" pitchFamily="34" charset="0"/>
+                          <a:cs typeface="Arial" panose="020B0604020202020204" pitchFamily="34" charset="0"/>
+                        </a:rPr>
                         <a:t> mean a better face recognition library I do not test may provide better results in the future</a:t>
                       </a:r>
-                      <a:endParaRPr lang="en-GB" sz="1200" dirty="0"/>
+                      <a:endParaRPr lang="en-GB" sz="1300" dirty="0">
+                        <a:latin typeface="Arial" panose="020B0604020202020204" pitchFamily="34" charset="0"/>
+                        <a:cs typeface="Arial" panose="020B0604020202020204" pitchFamily="34" charset="0"/>
+                      </a:endParaRPr>
                     </a:p>
                   </a:txBody>
                   <a:tcPr marL="42594" marR="42594" marT="21297" marB="21297"/>
@@ -18487,14 +18936,23 @@
                         <a:defRPr/>
                       </a:pPr>
                       <a:r>
-                        <a:rPr lang="en-GB" sz="1200" dirty="0" smtClean="0"/>
+                        <a:rPr lang="en-GB" sz="1300" dirty="0" smtClean="0">
+                          <a:latin typeface="Arial" panose="020B0604020202020204" pitchFamily="34" charset="0"/>
+                          <a:cs typeface="Arial" panose="020B0604020202020204" pitchFamily="34" charset="0"/>
+                        </a:rPr>
                         <a:t>The</a:t>
                       </a:r>
                       <a:r>
-                        <a:rPr lang="en-GB" sz="1200" baseline="0" dirty="0" smtClean="0"/>
+                        <a:rPr lang="en-GB" sz="1300" baseline="0" dirty="0" smtClean="0">
+                          <a:latin typeface="Arial" panose="020B0604020202020204" pitchFamily="34" charset="0"/>
+                          <a:cs typeface="Arial" panose="020B0604020202020204" pitchFamily="34" charset="0"/>
+                        </a:rPr>
                         <a:t> main objectives of implementing facial recognition into a drone and being able to switch targets will be possible</a:t>
                       </a:r>
-                      <a:endParaRPr lang="en-GB" sz="1200" dirty="0" smtClean="0"/>
+                      <a:endParaRPr lang="en-GB" sz="1300" dirty="0" smtClean="0">
+                        <a:latin typeface="Arial" panose="020B0604020202020204" pitchFamily="34" charset="0"/>
+                        <a:cs typeface="Arial" panose="020B0604020202020204" pitchFamily="34" charset="0"/>
+                      </a:endParaRPr>
                     </a:p>
                   </a:txBody>
                   <a:tcPr marL="42594" marR="42594" marT="21297" marB="21297"/>
@@ -18511,15 +18969,25 @@
                     <a:bodyPr/>
                     <a:lstStyle/>
                     <a:p>
-                      <a:r>
-                        <a:rPr lang="en-GB" sz="1200" dirty="0" smtClean="0"/>
+                      <a:pPr algn="l"/>
+                      <a:r>
+                        <a:rPr lang="en-GB" sz="1300" dirty="0" smtClean="0">
+                          <a:latin typeface="Arial" panose="020B0604020202020204" pitchFamily="34" charset="0"/>
+                          <a:cs typeface="Arial" panose="020B0604020202020204" pitchFamily="34" charset="0"/>
+                        </a:rPr>
                         <a:t>Fail to get</a:t>
                       </a:r>
                       <a:r>
-                        <a:rPr lang="en-GB" sz="1200" baseline="0" dirty="0" smtClean="0"/>
+                        <a:rPr lang="en-GB" sz="1300" baseline="0" dirty="0" smtClean="0">
+                          <a:latin typeface="Arial" panose="020B0604020202020204" pitchFamily="34" charset="0"/>
+                          <a:cs typeface="Arial" panose="020B0604020202020204" pitchFamily="34" charset="0"/>
+                        </a:rPr>
                         <a:t> raspberry pi but get suitable drone</a:t>
                       </a:r>
-                      <a:endParaRPr lang="en-GB" sz="1200" dirty="0"/>
+                      <a:endParaRPr lang="en-GB" sz="1300" dirty="0">
+                        <a:latin typeface="Arial" panose="020B0604020202020204" pitchFamily="34" charset="0"/>
+                        <a:cs typeface="Arial" panose="020B0604020202020204" pitchFamily="34" charset="0"/>
+                      </a:endParaRPr>
                     </a:p>
                   </a:txBody>
                   <a:tcPr marL="42594" marR="42594" marT="21297" marB="21297"/>
@@ -18529,11 +18997,18 @@
                     <a:bodyPr/>
                     <a:lstStyle/>
                     <a:p>
-                      <a:r>
-                        <a:rPr lang="en-GB" sz="1200" dirty="0" smtClean="0"/>
+                      <a:pPr algn="l"/>
+                      <a:r>
+                        <a:rPr lang="en-GB" sz="1300" dirty="0" smtClean="0">
+                          <a:latin typeface="Arial" panose="020B0604020202020204" pitchFamily="34" charset="0"/>
+                          <a:cs typeface="Arial" panose="020B0604020202020204" pitchFamily="34" charset="0"/>
+                        </a:rPr>
                         <a:t>L:5, C:1</a:t>
                       </a:r>
-                      <a:endParaRPr lang="en-GB" sz="1200" dirty="0"/>
+                      <a:endParaRPr lang="en-GB" sz="1300" dirty="0">
+                        <a:latin typeface="Arial" panose="020B0604020202020204" pitchFamily="34" charset="0"/>
+                        <a:cs typeface="Arial" panose="020B0604020202020204" pitchFamily="34" charset="0"/>
+                      </a:endParaRPr>
                     </a:p>
                   </a:txBody>
                   <a:tcPr marL="42594" marR="42594" marT="21297" marB="21297"/>
@@ -18543,15 +19018,25 @@
                     <a:bodyPr/>
                     <a:lstStyle/>
                     <a:p>
-                      <a:r>
-                        <a:rPr lang="en-GB" sz="1200" dirty="0" smtClean="0"/>
+                      <a:pPr algn="l"/>
+                      <a:r>
+                        <a:rPr lang="en-GB" sz="1300" dirty="0" smtClean="0">
+                          <a:latin typeface="Arial" panose="020B0604020202020204" pitchFamily="34" charset="0"/>
+                          <a:cs typeface="Arial" panose="020B0604020202020204" pitchFamily="34" charset="0"/>
+                        </a:rPr>
                         <a:t>Without a raspberry pi the project</a:t>
                       </a:r>
                       <a:r>
-                        <a:rPr lang="en-GB" sz="1200" baseline="0" dirty="0" smtClean="0"/>
+                        <a:rPr lang="en-GB" sz="1300" baseline="0" dirty="0" smtClean="0">
+                          <a:latin typeface="Arial" panose="020B0604020202020204" pitchFamily="34" charset="0"/>
+                          <a:cs typeface="Arial" panose="020B0604020202020204" pitchFamily="34" charset="0"/>
+                        </a:rPr>
                         <a:t> will have to be done with VMs</a:t>
                       </a:r>
-                      <a:endParaRPr lang="en-GB" sz="1200" dirty="0"/>
+                      <a:endParaRPr lang="en-GB" sz="1300" dirty="0">
+                        <a:latin typeface="Arial" panose="020B0604020202020204" pitchFamily="34" charset="0"/>
+                        <a:cs typeface="Arial" panose="020B0604020202020204" pitchFamily="34" charset="0"/>
+                      </a:endParaRPr>
                     </a:p>
                   </a:txBody>
                   <a:tcPr marL="42594" marR="42594" marT="21297" marB="21297"/>
@@ -18561,15 +19046,25 @@
                     <a:bodyPr/>
                     <a:lstStyle/>
                     <a:p>
-                      <a:r>
-                        <a:rPr lang="en-GB" sz="1100" dirty="0" smtClean="0"/>
-                        <a:t>This means that</a:t>
-                      </a:r>
-                      <a:r>
-                        <a:rPr lang="en-GB" sz="1100" baseline="0" dirty="0" smtClean="0"/>
-                        <a:t> facial recognition will not happen on the drone and instead on a computer after the video is streamed</a:t>
-                      </a:r>
-                      <a:endParaRPr lang="en-GB" sz="1100" dirty="0"/>
+                      <a:pPr algn="l"/>
+                      <a:r>
+                        <a:rPr lang="en-GB" sz="1300" dirty="0" smtClean="0">
+                          <a:latin typeface="Arial" panose="020B0604020202020204" pitchFamily="34" charset="0"/>
+                          <a:cs typeface="Arial" panose="020B0604020202020204" pitchFamily="34" charset="0"/>
+                        </a:rPr>
+                        <a:t>Facial recognition will have</a:t>
+                      </a:r>
+                      <a:r>
+                        <a:rPr lang="en-GB" sz="1300" baseline="0" dirty="0" smtClean="0">
+                          <a:latin typeface="Arial" panose="020B0604020202020204" pitchFamily="34" charset="0"/>
+                          <a:cs typeface="Arial" panose="020B0604020202020204" pitchFamily="34" charset="0"/>
+                        </a:rPr>
+                        <a:t> to be on the computer after the video is streamed</a:t>
+                      </a:r>
+                      <a:endParaRPr lang="en-GB" sz="1300" dirty="0">
+                        <a:latin typeface="Arial" panose="020B0604020202020204" pitchFamily="34" charset="0"/>
+                        <a:cs typeface="Arial" panose="020B0604020202020204" pitchFamily="34" charset="0"/>
+                      </a:endParaRPr>
                     </a:p>
                   </a:txBody>
                   <a:tcPr marL="42594" marR="42594" marT="21297" marB="21297"/>
@@ -18599,7 +19094,7 @@
         </p:blipFill>
         <p:spPr>
           <a:xfrm>
-            <a:off x="25850849" y="3578060"/>
+            <a:off x="25452291" y="3578514"/>
             <a:ext cx="571501" cy="536236"/>
           </a:xfrm>
           <a:prstGeom prst="rect">
@@ -18623,7 +19118,7 @@
         </p:blipFill>
         <p:spPr>
           <a:xfrm>
-            <a:off x="24373353" y="3787573"/>
+            <a:off x="24187231" y="3720814"/>
             <a:ext cx="581310" cy="505487"/>
           </a:xfrm>
           <a:prstGeom prst="rect">
@@ -18647,7 +19142,7 @@
         </p:blipFill>
         <p:spPr>
           <a:xfrm>
-            <a:off x="21626343" y="3799278"/>
+            <a:off x="21912223" y="3668442"/>
             <a:ext cx="518294" cy="446308"/>
           </a:xfrm>
           <a:prstGeom prst="rect">
@@ -18677,7 +19172,7 @@
         </p:blipFill>
         <p:spPr>
           <a:xfrm>
-            <a:off x="22686114" y="3609221"/>
+            <a:off x="22759866" y="3665420"/>
             <a:ext cx="636365" cy="636365"/>
           </a:xfrm>
           <a:prstGeom prst="rect">
@@ -18693,8 +19188,8 @@
         </p:nvSpPr>
         <p:spPr>
           <a:xfrm>
-            <a:off x="20597439" y="8270603"/>
-            <a:ext cx="2514235" cy="523220"/>
+            <a:off x="20618699" y="8863073"/>
+            <a:ext cx="5290209" cy="307777"/>
           </a:xfrm>
           <a:prstGeom prst="rect">
             <a:avLst/>
@@ -18709,14 +19204,14 @@
           <a:p>
             <a:r>
               <a:rPr lang="en-GB" sz="1400" dirty="0" smtClean="0">
-                <a:latin typeface="Times New Roman" panose="02020603050405020304" pitchFamily="18" charset="0"/>
-                <a:cs typeface="Times New Roman" panose="02020603050405020304" pitchFamily="18" charset="0"/>
+                <a:latin typeface="Arial" panose="020B0604020202020204" pitchFamily="34" charset="0"/>
+                <a:cs typeface="Arial" panose="020B0604020202020204" pitchFamily="34" charset="0"/>
               </a:rPr>
               <a:t>L: Likelihood, C: Consequence, high numbers mean more likely</a:t>
             </a:r>
             <a:endParaRPr lang="en-GB" sz="1400" dirty="0">
-              <a:latin typeface="Times New Roman" panose="02020603050405020304" pitchFamily="18" charset="0"/>
-              <a:cs typeface="Times New Roman" panose="02020603050405020304" pitchFamily="18" charset="0"/>
+              <a:latin typeface="Arial" panose="020B0604020202020204" pitchFamily="34" charset="0"/>
+              <a:cs typeface="Arial" panose="020B0604020202020204" pitchFamily="34" charset="0"/>
             </a:endParaRPr>
           </a:p>
         </p:txBody>
@@ -18745,10 +19240,16 @@
           <a:lstStyle/>
           <a:p>
             <a:r>
-              <a:rPr lang="en-US" u="none" dirty="0" smtClean="0"/>
+              <a:rPr lang="en-US" u="none" dirty="0" smtClean="0">
+                <a:latin typeface="Arial" panose="020B0604020202020204" pitchFamily="34" charset="0"/>
+                <a:cs typeface="Arial" panose="020B0604020202020204" pitchFamily="34" charset="0"/>
+              </a:rPr>
               <a:t>Research Results</a:t>
             </a:r>
-            <a:endParaRPr lang="en-US" u="none" dirty="0"/>
+            <a:endParaRPr lang="en-US" u="none" dirty="0">
+              <a:latin typeface="Arial" panose="020B0604020202020204" pitchFamily="34" charset="0"/>
+              <a:cs typeface="Arial" panose="020B0604020202020204" pitchFamily="34" charset="0"/>
+            </a:endParaRPr>
           </a:p>
         </p:txBody>
       </p:sp>
@@ -18820,7 +19321,7 @@
         </p:nvGrpSpPr>
         <p:grpSpPr>
           <a:xfrm>
-            <a:off x="654940" y="12736353"/>
+            <a:off x="606692" y="12946217"/>
             <a:ext cx="6076060" cy="3466235"/>
             <a:chOff x="111496" y="12897565"/>
             <a:chExt cx="6076060" cy="3466235"/>
@@ -18893,7 +19394,7 @@
         </p:nvSpPr>
         <p:spPr>
           <a:xfrm>
-            <a:off x="649017" y="12561723"/>
+            <a:off x="540226" y="12864067"/>
             <a:ext cx="1660341" cy="400110"/>
           </a:xfrm>
           <a:prstGeom prst="rect">
@@ -18909,14 +19410,14 @@
           <a:p>
             <a:r>
               <a:rPr lang="en-GB" sz="2000" dirty="0" smtClean="0">
-                <a:latin typeface="Times New Roman" panose="02020603050405020304" pitchFamily="18" charset="0"/>
-                <a:cs typeface="Times New Roman" panose="02020603050405020304" pitchFamily="18" charset="0"/>
+                <a:latin typeface="Arial" panose="020B0604020202020204" pitchFamily="34" charset="0"/>
+                <a:cs typeface="Arial" panose="020B0604020202020204" pitchFamily="34" charset="0"/>
               </a:rPr>
               <a:t>Gantt chart</a:t>
             </a:r>
             <a:endParaRPr lang="en-GB" sz="2000" dirty="0">
-              <a:latin typeface="Times New Roman" panose="02020603050405020304" pitchFamily="18" charset="0"/>
-              <a:cs typeface="Times New Roman" panose="02020603050405020304" pitchFamily="18" charset="0"/>
+              <a:latin typeface="Arial" panose="020B0604020202020204" pitchFamily="34" charset="0"/>
+              <a:cs typeface="Arial" panose="020B0604020202020204" pitchFamily="34" charset="0"/>
             </a:endParaRPr>
           </a:p>
         </p:txBody>
@@ -18935,8 +19436,8 @@
         </p:nvSpPr>
         <p:spPr>
           <a:xfrm>
-            <a:off x="17601455" y="6470962"/>
-            <a:ext cx="3073138" cy="307777"/>
+            <a:off x="17644006" y="6290983"/>
+            <a:ext cx="2537716" cy="692497"/>
           </a:xfrm>
           <a:prstGeom prst="rect">
             <a:avLst/>
@@ -18950,26 +19451,37 @@
           <a:lstStyle/>
           <a:p>
             <a:r>
-              <a:rPr lang="en-GB" sz="1400" dirty="0">
-                <a:latin typeface="Times New Roman" panose="02020603050405020304" pitchFamily="18" charset="0"/>
-                <a:cs typeface="Times New Roman" panose="02020603050405020304" pitchFamily="18" charset="0"/>
+              <a:rPr lang="en-GB" sz="1300" dirty="0">
+                <a:latin typeface="Arial" panose="020B0604020202020204" pitchFamily="34" charset="0"/>
+                <a:cs typeface="Arial" panose="020B0604020202020204" pitchFamily="34" charset="0"/>
               </a:rPr>
               <a:t>MX-chip is an </a:t>
             </a:r>
             <a:r>
-              <a:rPr lang="en-GB" sz="1400" dirty="0" err="1">
-                <a:latin typeface="Times New Roman" panose="02020603050405020304" pitchFamily="18" charset="0"/>
-                <a:cs typeface="Times New Roman" panose="02020603050405020304" pitchFamily="18" charset="0"/>
+              <a:rPr lang="en-GB" sz="1300" dirty="0" smtClean="0">
+                <a:latin typeface="Arial" panose="020B0604020202020204" pitchFamily="34" charset="0"/>
+                <a:cs typeface="Arial" panose="020B0604020202020204" pitchFamily="34" charset="0"/>
               </a:rPr>
-              <a:t>iot</a:t>
+              <a:t>IoT capable device </a:t>
             </a:r>
             <a:r>
-              <a:rPr lang="en-GB" sz="1400" dirty="0">
-                <a:latin typeface="Times New Roman" panose="02020603050405020304" pitchFamily="18" charset="0"/>
-                <a:cs typeface="Times New Roman" panose="02020603050405020304" pitchFamily="18" charset="0"/>
+              <a:rPr lang="en-GB" sz="1300" dirty="0">
+                <a:latin typeface="Arial" panose="020B0604020202020204" pitchFamily="34" charset="0"/>
+                <a:cs typeface="Arial" panose="020B0604020202020204" pitchFamily="34" charset="0"/>
               </a:rPr>
-              <a:t> device used to…..</a:t>
+              <a:t>used </a:t>
             </a:r>
+            <a:r>
+              <a:rPr lang="en-GB" sz="1300" dirty="0" smtClean="0">
+                <a:latin typeface="Arial" panose="020B0604020202020204" pitchFamily="34" charset="0"/>
+                <a:cs typeface="Arial" panose="020B0604020202020204" pitchFamily="34" charset="0"/>
+              </a:rPr>
+              <a:t>to send and receive data from the cloud</a:t>
+            </a:r>
+            <a:endParaRPr lang="en-GB" sz="1300" dirty="0">
+              <a:latin typeface="Arial" panose="020B0604020202020204" pitchFamily="34" charset="0"/>
+              <a:cs typeface="Arial" panose="020B0604020202020204" pitchFamily="34" charset="0"/>
+            </a:endParaRPr>
           </a:p>
         </p:txBody>
       </p:sp>
@@ -18987,8 +19499,8 @@
         </p:nvSpPr>
         <p:spPr>
           <a:xfrm>
-            <a:off x="10220033" y="8457394"/>
-            <a:ext cx="3073138" cy="523220"/>
+            <a:off x="10022202" y="8092080"/>
+            <a:ext cx="3325212" cy="892552"/>
           </a:xfrm>
           <a:prstGeom prst="rect">
             <a:avLst/>
@@ -19001,26 +19513,20 @@
           </a:bodyPr>
           <a:lstStyle/>
           <a:p>
+            <a:pPr algn="just"/>
             <a:r>
-              <a:rPr lang="en-GB" sz="1400" dirty="0">
-                <a:latin typeface="Times New Roman" panose="02020603050405020304" pitchFamily="18" charset="0"/>
-                <a:cs typeface="Times New Roman" panose="02020603050405020304" pitchFamily="18" charset="0"/>
+              <a:rPr lang="en-GB" sz="1300" dirty="0" smtClean="0">
+                <a:latin typeface="Arial" panose="020B0604020202020204" pitchFamily="34" charset="0"/>
+                <a:cs typeface="Arial" panose="020B0604020202020204" pitchFamily="34" charset="0"/>
               </a:rPr>
-              <a:t>Responsible for redirecting the drone </a:t>
+              <a:t>The IoT hub is a cloud server capable of creating a storage space for data and facilitating access to  that data via an app </a:t>
             </a:r>
             <a:r>
-              <a:rPr lang="en-GB" sz="1400" dirty="0" err="1">
-                <a:latin typeface="Times New Roman" panose="02020603050405020304" pitchFamily="18" charset="0"/>
-                <a:cs typeface="Times New Roman" panose="02020603050405020304" pitchFamily="18" charset="0"/>
+              <a:rPr lang="en-GB" sz="1300" dirty="0">
+                <a:latin typeface="Arial" panose="020B0604020202020204" pitchFamily="34" charset="0"/>
+                <a:cs typeface="Arial" panose="020B0604020202020204" pitchFamily="34" charset="0"/>
               </a:rPr>
-              <a:t>fottage</a:t>
-            </a:r>
-            <a:r>
-              <a:rPr lang="en-GB" sz="1400" dirty="0">
-                <a:latin typeface="Times New Roman" panose="02020603050405020304" pitchFamily="18" charset="0"/>
-                <a:cs typeface="Times New Roman" panose="02020603050405020304" pitchFamily="18" charset="0"/>
-              </a:rPr>
-              <a:t> to the app client…..</a:t>
+              <a:t>client…..</a:t>
             </a:r>
           </a:p>
         </p:txBody>
@@ -19039,8 +19545,8 @@
         </p:nvSpPr>
         <p:spPr>
           <a:xfrm>
-            <a:off x="7860985" y="6409407"/>
-            <a:ext cx="3073138" cy="738664"/>
+            <a:off x="7218171" y="6157801"/>
+            <a:ext cx="3488294" cy="1092607"/>
           </a:xfrm>
           <a:prstGeom prst="rect">
             <a:avLst/>
@@ -19053,13 +19559,39 @@
           </a:bodyPr>
           <a:lstStyle/>
           <a:p>
+            <a:pPr algn="just"/>
             <a:r>
-              <a:rPr lang="en-GB" sz="1400" dirty="0">
-                <a:latin typeface="Times New Roman" panose="02020603050405020304" pitchFamily="18" charset="0"/>
-                <a:cs typeface="Times New Roman" panose="02020603050405020304" pitchFamily="18" charset="0"/>
+              <a:rPr lang="en-GB" sz="1300" dirty="0">
+                <a:latin typeface="Arial" panose="020B0604020202020204" pitchFamily="34" charset="0"/>
+                <a:cs typeface="Arial" panose="020B0604020202020204" pitchFamily="34" charset="0"/>
               </a:rPr>
-              <a:t>The app client will enable viewing of the resultant video stream as well as sending images to the drone…..</a:t>
+              <a:t>The app client will enable viewing of the resultant video stream </a:t>
             </a:r>
+            <a:r>
+              <a:rPr lang="en-GB" sz="1300" dirty="0" smtClean="0">
+                <a:latin typeface="Arial" panose="020B0604020202020204" pitchFamily="34" charset="0"/>
+                <a:cs typeface="Arial" panose="020B0604020202020204" pitchFamily="34" charset="0"/>
+              </a:rPr>
+              <a:t>from the cloud database as </a:t>
+            </a:r>
+            <a:r>
+              <a:rPr lang="en-GB" sz="1300" dirty="0">
+                <a:latin typeface="Arial" panose="020B0604020202020204" pitchFamily="34" charset="0"/>
+                <a:cs typeface="Arial" panose="020B0604020202020204" pitchFamily="34" charset="0"/>
+              </a:rPr>
+              <a:t>well as sending images to the drone</a:t>
+            </a:r>
+            <a:r>
+              <a:rPr lang="en-GB" sz="1300" dirty="0" smtClean="0">
+                <a:latin typeface="Arial" panose="020B0604020202020204" pitchFamily="34" charset="0"/>
+                <a:cs typeface="Arial" panose="020B0604020202020204" pitchFamily="34" charset="0"/>
+              </a:rPr>
+              <a:t>….. Via a TCP protocol setup with python</a:t>
+            </a:r>
+            <a:endParaRPr lang="en-GB" sz="1300" dirty="0">
+              <a:latin typeface="Arial" panose="020B0604020202020204" pitchFamily="34" charset="0"/>
+              <a:cs typeface="Arial" panose="020B0604020202020204" pitchFamily="34" charset="0"/>
+            </a:endParaRPr>
           </a:p>
         </p:txBody>
       </p:sp>
@@ -19077,8 +19609,8 @@
         </p:nvSpPr>
         <p:spPr>
           <a:xfrm>
-            <a:off x="14916760" y="4503207"/>
-            <a:ext cx="3073138" cy="307777"/>
+            <a:off x="14888621" y="4355101"/>
+            <a:ext cx="3073138" cy="892552"/>
           </a:xfrm>
           <a:prstGeom prst="rect">
             <a:avLst/>
@@ -19091,13 +19623,25 @@
           </a:bodyPr>
           <a:lstStyle/>
           <a:p>
+            <a:pPr algn="just"/>
             <a:r>
-              <a:rPr lang="en-GB" sz="1400" dirty="0">
-                <a:latin typeface="Times New Roman" panose="02020603050405020304" pitchFamily="18" charset="0"/>
-                <a:cs typeface="Times New Roman" panose="02020603050405020304" pitchFamily="18" charset="0"/>
+              <a:rPr lang="en-GB" sz="1300" dirty="0">
+                <a:latin typeface="Arial" panose="020B0604020202020204" pitchFamily="34" charset="0"/>
+                <a:cs typeface="Arial" panose="020B0604020202020204" pitchFamily="34" charset="0"/>
               </a:rPr>
-              <a:t>Raspberry pi is a device used to…..</a:t>
+              <a:t>Raspberry </a:t>
             </a:r>
+            <a:r>
+              <a:rPr lang="en-GB" sz="1300" dirty="0" smtClean="0">
+                <a:latin typeface="Arial" panose="020B0604020202020204" pitchFamily="34" charset="0"/>
+                <a:cs typeface="Arial" panose="020B0604020202020204" pitchFamily="34" charset="0"/>
+              </a:rPr>
+              <a:t>pi: a microcontroller that will be used to run facial recognition data and send the classified output of this data to the cloud via an IoT Device</a:t>
+            </a:r>
+            <a:endParaRPr lang="en-GB" sz="1300" dirty="0">
+              <a:latin typeface="Arial" panose="020B0604020202020204" pitchFamily="34" charset="0"/>
+              <a:cs typeface="Arial" panose="020B0604020202020204" pitchFamily="34" charset="0"/>
+            </a:endParaRPr>
           </a:p>
         </p:txBody>
       </p:sp>

</xml_diff>